<commit_message>
Add Lesson2 to Folder
</commit_message>
<xml_diff>
--- a/Tutorial/lesson1/Micro python With ESP8266-1.pptx
+++ b/Tutorial/lesson1/Micro python With ESP8266-1.pptx
@@ -13469,7 +13469,7 @@
         </p:nvSpPr>
         <p:spPr>
           <a:xfrm>
-            <a:off x="5476874" y="1467183"/>
+            <a:off x="3920190" y="1044000"/>
             <a:ext cx="5884027" cy="1204912"/>
           </a:xfrm>
         </p:spPr>
@@ -13751,7 +13751,7 @@
         </p:blipFill>
         <p:spPr bwMode="auto">
           <a:xfrm>
-            <a:off x="5453725" y="3660774"/>
+            <a:off x="5453725" y="4288083"/>
             <a:ext cx="5907176" cy="2536826"/>
           </a:xfrm>
           <a:prstGeom prst="rect">
@@ -13783,7 +13783,7 @@
         </p:nvSpPr>
         <p:spPr>
           <a:xfrm>
-            <a:off x="5453725" y="2935616"/>
+            <a:off x="5825248" y="3212305"/>
             <a:ext cx="6109138" cy="523220"/>
           </a:xfrm>
           <a:prstGeom prst="rect">
@@ -13808,6 +13808,53 @@
           </a:p>
         </p:txBody>
       </p:sp>
+      <p:pic>
+        <p:nvPicPr>
+          <p:cNvPr id="4" name="Picture 4">
+            <a:extLst>
+              <a:ext uri="{FF2B5EF4-FFF2-40B4-BE49-F238E27FC236}">
+                <a16:creationId xmlns:a16="http://schemas.microsoft.com/office/drawing/2014/main" id="{D38378E0-7F06-D1C3-051F-868F48316EE4}"/>
+              </a:ext>
+            </a:extLst>
+          </p:cNvPr>
+          <p:cNvPicPr>
+            <a:picLocks noChangeAspect="1" noChangeArrowheads="1"/>
+          </p:cNvPicPr>
+          <p:nvPr/>
+        </p:nvPicPr>
+        <p:blipFill>
+          <a:blip r:embed="rId5">
+            <a:extLst>
+              <a:ext uri="{28A0092B-C50C-407E-A947-70E740481C1C}">
+                <a14:useLocalDpi xmlns:a14="http://schemas.microsoft.com/office/drawing/2010/main" val="0"/>
+              </a:ext>
+            </a:extLst>
+          </a:blip>
+          <a:srcRect/>
+          <a:stretch>
+            <a:fillRect/>
+          </a:stretch>
+        </p:blipFill>
+        <p:spPr bwMode="auto">
+          <a:xfrm>
+            <a:off x="9165662" y="33091"/>
+            <a:ext cx="2541998" cy="2541998"/>
+          </a:xfrm>
+          <a:prstGeom prst="rect">
+            <a:avLst/>
+          </a:prstGeom>
+          <a:noFill/>
+          <a:extLst>
+            <a:ext uri="{909E8E84-426E-40DD-AFC4-6F175D3DCCD1}">
+              <a14:hiddenFill xmlns:a14="http://schemas.microsoft.com/office/drawing/2010/main">
+                <a:solidFill>
+                  <a:srgbClr val="FFFFFF"/>
+                </a:solidFill>
+              </a14:hiddenFill>
+            </a:ext>
+          </a:extLst>
+        </p:spPr>
+      </p:pic>
     </p:spTree>
     <p:extLst>
       <p:ext uri="{BB962C8B-B14F-4D97-AF65-F5344CB8AC3E}">
@@ -14222,8 +14269,8 @@
           </a:p>
         </p:txBody>
       </p:sp>
-      <mc:AlternateContent xmlns:mc="http://schemas.openxmlformats.org/markup-compatibility/2006">
-        <mc:Choice xmlns:p14="http://schemas.microsoft.com/office/powerpoint/2010/main" Requires="p14">
+      <mc:AlternateContent xmlns:mc="http://schemas.openxmlformats.org/markup-compatibility/2006" xmlns:p14="http://schemas.microsoft.com/office/powerpoint/2010/main">
+        <mc:Choice Requires="p14">
           <p:contentPart p14:bwMode="auto" r:id="rId5">
             <p14:nvContentPartPr>
               <p14:cNvPr id="2" name="Ink 1">
@@ -14242,7 +14289,7 @@
             </p14:xfrm>
           </p:contentPart>
         </mc:Choice>
-        <mc:Fallback>
+        <mc:Fallback xmlns="">
           <p:pic>
             <p:nvPicPr>
               <p:cNvPr id="2" name="Ink 1">
@@ -14582,8 +14629,8 @@
           </mc:Fallback>
         </mc:AlternateContent>
       </p:grpSp>
-      <mc:AlternateContent xmlns:mc="http://schemas.openxmlformats.org/markup-compatibility/2006">
-        <mc:Choice xmlns:p14="http://schemas.microsoft.com/office/powerpoint/2010/main" Requires="p14">
+      <mc:AlternateContent xmlns:mc="http://schemas.openxmlformats.org/markup-compatibility/2006" xmlns:p14="http://schemas.microsoft.com/office/powerpoint/2010/main">
+        <mc:Choice Requires="p14">
           <p:contentPart p14:bwMode="auto" r:id="rId12">
             <p14:nvContentPartPr>
               <p14:cNvPr id="7" name="Ink 6">
@@ -14602,7 +14649,7 @@
             </p14:xfrm>
           </p:contentPart>
         </mc:Choice>
-        <mc:Fallback>
+        <mc:Fallback xmlns="">
           <p:pic>
             <p:nvPicPr>
               <p:cNvPr id="7" name="Ink 6">
@@ -14633,8 +14680,8 @@
           </p:pic>
         </mc:Fallback>
       </mc:AlternateContent>
-      <mc:AlternateContent xmlns:mc="http://schemas.openxmlformats.org/markup-compatibility/2006">
-        <mc:Choice xmlns:p14="http://schemas.microsoft.com/office/powerpoint/2010/main" Requires="p14">
+      <mc:AlternateContent xmlns:mc="http://schemas.openxmlformats.org/markup-compatibility/2006" xmlns:p14="http://schemas.microsoft.com/office/powerpoint/2010/main">
+        <mc:Choice Requires="p14">
           <p:contentPart p14:bwMode="auto" r:id="rId14">
             <p14:nvContentPartPr>
               <p14:cNvPr id="1072" name="Ink 1071">
@@ -14653,7 +14700,7 @@
             </p14:xfrm>
           </p:contentPart>
         </mc:Choice>
-        <mc:Fallback>
+        <mc:Fallback xmlns="">
           <p:pic>
             <p:nvPicPr>
               <p:cNvPr id="1072" name="Ink 1071">
@@ -14684,8 +14731,8 @@
           </p:pic>
         </mc:Fallback>
       </mc:AlternateContent>
-      <mc:AlternateContent xmlns:mc="http://schemas.openxmlformats.org/markup-compatibility/2006">
-        <mc:Choice xmlns:p14="http://schemas.microsoft.com/office/powerpoint/2010/main" Requires="p14">
+      <mc:AlternateContent xmlns:mc="http://schemas.openxmlformats.org/markup-compatibility/2006" xmlns:p14="http://schemas.microsoft.com/office/powerpoint/2010/main">
+        <mc:Choice Requires="p14">
           <p:contentPart p14:bwMode="auto" r:id="rId16">
             <p14:nvContentPartPr>
               <p14:cNvPr id="1101" name="Ink 1100">
@@ -14704,7 +14751,7 @@
             </p14:xfrm>
           </p:contentPart>
         </mc:Choice>
-        <mc:Fallback>
+        <mc:Fallback xmlns="">
           <p:pic>
             <p:nvPicPr>
               <p:cNvPr id="1101" name="Ink 1100">
@@ -14755,8 +14802,8 @@
             <a:chExt cx="2160360" cy="1120320"/>
           </a:xfrm>
         </p:grpSpPr>
-        <mc:AlternateContent xmlns:mc="http://schemas.openxmlformats.org/markup-compatibility/2006">
-          <mc:Choice xmlns:p14="http://schemas.microsoft.com/office/powerpoint/2010/main" Requires="p14">
+        <mc:AlternateContent xmlns:mc="http://schemas.openxmlformats.org/markup-compatibility/2006" xmlns:p14="http://schemas.microsoft.com/office/powerpoint/2010/main">
+          <mc:Choice Requires="p14">
             <p:contentPart p14:bwMode="auto" r:id="rId18">
               <p14:nvContentPartPr>
                 <p14:cNvPr id="1104" name="Ink 1103">
@@ -14775,7 +14822,7 @@
               </p14:xfrm>
             </p:contentPart>
           </mc:Choice>
-          <mc:Fallback>
+          <mc:Fallback xmlns="">
             <p:pic>
               <p:nvPicPr>
                 <p:cNvPr id="1104" name="Ink 1103">
@@ -14806,8 +14853,8 @@
             </p:pic>
           </mc:Fallback>
         </mc:AlternateContent>
-        <mc:AlternateContent xmlns:mc="http://schemas.openxmlformats.org/markup-compatibility/2006">
-          <mc:Choice xmlns:p14="http://schemas.microsoft.com/office/powerpoint/2010/main" Requires="p14">
+        <mc:AlternateContent xmlns:mc="http://schemas.openxmlformats.org/markup-compatibility/2006" xmlns:p14="http://schemas.microsoft.com/office/powerpoint/2010/main">
+          <mc:Choice Requires="p14">
             <p:contentPart p14:bwMode="auto" r:id="rId20">
               <p14:nvContentPartPr>
                 <p14:cNvPr id="1107" name="Ink 1106">
@@ -14826,7 +14873,7 @@
               </p14:xfrm>
             </p:contentPart>
           </mc:Choice>
-          <mc:Fallback>
+          <mc:Fallback xmlns="">
             <p:pic>
               <p:nvPicPr>
                 <p:cNvPr id="1107" name="Ink 1106">
@@ -14857,8 +14904,8 @@
             </p:pic>
           </mc:Fallback>
         </mc:AlternateContent>
-        <mc:AlternateContent xmlns:mc="http://schemas.openxmlformats.org/markup-compatibility/2006">
-          <mc:Choice xmlns:p14="http://schemas.microsoft.com/office/powerpoint/2010/main" Requires="p14">
+        <mc:AlternateContent xmlns:mc="http://schemas.openxmlformats.org/markup-compatibility/2006" xmlns:p14="http://schemas.microsoft.com/office/powerpoint/2010/main">
+          <mc:Choice Requires="p14">
             <p:contentPart p14:bwMode="auto" r:id="rId22">
               <p14:nvContentPartPr>
                 <p14:cNvPr id="1110" name="Ink 1109">
@@ -14877,7 +14924,7 @@
               </p14:xfrm>
             </p:contentPart>
           </mc:Choice>
-          <mc:Fallback>
+          <mc:Fallback xmlns="">
             <p:pic>
               <p:nvPicPr>
                 <p:cNvPr id="1110" name="Ink 1109">
@@ -14908,8 +14955,8 @@
             </p:pic>
           </mc:Fallback>
         </mc:AlternateContent>
-        <mc:AlternateContent xmlns:mc="http://schemas.openxmlformats.org/markup-compatibility/2006">
-          <mc:Choice xmlns:p14="http://schemas.microsoft.com/office/powerpoint/2010/main" Requires="p14">
+        <mc:AlternateContent xmlns:mc="http://schemas.openxmlformats.org/markup-compatibility/2006" xmlns:p14="http://schemas.microsoft.com/office/powerpoint/2010/main">
+          <mc:Choice Requires="p14">
             <p:contentPart p14:bwMode="auto" r:id="rId24">
               <p14:nvContentPartPr>
                 <p14:cNvPr id="1113" name="Ink 1112">
@@ -14928,7 +14975,7 @@
               </p14:xfrm>
             </p:contentPart>
           </mc:Choice>
-          <mc:Fallback>
+          <mc:Fallback xmlns="">
             <p:pic>
               <p:nvPicPr>
                 <p:cNvPr id="1113" name="Ink 1112">
@@ -14980,8 +15027,8 @@
             <a:chExt cx="648000" cy="277200"/>
           </a:xfrm>
         </p:grpSpPr>
-        <mc:AlternateContent xmlns:mc="http://schemas.openxmlformats.org/markup-compatibility/2006">
-          <mc:Choice xmlns:p14="http://schemas.microsoft.com/office/powerpoint/2010/main" Requires="p14">
+        <mc:AlternateContent xmlns:mc="http://schemas.openxmlformats.org/markup-compatibility/2006" xmlns:p14="http://schemas.microsoft.com/office/powerpoint/2010/main">
+          <mc:Choice Requires="p14">
             <p:contentPart p14:bwMode="auto" r:id="rId26">
               <p14:nvContentPartPr>
                 <p14:cNvPr id="1118" name="Ink 1117">
@@ -15000,7 +15047,7 @@
               </p14:xfrm>
             </p:contentPart>
           </mc:Choice>
-          <mc:Fallback>
+          <mc:Fallback xmlns="">
             <p:pic>
               <p:nvPicPr>
                 <p:cNvPr id="1118" name="Ink 1117">
@@ -15031,8 +15078,8 @@
             </p:pic>
           </mc:Fallback>
         </mc:AlternateContent>
-        <mc:AlternateContent xmlns:mc="http://schemas.openxmlformats.org/markup-compatibility/2006">
-          <mc:Choice xmlns:p14="http://schemas.microsoft.com/office/powerpoint/2010/main" Requires="p14">
+        <mc:AlternateContent xmlns:mc="http://schemas.openxmlformats.org/markup-compatibility/2006" xmlns:p14="http://schemas.microsoft.com/office/powerpoint/2010/main">
+          <mc:Choice Requires="p14">
             <p:contentPart p14:bwMode="auto" r:id="rId28">
               <p14:nvContentPartPr>
                 <p14:cNvPr id="1120" name="Ink 1119">
@@ -15051,7 +15098,7 @@
               </p14:xfrm>
             </p:contentPart>
           </mc:Choice>
-          <mc:Fallback>
+          <mc:Fallback xmlns="">
             <p:pic>
               <p:nvPicPr>
                 <p:cNvPr id="1120" name="Ink 1119">
@@ -15083,8 +15130,8 @@
           </mc:Fallback>
         </mc:AlternateContent>
       </p:grpSp>
-      <mc:AlternateContent xmlns:mc="http://schemas.openxmlformats.org/markup-compatibility/2006">
-        <mc:Choice xmlns:p14="http://schemas.microsoft.com/office/powerpoint/2010/main" Requires="p14">
+      <mc:AlternateContent xmlns:mc="http://schemas.openxmlformats.org/markup-compatibility/2006" xmlns:p14="http://schemas.microsoft.com/office/powerpoint/2010/main">
+        <mc:Choice Requires="p14">
           <p:contentPart p14:bwMode="auto" r:id="rId30">
             <p14:nvContentPartPr>
               <p14:cNvPr id="1125" name="Ink 1124">
@@ -15103,7 +15150,7 @@
             </p14:xfrm>
           </p:contentPart>
         </mc:Choice>
-        <mc:Fallback>
+        <mc:Fallback xmlns="">
           <p:pic>
             <p:nvPicPr>
               <p:cNvPr id="1125" name="Ink 1124">
@@ -15134,8 +15181,8 @@
           </p:pic>
         </mc:Fallback>
       </mc:AlternateContent>
-      <mc:AlternateContent xmlns:mc="http://schemas.openxmlformats.org/markup-compatibility/2006">
-        <mc:Choice xmlns:p14="http://schemas.microsoft.com/office/powerpoint/2010/main" Requires="p14">
+      <mc:AlternateContent xmlns:mc="http://schemas.openxmlformats.org/markup-compatibility/2006" xmlns:p14="http://schemas.microsoft.com/office/powerpoint/2010/main">
+        <mc:Choice Requires="p14">
           <p:contentPart p14:bwMode="auto" r:id="rId32">
             <p14:nvContentPartPr>
               <p14:cNvPr id="1128" name="Ink 1127">
@@ -15154,7 +15201,7 @@
             </p14:xfrm>
           </p:contentPart>
         </mc:Choice>
-        <mc:Fallback>
+        <mc:Fallback xmlns="">
           <p:pic>
             <p:nvPicPr>
               <p:cNvPr id="1128" name="Ink 1127">
@@ -15205,8 +15252,8 @@
             <a:chExt cx="8230680" cy="6821955"/>
           </a:xfrm>
         </p:grpSpPr>
-        <mc:AlternateContent xmlns:mc="http://schemas.openxmlformats.org/markup-compatibility/2006">
-          <mc:Choice xmlns:p14="http://schemas.microsoft.com/office/powerpoint/2010/main" Requires="p14">
+        <mc:AlternateContent xmlns:mc="http://schemas.openxmlformats.org/markup-compatibility/2006" xmlns:p14="http://schemas.microsoft.com/office/powerpoint/2010/main">
+          <mc:Choice Requires="p14">
             <p:contentPart p14:bwMode="auto" r:id="rId34">
               <p14:nvContentPartPr>
                 <p14:cNvPr id="1038" name="Ink 1037">
@@ -15225,7 +15272,7 @@
               </p14:xfrm>
             </p:contentPart>
           </mc:Choice>
-          <mc:Fallback>
+          <mc:Fallback xmlns="">
             <p:pic>
               <p:nvPicPr>
                 <p:cNvPr id="1038" name="Ink 1037">
@@ -15256,8 +15303,8 @@
             </p:pic>
           </mc:Fallback>
         </mc:AlternateContent>
-        <mc:AlternateContent xmlns:mc="http://schemas.openxmlformats.org/markup-compatibility/2006">
-          <mc:Choice xmlns:p14="http://schemas.microsoft.com/office/powerpoint/2010/main" Requires="p14">
+        <mc:AlternateContent xmlns:mc="http://schemas.openxmlformats.org/markup-compatibility/2006" xmlns:p14="http://schemas.microsoft.com/office/powerpoint/2010/main">
+          <mc:Choice Requires="p14">
             <p:contentPart p14:bwMode="auto" r:id="rId36">
               <p14:nvContentPartPr>
                 <p14:cNvPr id="1046" name="Ink 1045">
@@ -15276,7 +15323,7 @@
               </p14:xfrm>
             </p:contentPart>
           </mc:Choice>
-          <mc:Fallback>
+          <mc:Fallback xmlns="">
             <p:pic>
               <p:nvPicPr>
                 <p:cNvPr id="1046" name="Ink 1045">
@@ -15307,8 +15354,8 @@
             </p:pic>
           </mc:Fallback>
         </mc:AlternateContent>
-        <mc:AlternateContent xmlns:mc="http://schemas.openxmlformats.org/markup-compatibility/2006">
-          <mc:Choice xmlns:p14="http://schemas.microsoft.com/office/powerpoint/2010/main" Requires="p14">
+        <mc:AlternateContent xmlns:mc="http://schemas.openxmlformats.org/markup-compatibility/2006" xmlns:p14="http://schemas.microsoft.com/office/powerpoint/2010/main">
+          <mc:Choice Requires="p14">
             <p:contentPart p14:bwMode="auto" r:id="rId38">
               <p14:nvContentPartPr>
                 <p14:cNvPr id="1047" name="Ink 1046">
@@ -15327,7 +15374,7 @@
               </p14:xfrm>
             </p:contentPart>
           </mc:Choice>
-          <mc:Fallback>
+          <mc:Fallback xmlns="">
             <p:pic>
               <p:nvPicPr>
                 <p:cNvPr id="1047" name="Ink 1046">
@@ -15358,8 +15405,8 @@
             </p:pic>
           </mc:Fallback>
         </mc:AlternateContent>
-        <mc:AlternateContent xmlns:mc="http://schemas.openxmlformats.org/markup-compatibility/2006">
-          <mc:Choice xmlns:p14="http://schemas.microsoft.com/office/powerpoint/2010/main" Requires="p14">
+        <mc:AlternateContent xmlns:mc="http://schemas.openxmlformats.org/markup-compatibility/2006" xmlns:p14="http://schemas.microsoft.com/office/powerpoint/2010/main">
+          <mc:Choice Requires="p14">
             <p:contentPart p14:bwMode="auto" r:id="rId40">
               <p14:nvContentPartPr>
                 <p14:cNvPr id="1061" name="Ink 1060">
@@ -15378,7 +15425,7 @@
               </p14:xfrm>
             </p:contentPart>
           </mc:Choice>
-          <mc:Fallback>
+          <mc:Fallback xmlns="">
             <p:pic>
               <p:nvPicPr>
                 <p:cNvPr id="1061" name="Ink 1060">
@@ -15409,8 +15456,8 @@
             </p:pic>
           </mc:Fallback>
         </mc:AlternateContent>
-        <mc:AlternateContent xmlns:mc="http://schemas.openxmlformats.org/markup-compatibility/2006">
-          <mc:Choice xmlns:p14="http://schemas.microsoft.com/office/powerpoint/2010/main" Requires="p14">
+        <mc:AlternateContent xmlns:mc="http://schemas.openxmlformats.org/markup-compatibility/2006" xmlns:p14="http://schemas.microsoft.com/office/powerpoint/2010/main">
+          <mc:Choice Requires="p14">
             <p:contentPart p14:bwMode="auto" r:id="rId42">
               <p14:nvContentPartPr>
                 <p14:cNvPr id="1064" name="Ink 1063">
@@ -15429,7 +15476,7 @@
               </p14:xfrm>
             </p:contentPart>
           </mc:Choice>
-          <mc:Fallback>
+          <mc:Fallback xmlns="">
             <p:pic>
               <p:nvPicPr>
                 <p:cNvPr id="1064" name="Ink 1063">
@@ -15460,8 +15507,8 @@
             </p:pic>
           </mc:Fallback>
         </mc:AlternateContent>
-        <mc:AlternateContent xmlns:mc="http://schemas.openxmlformats.org/markup-compatibility/2006">
-          <mc:Choice xmlns:p14="http://schemas.microsoft.com/office/powerpoint/2010/main" Requires="p14">
+        <mc:AlternateContent xmlns:mc="http://schemas.openxmlformats.org/markup-compatibility/2006" xmlns:p14="http://schemas.microsoft.com/office/powerpoint/2010/main">
+          <mc:Choice Requires="p14">
             <p:contentPart p14:bwMode="auto" r:id="rId44">
               <p14:nvContentPartPr>
                 <p14:cNvPr id="1067" name="Ink 1066">
@@ -15480,7 +15527,7 @@
               </p14:xfrm>
             </p:contentPart>
           </mc:Choice>
-          <mc:Fallback>
+          <mc:Fallback xmlns="">
             <p:pic>
               <p:nvPicPr>
                 <p:cNvPr id="1067" name="Ink 1066">
@@ -15511,8 +15558,8 @@
             </p:pic>
           </mc:Fallback>
         </mc:AlternateContent>
-        <mc:AlternateContent xmlns:mc="http://schemas.openxmlformats.org/markup-compatibility/2006">
-          <mc:Choice xmlns:p14="http://schemas.microsoft.com/office/powerpoint/2010/main" Requires="p14">
+        <mc:AlternateContent xmlns:mc="http://schemas.openxmlformats.org/markup-compatibility/2006" xmlns:p14="http://schemas.microsoft.com/office/powerpoint/2010/main">
+          <mc:Choice Requires="p14">
             <p:contentPart p14:bwMode="auto" r:id="rId46">
               <p14:nvContentPartPr>
                 <p14:cNvPr id="1129" name="Ink 1128">
@@ -15531,7 +15578,7 @@
               </p14:xfrm>
             </p:contentPart>
           </mc:Choice>
-          <mc:Fallback>
+          <mc:Fallback xmlns="">
             <p:pic>
               <p:nvPicPr>
                 <p:cNvPr id="1129" name="Ink 1128">
@@ -15562,8 +15609,8 @@
             </p:pic>
           </mc:Fallback>
         </mc:AlternateContent>
-        <mc:AlternateContent xmlns:mc="http://schemas.openxmlformats.org/markup-compatibility/2006">
-          <mc:Choice xmlns:p14="http://schemas.microsoft.com/office/powerpoint/2010/main" Requires="p14">
+        <mc:AlternateContent xmlns:mc="http://schemas.openxmlformats.org/markup-compatibility/2006" xmlns:p14="http://schemas.microsoft.com/office/powerpoint/2010/main">
+          <mc:Choice Requires="p14">
             <p:contentPart p14:bwMode="auto" r:id="rId48">
               <p14:nvContentPartPr>
                 <p14:cNvPr id="1130" name="Ink 1129">
@@ -15582,7 +15629,7 @@
               </p14:xfrm>
             </p:contentPart>
           </mc:Choice>
-          <mc:Fallback>
+          <mc:Fallback xmlns="">
             <p:pic>
               <p:nvPicPr>
                 <p:cNvPr id="1130" name="Ink 1129">
@@ -15613,8 +15660,8 @@
             </p:pic>
           </mc:Fallback>
         </mc:AlternateContent>
-        <mc:AlternateContent xmlns:mc="http://schemas.openxmlformats.org/markup-compatibility/2006">
-          <mc:Choice xmlns:p14="http://schemas.microsoft.com/office/powerpoint/2010/main" Requires="p14">
+        <mc:AlternateContent xmlns:mc="http://schemas.openxmlformats.org/markup-compatibility/2006" xmlns:p14="http://schemas.microsoft.com/office/powerpoint/2010/main">
+          <mc:Choice Requires="p14">
             <p:contentPart p14:bwMode="auto" r:id="rId50">
               <p14:nvContentPartPr>
                 <p14:cNvPr id="1131" name="Ink 1130">
@@ -15633,7 +15680,7 @@
               </p14:xfrm>
             </p:contentPart>
           </mc:Choice>
-          <mc:Fallback>
+          <mc:Fallback xmlns="">
             <p:pic>
               <p:nvPicPr>
                 <p:cNvPr id="1131" name="Ink 1130">
@@ -15664,8 +15711,8 @@
             </p:pic>
           </mc:Fallback>
         </mc:AlternateContent>
-        <mc:AlternateContent xmlns:mc="http://schemas.openxmlformats.org/markup-compatibility/2006">
-          <mc:Choice xmlns:p14="http://schemas.microsoft.com/office/powerpoint/2010/main" Requires="p14">
+        <mc:AlternateContent xmlns:mc="http://schemas.openxmlformats.org/markup-compatibility/2006" xmlns:p14="http://schemas.microsoft.com/office/powerpoint/2010/main">
+          <mc:Choice Requires="p14">
             <p:contentPart p14:bwMode="auto" r:id="rId52">
               <p14:nvContentPartPr>
                 <p14:cNvPr id="1132" name="Ink 1131">
@@ -15684,7 +15731,7 @@
               </p14:xfrm>
             </p:contentPart>
           </mc:Choice>
-          <mc:Fallback>
+          <mc:Fallback xmlns="">
             <p:pic>
               <p:nvPicPr>
                 <p:cNvPr id="1132" name="Ink 1131">
@@ -15715,8 +15762,8 @@
             </p:pic>
           </mc:Fallback>
         </mc:AlternateContent>
-        <mc:AlternateContent xmlns:mc="http://schemas.openxmlformats.org/markup-compatibility/2006">
-          <mc:Choice xmlns:p14="http://schemas.microsoft.com/office/powerpoint/2010/main" Requires="p14">
+        <mc:AlternateContent xmlns:mc="http://schemas.openxmlformats.org/markup-compatibility/2006" xmlns:p14="http://schemas.microsoft.com/office/powerpoint/2010/main">
+          <mc:Choice Requires="p14">
             <p:contentPart p14:bwMode="auto" r:id="rId54">
               <p14:nvContentPartPr>
                 <p14:cNvPr id="1133" name="Ink 1132">
@@ -15735,7 +15782,7 @@
               </p14:xfrm>
             </p:contentPart>
           </mc:Choice>
-          <mc:Fallback>
+          <mc:Fallback xmlns="">
             <p:pic>
               <p:nvPicPr>
                 <p:cNvPr id="1133" name="Ink 1132">
@@ -15766,8 +15813,8 @@
             </p:pic>
           </mc:Fallback>
         </mc:AlternateContent>
-        <mc:AlternateContent xmlns:mc="http://schemas.openxmlformats.org/markup-compatibility/2006">
-          <mc:Choice xmlns:p14="http://schemas.microsoft.com/office/powerpoint/2010/main" Requires="p14">
+        <mc:AlternateContent xmlns:mc="http://schemas.openxmlformats.org/markup-compatibility/2006" xmlns:p14="http://schemas.microsoft.com/office/powerpoint/2010/main">
+          <mc:Choice Requires="p14">
             <p:contentPart p14:bwMode="auto" r:id="rId56">
               <p14:nvContentPartPr>
                 <p14:cNvPr id="10" name="Ink 9">
@@ -15786,7 +15833,7 @@
               </p14:xfrm>
             </p:contentPart>
           </mc:Choice>
-          <mc:Fallback>
+          <mc:Fallback xmlns="">
             <p:pic>
               <p:nvPicPr>
                 <p:cNvPr id="10" name="Ink 9">
@@ -15817,8 +15864,8 @@
             </p:pic>
           </mc:Fallback>
         </mc:AlternateContent>
-        <mc:AlternateContent xmlns:mc="http://schemas.openxmlformats.org/markup-compatibility/2006">
-          <mc:Choice xmlns:p14="http://schemas.microsoft.com/office/powerpoint/2010/main" Requires="p14">
+        <mc:AlternateContent xmlns:mc="http://schemas.openxmlformats.org/markup-compatibility/2006" xmlns:p14="http://schemas.microsoft.com/office/powerpoint/2010/main">
+          <mc:Choice Requires="p14">
             <p:contentPart p14:bwMode="auto" r:id="rId58">
               <p14:nvContentPartPr>
                 <p14:cNvPr id="14" name="Ink 13">
@@ -15837,7 +15884,7 @@
               </p14:xfrm>
             </p:contentPart>
           </mc:Choice>
-          <mc:Fallback>
+          <mc:Fallback xmlns="">
             <p:pic>
               <p:nvPicPr>
                 <p:cNvPr id="14" name="Ink 13">
@@ -15868,8 +15915,8 @@
             </p:pic>
           </mc:Fallback>
         </mc:AlternateContent>
-        <mc:AlternateContent xmlns:mc="http://schemas.openxmlformats.org/markup-compatibility/2006">
-          <mc:Choice xmlns:p14="http://schemas.microsoft.com/office/powerpoint/2010/main" Requires="p14">
+        <mc:AlternateContent xmlns:mc="http://schemas.openxmlformats.org/markup-compatibility/2006" xmlns:p14="http://schemas.microsoft.com/office/powerpoint/2010/main">
+          <mc:Choice Requires="p14">
             <p:contentPart p14:bwMode="auto" r:id="rId60">
               <p14:nvContentPartPr>
                 <p14:cNvPr id="17" name="Ink 16">
@@ -15888,7 +15935,7 @@
               </p14:xfrm>
             </p:contentPart>
           </mc:Choice>
-          <mc:Fallback>
+          <mc:Fallback xmlns="">
             <p:pic>
               <p:nvPicPr>
                 <p:cNvPr id="17" name="Ink 16">
@@ -15919,8 +15966,8 @@
             </p:pic>
           </mc:Fallback>
         </mc:AlternateContent>
-        <mc:AlternateContent xmlns:mc="http://schemas.openxmlformats.org/markup-compatibility/2006">
-          <mc:Choice xmlns:p14="http://schemas.microsoft.com/office/powerpoint/2010/main" Requires="p14">
+        <mc:AlternateContent xmlns:mc="http://schemas.openxmlformats.org/markup-compatibility/2006" xmlns:p14="http://schemas.microsoft.com/office/powerpoint/2010/main">
+          <mc:Choice Requires="p14">
             <p:contentPart p14:bwMode="auto" r:id="rId62">
               <p14:nvContentPartPr>
                 <p14:cNvPr id="20" name="Ink 19">
@@ -15939,7 +15986,7 @@
               </p14:xfrm>
             </p:contentPart>
           </mc:Choice>
-          <mc:Fallback>
+          <mc:Fallback xmlns="">
             <p:pic>
               <p:nvPicPr>
                 <p:cNvPr id="20" name="Ink 19">
@@ -15970,8 +16017,8 @@
             </p:pic>
           </mc:Fallback>
         </mc:AlternateContent>
-        <mc:AlternateContent xmlns:mc="http://schemas.openxmlformats.org/markup-compatibility/2006">
-          <mc:Choice xmlns:p14="http://schemas.microsoft.com/office/powerpoint/2010/main" Requires="p14">
+        <mc:AlternateContent xmlns:mc="http://schemas.openxmlformats.org/markup-compatibility/2006" xmlns:p14="http://schemas.microsoft.com/office/powerpoint/2010/main">
+          <mc:Choice Requires="p14">
             <p:contentPart p14:bwMode="auto" r:id="rId64">
               <p14:nvContentPartPr>
                 <p14:cNvPr id="22" name="Ink 21">
@@ -15990,7 +16037,7 @@
               </p14:xfrm>
             </p:contentPart>
           </mc:Choice>
-          <mc:Fallback>
+          <mc:Fallback xmlns="">
             <p:pic>
               <p:nvPicPr>
                 <p:cNvPr id="22" name="Ink 21">
@@ -16021,8 +16068,8 @@
             </p:pic>
           </mc:Fallback>
         </mc:AlternateContent>
-        <mc:AlternateContent xmlns:mc="http://schemas.openxmlformats.org/markup-compatibility/2006">
-          <mc:Choice xmlns:p14="http://schemas.microsoft.com/office/powerpoint/2010/main" Requires="p14">
+        <mc:AlternateContent xmlns:mc="http://schemas.openxmlformats.org/markup-compatibility/2006" xmlns:p14="http://schemas.microsoft.com/office/powerpoint/2010/main">
+          <mc:Choice Requires="p14">
             <p:contentPart p14:bwMode="auto" r:id="rId66">
               <p14:nvContentPartPr>
                 <p14:cNvPr id="27" name="Ink 26">
@@ -16041,7 +16088,7 @@
               </p14:xfrm>
             </p:contentPart>
           </mc:Choice>
-          <mc:Fallback>
+          <mc:Fallback xmlns="">
             <p:pic>
               <p:nvPicPr>
                 <p:cNvPr id="27" name="Ink 26">
@@ -16072,8 +16119,8 @@
             </p:pic>
           </mc:Fallback>
         </mc:AlternateContent>
-        <mc:AlternateContent xmlns:mc="http://schemas.openxmlformats.org/markup-compatibility/2006">
-          <mc:Choice xmlns:p14="http://schemas.microsoft.com/office/powerpoint/2010/main" Requires="p14">
+        <mc:AlternateContent xmlns:mc="http://schemas.openxmlformats.org/markup-compatibility/2006" xmlns:p14="http://schemas.microsoft.com/office/powerpoint/2010/main">
+          <mc:Choice Requires="p14">
             <p:contentPart p14:bwMode="auto" r:id="rId68">
               <p14:nvContentPartPr>
                 <p14:cNvPr id="31" name="Ink 30">
@@ -16092,7 +16139,7 @@
               </p14:xfrm>
             </p:contentPart>
           </mc:Choice>
-          <mc:Fallback>
+          <mc:Fallback xmlns="">
             <p:pic>
               <p:nvPicPr>
                 <p:cNvPr id="31" name="Ink 30">
@@ -16123,8 +16170,8 @@
             </p:pic>
           </mc:Fallback>
         </mc:AlternateContent>
-        <mc:AlternateContent xmlns:mc="http://schemas.openxmlformats.org/markup-compatibility/2006">
-          <mc:Choice xmlns:p14="http://schemas.microsoft.com/office/powerpoint/2010/main" Requires="p14">
+        <mc:AlternateContent xmlns:mc="http://schemas.openxmlformats.org/markup-compatibility/2006" xmlns:p14="http://schemas.microsoft.com/office/powerpoint/2010/main">
+          <mc:Choice Requires="p14">
             <p:contentPart p14:bwMode="auto" r:id="rId70">
               <p14:nvContentPartPr>
                 <p14:cNvPr id="38" name="Ink 37">
@@ -16143,7 +16190,7 @@
               </p14:xfrm>
             </p:contentPart>
           </mc:Choice>
-          <mc:Fallback>
+          <mc:Fallback xmlns="">
             <p:pic>
               <p:nvPicPr>
                 <p:cNvPr id="38" name="Ink 37">
@@ -16174,8 +16221,8 @@
             </p:pic>
           </mc:Fallback>
         </mc:AlternateContent>
-        <mc:AlternateContent xmlns:mc="http://schemas.openxmlformats.org/markup-compatibility/2006">
-          <mc:Choice xmlns:p14="http://schemas.microsoft.com/office/powerpoint/2010/main" Requires="p14">
+        <mc:AlternateContent xmlns:mc="http://schemas.openxmlformats.org/markup-compatibility/2006" xmlns:p14="http://schemas.microsoft.com/office/powerpoint/2010/main">
+          <mc:Choice Requires="p14">
             <p:contentPart p14:bwMode="auto" r:id="rId72">
               <p14:nvContentPartPr>
                 <p14:cNvPr id="52" name="Ink 51">
@@ -16194,7 +16241,7 @@
               </p14:xfrm>
             </p:contentPart>
           </mc:Choice>
-          <mc:Fallback>
+          <mc:Fallback xmlns="">
             <p:pic>
               <p:nvPicPr>
                 <p:cNvPr id="52" name="Ink 51">
@@ -16225,8 +16272,8 @@
             </p:pic>
           </mc:Fallback>
         </mc:AlternateContent>
-        <mc:AlternateContent xmlns:mc="http://schemas.openxmlformats.org/markup-compatibility/2006">
-          <mc:Choice xmlns:p14="http://schemas.microsoft.com/office/powerpoint/2010/main" Requires="p14">
+        <mc:AlternateContent xmlns:mc="http://schemas.openxmlformats.org/markup-compatibility/2006" xmlns:p14="http://schemas.microsoft.com/office/powerpoint/2010/main">
+          <mc:Choice Requires="p14">
             <p:contentPart p14:bwMode="auto" r:id="rId74">
               <p14:nvContentPartPr>
                 <p14:cNvPr id="63" name="Ink 62">
@@ -16245,7 +16292,7 @@
               </p14:xfrm>
             </p:contentPart>
           </mc:Choice>
-          <mc:Fallback>
+          <mc:Fallback xmlns="">
             <p:pic>
               <p:nvPicPr>
                 <p:cNvPr id="63" name="Ink 62">
@@ -16276,8 +16323,8 @@
             </p:pic>
           </mc:Fallback>
         </mc:AlternateContent>
-        <mc:AlternateContent xmlns:mc="http://schemas.openxmlformats.org/markup-compatibility/2006">
-          <mc:Choice xmlns:p14="http://schemas.microsoft.com/office/powerpoint/2010/main" Requires="p14">
+        <mc:AlternateContent xmlns:mc="http://schemas.openxmlformats.org/markup-compatibility/2006" xmlns:p14="http://schemas.microsoft.com/office/powerpoint/2010/main">
+          <mc:Choice Requires="p14">
             <p:contentPart p14:bwMode="auto" r:id="rId76">
               <p14:nvContentPartPr>
                 <p14:cNvPr id="1031" name="Ink 1030">
@@ -16296,7 +16343,7 @@
               </p14:xfrm>
             </p:contentPart>
           </mc:Choice>
-          <mc:Fallback>
+          <mc:Fallback xmlns="">
             <p:pic>
               <p:nvPicPr>
                 <p:cNvPr id="1031" name="Ink 1030">
@@ -16327,8 +16374,8 @@
             </p:pic>
           </mc:Fallback>
         </mc:AlternateContent>
-        <mc:AlternateContent xmlns:mc="http://schemas.openxmlformats.org/markup-compatibility/2006">
-          <mc:Choice xmlns:p14="http://schemas.microsoft.com/office/powerpoint/2010/main" Requires="p14">
+        <mc:AlternateContent xmlns:mc="http://schemas.openxmlformats.org/markup-compatibility/2006" xmlns:p14="http://schemas.microsoft.com/office/powerpoint/2010/main">
+          <mc:Choice Requires="p14">
             <p:contentPart p14:bwMode="auto" r:id="rId78">
               <p14:nvContentPartPr>
                 <p14:cNvPr id="1079" name="Ink 1078">
@@ -16347,7 +16394,7 @@
               </p14:xfrm>
             </p:contentPart>
           </mc:Choice>
-          <mc:Fallback>
+          <mc:Fallback xmlns="">
             <p:pic>
               <p:nvPicPr>
                 <p:cNvPr id="1079" name="Ink 1078">
@@ -16378,8 +16425,8 @@
             </p:pic>
           </mc:Fallback>
         </mc:AlternateContent>
-        <mc:AlternateContent xmlns:mc="http://schemas.openxmlformats.org/markup-compatibility/2006">
-          <mc:Choice xmlns:p14="http://schemas.microsoft.com/office/powerpoint/2010/main" Requires="p14">
+        <mc:AlternateContent xmlns:mc="http://schemas.openxmlformats.org/markup-compatibility/2006" xmlns:p14="http://schemas.microsoft.com/office/powerpoint/2010/main">
+          <mc:Choice Requires="p14">
             <p:contentPart p14:bwMode="auto" r:id="rId80">
               <p14:nvContentPartPr>
                 <p14:cNvPr id="1081" name="Ink 1080">
@@ -16398,7 +16445,7 @@
               </p14:xfrm>
             </p:contentPart>
           </mc:Choice>
-          <mc:Fallback>
+          <mc:Fallback xmlns="">
             <p:pic>
               <p:nvPicPr>
                 <p:cNvPr id="1081" name="Ink 1080">
@@ -16429,8 +16476,8 @@
             </p:pic>
           </mc:Fallback>
         </mc:AlternateContent>
-        <mc:AlternateContent xmlns:mc="http://schemas.openxmlformats.org/markup-compatibility/2006">
-          <mc:Choice xmlns:p14="http://schemas.microsoft.com/office/powerpoint/2010/main" Requires="p14">
+        <mc:AlternateContent xmlns:mc="http://schemas.openxmlformats.org/markup-compatibility/2006" xmlns:p14="http://schemas.microsoft.com/office/powerpoint/2010/main">
+          <mc:Choice Requires="p14">
             <p:contentPart p14:bwMode="auto" r:id="rId82">
               <p14:nvContentPartPr>
                 <p14:cNvPr id="1084" name="Ink 1083">
@@ -16449,7 +16496,7 @@
               </p14:xfrm>
             </p:contentPart>
           </mc:Choice>
-          <mc:Fallback>
+          <mc:Fallback xmlns="">
             <p:pic>
               <p:nvPicPr>
                 <p:cNvPr id="1084" name="Ink 1083">
@@ -16480,8 +16527,8 @@
             </p:pic>
           </mc:Fallback>
         </mc:AlternateContent>
-        <mc:AlternateContent xmlns:mc="http://schemas.openxmlformats.org/markup-compatibility/2006">
-          <mc:Choice xmlns:p14="http://schemas.microsoft.com/office/powerpoint/2010/main" Requires="p14">
+        <mc:AlternateContent xmlns:mc="http://schemas.openxmlformats.org/markup-compatibility/2006" xmlns:p14="http://schemas.microsoft.com/office/powerpoint/2010/main">
+          <mc:Choice Requires="p14">
             <p:contentPart p14:bwMode="auto" r:id="rId84">
               <p14:nvContentPartPr>
                 <p14:cNvPr id="1086" name="Ink 1085">
@@ -16500,7 +16547,7 @@
               </p14:xfrm>
             </p:contentPart>
           </mc:Choice>
-          <mc:Fallback>
+          <mc:Fallback xmlns="">
             <p:pic>
               <p:nvPicPr>
                 <p:cNvPr id="1086" name="Ink 1085">
@@ -16531,8 +16578,8 @@
             </p:pic>
           </mc:Fallback>
         </mc:AlternateContent>
-        <mc:AlternateContent xmlns:mc="http://schemas.openxmlformats.org/markup-compatibility/2006">
-          <mc:Choice xmlns:p14="http://schemas.microsoft.com/office/powerpoint/2010/main" Requires="p14">
+        <mc:AlternateContent xmlns:mc="http://schemas.openxmlformats.org/markup-compatibility/2006" xmlns:p14="http://schemas.microsoft.com/office/powerpoint/2010/main">
+          <mc:Choice Requires="p14">
             <p:contentPart p14:bwMode="auto" r:id="rId86">
               <p14:nvContentPartPr>
                 <p14:cNvPr id="1089" name="Ink 1088">
@@ -16551,7 +16598,7 @@
               </p14:xfrm>
             </p:contentPart>
           </mc:Choice>
-          <mc:Fallback>
+          <mc:Fallback xmlns="">
             <p:pic>
               <p:nvPicPr>
                 <p:cNvPr id="1089" name="Ink 1088">
@@ -16582,8 +16629,8 @@
             </p:pic>
           </mc:Fallback>
         </mc:AlternateContent>
-        <mc:AlternateContent xmlns:mc="http://schemas.openxmlformats.org/markup-compatibility/2006">
-          <mc:Choice xmlns:p14="http://schemas.microsoft.com/office/powerpoint/2010/main" Requires="p14">
+        <mc:AlternateContent xmlns:mc="http://schemas.openxmlformats.org/markup-compatibility/2006" xmlns:p14="http://schemas.microsoft.com/office/powerpoint/2010/main">
+          <mc:Choice Requires="p14">
             <p:contentPart p14:bwMode="auto" r:id="rId88">
               <p14:nvContentPartPr>
                 <p14:cNvPr id="1095" name="Ink 1094">
@@ -16602,7 +16649,7 @@
               </p14:xfrm>
             </p:contentPart>
           </mc:Choice>
-          <mc:Fallback>
+          <mc:Fallback xmlns="">
             <p:pic>
               <p:nvPicPr>
                 <p:cNvPr id="1095" name="Ink 1094">
@@ -16633,8 +16680,8 @@
             </p:pic>
           </mc:Fallback>
         </mc:AlternateContent>
-        <mc:AlternateContent xmlns:mc="http://schemas.openxmlformats.org/markup-compatibility/2006">
-          <mc:Choice xmlns:p14="http://schemas.microsoft.com/office/powerpoint/2010/main" Requires="p14">
+        <mc:AlternateContent xmlns:mc="http://schemas.openxmlformats.org/markup-compatibility/2006" xmlns:p14="http://schemas.microsoft.com/office/powerpoint/2010/main">
+          <mc:Choice Requires="p14">
             <p:contentPart p14:bwMode="auto" r:id="rId90">
               <p14:nvContentPartPr>
                 <p14:cNvPr id="1135" name="Ink 1134">
@@ -16653,7 +16700,7 @@
               </p14:xfrm>
             </p:contentPart>
           </mc:Choice>
-          <mc:Fallback>
+          <mc:Fallback xmlns="">
             <p:pic>
               <p:nvPicPr>
                 <p:cNvPr id="1135" name="Ink 1134">
@@ -16684,8 +16731,8 @@
             </p:pic>
           </mc:Fallback>
         </mc:AlternateContent>
-        <mc:AlternateContent xmlns:mc="http://schemas.openxmlformats.org/markup-compatibility/2006">
-          <mc:Choice xmlns:p14="http://schemas.microsoft.com/office/powerpoint/2010/main" Requires="p14">
+        <mc:AlternateContent xmlns:mc="http://schemas.openxmlformats.org/markup-compatibility/2006" xmlns:p14="http://schemas.microsoft.com/office/powerpoint/2010/main">
+          <mc:Choice Requires="p14">
             <p:contentPart p14:bwMode="auto" r:id="rId92">
               <p14:nvContentPartPr>
                 <p14:cNvPr id="1136" name="Ink 1135">
@@ -16704,7 +16751,7 @@
               </p14:xfrm>
             </p:contentPart>
           </mc:Choice>
-          <mc:Fallback>
+          <mc:Fallback xmlns="">
             <p:pic>
               <p:nvPicPr>
                 <p:cNvPr id="1136" name="Ink 1135">
@@ -16735,8 +16782,8 @@
             </p:pic>
           </mc:Fallback>
         </mc:AlternateContent>
-        <mc:AlternateContent xmlns:mc="http://schemas.openxmlformats.org/markup-compatibility/2006">
-          <mc:Choice xmlns:p14="http://schemas.microsoft.com/office/powerpoint/2010/main" Requires="p14">
+        <mc:AlternateContent xmlns:mc="http://schemas.openxmlformats.org/markup-compatibility/2006" xmlns:p14="http://schemas.microsoft.com/office/powerpoint/2010/main">
+          <mc:Choice Requires="p14">
             <p:contentPart p14:bwMode="auto" r:id="rId94">
               <p14:nvContentPartPr>
                 <p14:cNvPr id="1137" name="Ink 1136">
@@ -16755,7 +16802,7 @@
               </p14:xfrm>
             </p:contentPart>
           </mc:Choice>
-          <mc:Fallback>
+          <mc:Fallback xmlns="">
             <p:pic>
               <p:nvPicPr>
                 <p:cNvPr id="1137" name="Ink 1136">
@@ -16786,8 +16833,8 @@
             </p:pic>
           </mc:Fallback>
         </mc:AlternateContent>
-        <mc:AlternateContent xmlns:mc="http://schemas.openxmlformats.org/markup-compatibility/2006">
-          <mc:Choice xmlns:p14="http://schemas.microsoft.com/office/powerpoint/2010/main" Requires="p14">
+        <mc:AlternateContent xmlns:mc="http://schemas.openxmlformats.org/markup-compatibility/2006" xmlns:p14="http://schemas.microsoft.com/office/powerpoint/2010/main">
+          <mc:Choice Requires="p14">
             <p:contentPart p14:bwMode="auto" r:id="rId96">
               <p14:nvContentPartPr>
                 <p14:cNvPr id="1138" name="Ink 1137">
@@ -16806,7 +16853,7 @@
               </p14:xfrm>
             </p:contentPart>
           </mc:Choice>
-          <mc:Fallback>
+          <mc:Fallback xmlns="">
             <p:pic>
               <p:nvPicPr>
                 <p:cNvPr id="1138" name="Ink 1137">
@@ -16837,8 +16884,8 @@
             </p:pic>
           </mc:Fallback>
         </mc:AlternateContent>
-        <mc:AlternateContent xmlns:mc="http://schemas.openxmlformats.org/markup-compatibility/2006">
-          <mc:Choice xmlns:p14="http://schemas.microsoft.com/office/powerpoint/2010/main" Requires="p14">
+        <mc:AlternateContent xmlns:mc="http://schemas.openxmlformats.org/markup-compatibility/2006" xmlns:p14="http://schemas.microsoft.com/office/powerpoint/2010/main">
+          <mc:Choice Requires="p14">
             <p:contentPart p14:bwMode="auto" r:id="rId98">
               <p14:nvContentPartPr>
                 <p14:cNvPr id="1139" name="Ink 1138">
@@ -16857,7 +16904,7 @@
               </p14:xfrm>
             </p:contentPart>
           </mc:Choice>
-          <mc:Fallback>
+          <mc:Fallback xmlns="">
             <p:pic>
               <p:nvPicPr>
                 <p:cNvPr id="1139" name="Ink 1138">
@@ -16888,8 +16935,8 @@
             </p:pic>
           </mc:Fallback>
         </mc:AlternateContent>
-        <mc:AlternateContent xmlns:mc="http://schemas.openxmlformats.org/markup-compatibility/2006">
-          <mc:Choice xmlns:p14="http://schemas.microsoft.com/office/powerpoint/2010/main" Requires="p14">
+        <mc:AlternateContent xmlns:mc="http://schemas.openxmlformats.org/markup-compatibility/2006" xmlns:p14="http://schemas.microsoft.com/office/powerpoint/2010/main">
+          <mc:Choice Requires="p14">
             <p:contentPart p14:bwMode="auto" r:id="rId100">
               <p14:nvContentPartPr>
                 <p14:cNvPr id="1140" name="Ink 1139">
@@ -16908,7 +16955,7 @@
               </p14:xfrm>
             </p:contentPart>
           </mc:Choice>
-          <mc:Fallback>
+          <mc:Fallback xmlns="">
             <p:pic>
               <p:nvPicPr>
                 <p:cNvPr id="1140" name="Ink 1139">
@@ -16939,8 +16986,8 @@
             </p:pic>
           </mc:Fallback>
         </mc:AlternateContent>
-        <mc:AlternateContent xmlns:mc="http://schemas.openxmlformats.org/markup-compatibility/2006">
-          <mc:Choice xmlns:p14="http://schemas.microsoft.com/office/powerpoint/2010/main" Requires="p14">
+        <mc:AlternateContent xmlns:mc="http://schemas.openxmlformats.org/markup-compatibility/2006" xmlns:p14="http://schemas.microsoft.com/office/powerpoint/2010/main">
+          <mc:Choice Requires="p14">
             <p:contentPart p14:bwMode="auto" r:id="rId102">
               <p14:nvContentPartPr>
                 <p14:cNvPr id="1141" name="Ink 1140">
@@ -16959,7 +17006,7 @@
               </p14:xfrm>
             </p:contentPart>
           </mc:Choice>
-          <mc:Fallback>
+          <mc:Fallback xmlns="">
             <p:pic>
               <p:nvPicPr>
                 <p:cNvPr id="1141" name="Ink 1140">
@@ -16990,8 +17037,8 @@
             </p:pic>
           </mc:Fallback>
         </mc:AlternateContent>
-        <mc:AlternateContent xmlns:mc="http://schemas.openxmlformats.org/markup-compatibility/2006">
-          <mc:Choice xmlns:p14="http://schemas.microsoft.com/office/powerpoint/2010/main" Requires="p14">
+        <mc:AlternateContent xmlns:mc="http://schemas.openxmlformats.org/markup-compatibility/2006" xmlns:p14="http://schemas.microsoft.com/office/powerpoint/2010/main">
+          <mc:Choice Requires="p14">
             <p:contentPart p14:bwMode="auto" r:id="rId104">
               <p14:nvContentPartPr>
                 <p14:cNvPr id="1142" name="Ink 1141">
@@ -17010,7 +17057,7 @@
               </p14:xfrm>
             </p:contentPart>
           </mc:Choice>
-          <mc:Fallback>
+          <mc:Fallback xmlns="">
             <p:pic>
               <p:nvPicPr>
                 <p:cNvPr id="1142" name="Ink 1141">
@@ -17041,8 +17088,8 @@
             </p:pic>
           </mc:Fallback>
         </mc:AlternateContent>
-        <mc:AlternateContent xmlns:mc="http://schemas.openxmlformats.org/markup-compatibility/2006">
-          <mc:Choice xmlns:p14="http://schemas.microsoft.com/office/powerpoint/2010/main" Requires="p14">
+        <mc:AlternateContent xmlns:mc="http://schemas.openxmlformats.org/markup-compatibility/2006" xmlns:p14="http://schemas.microsoft.com/office/powerpoint/2010/main">
+          <mc:Choice Requires="p14">
             <p:contentPart p14:bwMode="auto" r:id="rId106">
               <p14:nvContentPartPr>
                 <p14:cNvPr id="1143" name="Ink 1142">
@@ -17061,7 +17108,7 @@
               </p14:xfrm>
             </p:contentPart>
           </mc:Choice>
-          <mc:Fallback>
+          <mc:Fallback xmlns="">
             <p:pic>
               <p:nvPicPr>
                 <p:cNvPr id="1143" name="Ink 1142">
@@ -17092,8 +17139,8 @@
             </p:pic>
           </mc:Fallback>
         </mc:AlternateContent>
-        <mc:AlternateContent xmlns:mc="http://schemas.openxmlformats.org/markup-compatibility/2006">
-          <mc:Choice xmlns:p14="http://schemas.microsoft.com/office/powerpoint/2010/main" Requires="p14">
+        <mc:AlternateContent xmlns:mc="http://schemas.openxmlformats.org/markup-compatibility/2006" xmlns:p14="http://schemas.microsoft.com/office/powerpoint/2010/main">
+          <mc:Choice Requires="p14">
             <p:contentPart p14:bwMode="auto" r:id="rId108">
               <p14:nvContentPartPr>
                 <p14:cNvPr id="1144" name="Ink 1143">
@@ -17112,7 +17159,7 @@
               </p14:xfrm>
             </p:contentPart>
           </mc:Choice>
-          <mc:Fallback>
+          <mc:Fallback xmlns="">
             <p:pic>
               <p:nvPicPr>
                 <p:cNvPr id="1144" name="Ink 1143">
@@ -17143,8 +17190,8 @@
             </p:pic>
           </mc:Fallback>
         </mc:AlternateContent>
-        <mc:AlternateContent xmlns:mc="http://schemas.openxmlformats.org/markup-compatibility/2006">
-          <mc:Choice xmlns:p14="http://schemas.microsoft.com/office/powerpoint/2010/main" Requires="p14">
+        <mc:AlternateContent xmlns:mc="http://schemas.openxmlformats.org/markup-compatibility/2006" xmlns:p14="http://schemas.microsoft.com/office/powerpoint/2010/main">
+          <mc:Choice Requires="p14">
             <p:contentPart p14:bwMode="auto" r:id="rId110">
               <p14:nvContentPartPr>
                 <p14:cNvPr id="1146" name="Ink 1145">
@@ -17163,7 +17210,7 @@
               </p14:xfrm>
             </p:contentPart>
           </mc:Choice>
-          <mc:Fallback>
+          <mc:Fallback xmlns="">
             <p:pic>
               <p:nvPicPr>
                 <p:cNvPr id="1146" name="Ink 1145">
@@ -17194,8 +17241,8 @@
             </p:pic>
           </mc:Fallback>
         </mc:AlternateContent>
-        <mc:AlternateContent xmlns:mc="http://schemas.openxmlformats.org/markup-compatibility/2006">
-          <mc:Choice xmlns:p14="http://schemas.microsoft.com/office/powerpoint/2010/main" Requires="p14">
+        <mc:AlternateContent xmlns:mc="http://schemas.openxmlformats.org/markup-compatibility/2006" xmlns:p14="http://schemas.microsoft.com/office/powerpoint/2010/main">
+          <mc:Choice Requires="p14">
             <p:contentPart p14:bwMode="auto" r:id="rId112">
               <p14:nvContentPartPr>
                 <p14:cNvPr id="1147" name="Ink 1146">
@@ -17214,7 +17261,7 @@
               </p14:xfrm>
             </p:contentPart>
           </mc:Choice>
-          <mc:Fallback>
+          <mc:Fallback xmlns="">
             <p:pic>
               <p:nvPicPr>
                 <p:cNvPr id="1147" name="Ink 1146">
@@ -17245,8 +17292,8 @@
             </p:pic>
           </mc:Fallback>
         </mc:AlternateContent>
-        <mc:AlternateContent xmlns:mc="http://schemas.openxmlformats.org/markup-compatibility/2006">
-          <mc:Choice xmlns:p14="http://schemas.microsoft.com/office/powerpoint/2010/main" Requires="p14">
+        <mc:AlternateContent xmlns:mc="http://schemas.openxmlformats.org/markup-compatibility/2006" xmlns:p14="http://schemas.microsoft.com/office/powerpoint/2010/main">
+          <mc:Choice Requires="p14">
             <p:contentPart p14:bwMode="auto" r:id="rId114">
               <p14:nvContentPartPr>
                 <p14:cNvPr id="1148" name="Ink 1147">
@@ -17265,7 +17312,7 @@
               </p14:xfrm>
             </p:contentPart>
           </mc:Choice>
-          <mc:Fallback>
+          <mc:Fallback xmlns="">
             <p:pic>
               <p:nvPicPr>
                 <p:cNvPr id="1148" name="Ink 1147">
@@ -17296,8 +17343,8 @@
             </p:pic>
           </mc:Fallback>
         </mc:AlternateContent>
-        <mc:AlternateContent xmlns:mc="http://schemas.openxmlformats.org/markup-compatibility/2006">
-          <mc:Choice xmlns:p14="http://schemas.microsoft.com/office/powerpoint/2010/main" Requires="p14">
+        <mc:AlternateContent xmlns:mc="http://schemas.openxmlformats.org/markup-compatibility/2006" xmlns:p14="http://schemas.microsoft.com/office/powerpoint/2010/main">
+          <mc:Choice Requires="p14">
             <p:contentPart p14:bwMode="auto" r:id="rId116">
               <p14:nvContentPartPr>
                 <p14:cNvPr id="1149" name="Ink 1148">
@@ -17316,7 +17363,7 @@
               </p14:xfrm>
             </p:contentPart>
           </mc:Choice>
-          <mc:Fallback>
+          <mc:Fallback xmlns="">
             <p:pic>
               <p:nvPicPr>
                 <p:cNvPr id="1149" name="Ink 1148">
@@ -17347,8 +17394,8 @@
             </p:pic>
           </mc:Fallback>
         </mc:AlternateContent>
-        <mc:AlternateContent xmlns:mc="http://schemas.openxmlformats.org/markup-compatibility/2006">
-          <mc:Choice xmlns:p14="http://schemas.microsoft.com/office/powerpoint/2010/main" Requires="p14">
+        <mc:AlternateContent xmlns:mc="http://schemas.openxmlformats.org/markup-compatibility/2006" xmlns:p14="http://schemas.microsoft.com/office/powerpoint/2010/main">
+          <mc:Choice Requires="p14">
             <p:contentPart p14:bwMode="auto" r:id="rId118">
               <p14:nvContentPartPr>
                 <p14:cNvPr id="1150" name="Ink 1149">
@@ -17367,7 +17414,7 @@
               </p14:xfrm>
             </p:contentPart>
           </mc:Choice>
-          <mc:Fallback>
+          <mc:Fallback xmlns="">
             <p:pic>
               <p:nvPicPr>
                 <p:cNvPr id="1150" name="Ink 1149">
@@ -17398,8 +17445,8 @@
             </p:pic>
           </mc:Fallback>
         </mc:AlternateContent>
-        <mc:AlternateContent xmlns:mc="http://schemas.openxmlformats.org/markup-compatibility/2006">
-          <mc:Choice xmlns:p14="http://schemas.microsoft.com/office/powerpoint/2010/main" Requires="p14">
+        <mc:AlternateContent xmlns:mc="http://schemas.openxmlformats.org/markup-compatibility/2006" xmlns:p14="http://schemas.microsoft.com/office/powerpoint/2010/main">
+          <mc:Choice Requires="p14">
             <p:contentPart p14:bwMode="auto" r:id="rId120">
               <p14:nvContentPartPr>
                 <p14:cNvPr id="1151" name="Ink 1150">
@@ -17418,7 +17465,7 @@
               </p14:xfrm>
             </p:contentPart>
           </mc:Choice>
-          <mc:Fallback>
+          <mc:Fallback xmlns="">
             <p:pic>
               <p:nvPicPr>
                 <p:cNvPr id="1151" name="Ink 1150">
@@ -17449,8 +17496,8 @@
             </p:pic>
           </mc:Fallback>
         </mc:AlternateContent>
-        <mc:AlternateContent xmlns:mc="http://schemas.openxmlformats.org/markup-compatibility/2006">
-          <mc:Choice xmlns:p14="http://schemas.microsoft.com/office/powerpoint/2010/main" Requires="p14">
+        <mc:AlternateContent xmlns:mc="http://schemas.openxmlformats.org/markup-compatibility/2006" xmlns:p14="http://schemas.microsoft.com/office/powerpoint/2010/main">
+          <mc:Choice Requires="p14">
             <p:contentPart p14:bwMode="auto" r:id="rId122">
               <p14:nvContentPartPr>
                 <p14:cNvPr id="1152" name="Ink 1151">
@@ -17469,7 +17516,7 @@
               </p14:xfrm>
             </p:contentPart>
           </mc:Choice>
-          <mc:Fallback>
+          <mc:Fallback xmlns="">
             <p:pic>
               <p:nvPicPr>
                 <p:cNvPr id="1152" name="Ink 1151">
@@ -17500,8 +17547,8 @@
             </p:pic>
           </mc:Fallback>
         </mc:AlternateContent>
-        <mc:AlternateContent xmlns:mc="http://schemas.openxmlformats.org/markup-compatibility/2006">
-          <mc:Choice xmlns:p14="http://schemas.microsoft.com/office/powerpoint/2010/main" Requires="p14">
+        <mc:AlternateContent xmlns:mc="http://schemas.openxmlformats.org/markup-compatibility/2006" xmlns:p14="http://schemas.microsoft.com/office/powerpoint/2010/main">
+          <mc:Choice Requires="p14">
             <p:contentPart p14:bwMode="auto" r:id="rId124">
               <p14:nvContentPartPr>
                 <p14:cNvPr id="1154" name="Ink 1153">
@@ -17520,7 +17567,7 @@
               </p14:xfrm>
             </p:contentPart>
           </mc:Choice>
-          <mc:Fallback>
+          <mc:Fallback xmlns="">
             <p:pic>
               <p:nvPicPr>
                 <p:cNvPr id="1154" name="Ink 1153">
@@ -17551,8 +17598,8 @@
             </p:pic>
           </mc:Fallback>
         </mc:AlternateContent>
-        <mc:AlternateContent xmlns:mc="http://schemas.openxmlformats.org/markup-compatibility/2006">
-          <mc:Choice xmlns:p14="http://schemas.microsoft.com/office/powerpoint/2010/main" Requires="p14">
+        <mc:AlternateContent xmlns:mc="http://schemas.openxmlformats.org/markup-compatibility/2006" xmlns:p14="http://schemas.microsoft.com/office/powerpoint/2010/main">
+          <mc:Choice Requires="p14">
             <p:contentPart p14:bwMode="auto" r:id="rId126">
               <p14:nvContentPartPr>
                 <p14:cNvPr id="1155" name="Ink 1154">
@@ -17571,7 +17618,7 @@
               </p14:xfrm>
             </p:contentPart>
           </mc:Choice>
-          <mc:Fallback>
+          <mc:Fallback xmlns="">
             <p:pic>
               <p:nvPicPr>
                 <p:cNvPr id="1155" name="Ink 1154">
@@ -17602,8 +17649,8 @@
             </p:pic>
           </mc:Fallback>
         </mc:AlternateContent>
-        <mc:AlternateContent xmlns:mc="http://schemas.openxmlformats.org/markup-compatibility/2006">
-          <mc:Choice xmlns:p14="http://schemas.microsoft.com/office/powerpoint/2010/main" Requires="p14">
+        <mc:AlternateContent xmlns:mc="http://schemas.openxmlformats.org/markup-compatibility/2006" xmlns:p14="http://schemas.microsoft.com/office/powerpoint/2010/main">
+          <mc:Choice Requires="p14">
             <p:contentPart p14:bwMode="auto" r:id="rId128">
               <p14:nvContentPartPr>
                 <p14:cNvPr id="1156" name="Ink 1155">
@@ -17622,7 +17669,7 @@
               </p14:xfrm>
             </p:contentPart>
           </mc:Choice>
-          <mc:Fallback>
+          <mc:Fallback xmlns="">
             <p:pic>
               <p:nvPicPr>
                 <p:cNvPr id="1156" name="Ink 1155">
@@ -17653,8 +17700,8 @@
             </p:pic>
           </mc:Fallback>
         </mc:AlternateContent>
-        <mc:AlternateContent xmlns:mc="http://schemas.openxmlformats.org/markup-compatibility/2006">
-          <mc:Choice xmlns:p14="http://schemas.microsoft.com/office/powerpoint/2010/main" Requires="p14">
+        <mc:AlternateContent xmlns:mc="http://schemas.openxmlformats.org/markup-compatibility/2006" xmlns:p14="http://schemas.microsoft.com/office/powerpoint/2010/main">
+          <mc:Choice Requires="p14">
             <p:contentPart p14:bwMode="auto" r:id="rId130">
               <p14:nvContentPartPr>
                 <p14:cNvPr id="1157" name="Ink 1156">
@@ -17673,7 +17720,7 @@
               </p14:xfrm>
             </p:contentPart>
           </mc:Choice>
-          <mc:Fallback>
+          <mc:Fallback xmlns="">
             <p:pic>
               <p:nvPicPr>
                 <p:cNvPr id="1157" name="Ink 1156">
@@ -17704,8 +17751,8 @@
             </p:pic>
           </mc:Fallback>
         </mc:AlternateContent>
-        <mc:AlternateContent xmlns:mc="http://schemas.openxmlformats.org/markup-compatibility/2006">
-          <mc:Choice xmlns:p14="http://schemas.microsoft.com/office/powerpoint/2010/main" Requires="p14">
+        <mc:AlternateContent xmlns:mc="http://schemas.openxmlformats.org/markup-compatibility/2006" xmlns:p14="http://schemas.microsoft.com/office/powerpoint/2010/main">
+          <mc:Choice Requires="p14">
             <p:contentPart p14:bwMode="auto" r:id="rId132">
               <p14:nvContentPartPr>
                 <p14:cNvPr id="1159" name="Ink 1158">
@@ -17724,7 +17771,7 @@
               </p14:xfrm>
             </p:contentPart>
           </mc:Choice>
-          <mc:Fallback>
+          <mc:Fallback xmlns="">
             <p:pic>
               <p:nvPicPr>
                 <p:cNvPr id="1159" name="Ink 1158">
@@ -17755,8 +17802,8 @@
             </p:pic>
           </mc:Fallback>
         </mc:AlternateContent>
-        <mc:AlternateContent xmlns:mc="http://schemas.openxmlformats.org/markup-compatibility/2006">
-          <mc:Choice xmlns:p14="http://schemas.microsoft.com/office/powerpoint/2010/main" Requires="p14">
+        <mc:AlternateContent xmlns:mc="http://schemas.openxmlformats.org/markup-compatibility/2006" xmlns:p14="http://schemas.microsoft.com/office/powerpoint/2010/main">
+          <mc:Choice Requires="p14">
             <p:contentPart p14:bwMode="auto" r:id="rId134">
               <p14:nvContentPartPr>
                 <p14:cNvPr id="1160" name="Ink 1159">
@@ -17775,7 +17822,7 @@
               </p14:xfrm>
             </p:contentPart>
           </mc:Choice>
-          <mc:Fallback>
+          <mc:Fallback xmlns="">
             <p:pic>
               <p:nvPicPr>
                 <p:cNvPr id="1160" name="Ink 1159">
@@ -17806,8 +17853,8 @@
             </p:pic>
           </mc:Fallback>
         </mc:AlternateContent>
-        <mc:AlternateContent xmlns:mc="http://schemas.openxmlformats.org/markup-compatibility/2006">
-          <mc:Choice xmlns:p14="http://schemas.microsoft.com/office/powerpoint/2010/main" Requires="p14">
+        <mc:AlternateContent xmlns:mc="http://schemas.openxmlformats.org/markup-compatibility/2006" xmlns:p14="http://schemas.microsoft.com/office/powerpoint/2010/main">
+          <mc:Choice Requires="p14">
             <p:contentPart p14:bwMode="auto" r:id="rId136">
               <p14:nvContentPartPr>
                 <p14:cNvPr id="1162" name="Ink 1161">
@@ -17826,7 +17873,7 @@
               </p14:xfrm>
             </p:contentPart>
           </mc:Choice>
-          <mc:Fallback>
+          <mc:Fallback xmlns="">
             <p:pic>
               <p:nvPicPr>
                 <p:cNvPr id="1162" name="Ink 1161">
@@ -18782,8 +18829,8 @@
           </a:p>
         </p:txBody>
       </p:sp>
-      <mc:AlternateContent xmlns:mc="http://schemas.openxmlformats.org/markup-compatibility/2006">
-        <mc:Choice xmlns:p14="http://schemas.microsoft.com/office/powerpoint/2010/main" Requires="p14">
+      <mc:AlternateContent xmlns:mc="http://schemas.openxmlformats.org/markup-compatibility/2006" xmlns:p14="http://schemas.microsoft.com/office/powerpoint/2010/main">
+        <mc:Choice Requires="p14">
           <p:contentPart p14:bwMode="auto" r:id="rId2">
             <p14:nvContentPartPr>
               <p14:cNvPr id="25" name="Ink 24">
@@ -18802,7 +18849,7 @@
             </p14:xfrm>
           </p:contentPart>
         </mc:Choice>
-        <mc:Fallback>
+        <mc:Fallback xmlns="">
           <p:pic>
             <p:nvPicPr>
               <p:cNvPr id="25" name="Ink 24">
@@ -18833,8 +18880,8 @@
           </p:pic>
         </mc:Fallback>
       </mc:AlternateContent>
-      <mc:AlternateContent xmlns:mc="http://schemas.openxmlformats.org/markup-compatibility/2006">
-        <mc:Choice xmlns:p14="http://schemas.microsoft.com/office/powerpoint/2010/main" Requires="p14">
+      <mc:AlternateContent xmlns:mc="http://schemas.openxmlformats.org/markup-compatibility/2006" xmlns:p14="http://schemas.microsoft.com/office/powerpoint/2010/main">
+        <mc:Choice Requires="p14">
           <p:contentPart p14:bwMode="auto" r:id="rId4">
             <p14:nvContentPartPr>
               <p14:cNvPr id="29" name="Ink 28">
@@ -18853,7 +18900,7 @@
             </p14:xfrm>
           </p:contentPart>
         </mc:Choice>
-        <mc:Fallback>
+        <mc:Fallback xmlns="">
           <p:pic>
             <p:nvPicPr>
               <p:cNvPr id="29" name="Ink 28">
@@ -18884,8 +18931,8 @@
           </p:pic>
         </mc:Fallback>
       </mc:AlternateContent>
-      <mc:AlternateContent xmlns:mc="http://schemas.openxmlformats.org/markup-compatibility/2006">
-        <mc:Choice xmlns:p14="http://schemas.microsoft.com/office/powerpoint/2010/main" Requires="p14">
+      <mc:AlternateContent xmlns:mc="http://schemas.openxmlformats.org/markup-compatibility/2006" xmlns:p14="http://schemas.microsoft.com/office/powerpoint/2010/main">
+        <mc:Choice Requires="p14">
           <p:contentPart p14:bwMode="auto" r:id="rId6">
             <p14:nvContentPartPr>
               <p14:cNvPr id="157" name="Ink 156">
@@ -18904,7 +18951,7 @@
             </p14:xfrm>
           </p:contentPart>
         </mc:Choice>
-        <mc:Fallback>
+        <mc:Fallback xmlns="">
           <p:pic>
             <p:nvPicPr>
               <p:cNvPr id="157" name="Ink 156">
@@ -18935,8 +18982,8 @@
           </p:pic>
         </mc:Fallback>
       </mc:AlternateContent>
-      <mc:AlternateContent xmlns:mc="http://schemas.openxmlformats.org/markup-compatibility/2006">
-        <mc:Choice xmlns:p14="http://schemas.microsoft.com/office/powerpoint/2010/main" Requires="p14">
+      <mc:AlternateContent xmlns:mc="http://schemas.openxmlformats.org/markup-compatibility/2006" xmlns:p14="http://schemas.microsoft.com/office/powerpoint/2010/main">
+        <mc:Choice Requires="p14">
           <p:contentPart p14:bwMode="auto" r:id="rId8">
             <p14:nvContentPartPr>
               <p14:cNvPr id="159" name="Ink 158">
@@ -18955,7 +19002,7 @@
             </p14:xfrm>
           </p:contentPart>
         </mc:Choice>
-        <mc:Fallback>
+        <mc:Fallback xmlns="">
           <p:pic>
             <p:nvPicPr>
               <p:cNvPr id="159" name="Ink 158">
@@ -18986,8 +19033,8 @@
           </p:pic>
         </mc:Fallback>
       </mc:AlternateContent>
-      <mc:AlternateContent xmlns:mc="http://schemas.openxmlformats.org/markup-compatibility/2006">
-        <mc:Choice xmlns:p14="http://schemas.microsoft.com/office/powerpoint/2010/main" Requires="p14">
+      <mc:AlternateContent xmlns:mc="http://schemas.openxmlformats.org/markup-compatibility/2006" xmlns:p14="http://schemas.microsoft.com/office/powerpoint/2010/main">
+        <mc:Choice Requires="p14">
           <p:contentPart p14:bwMode="auto" r:id="rId10">
             <p14:nvContentPartPr>
               <p14:cNvPr id="219" name="Ink 218">
@@ -19006,7 +19053,7 @@
             </p14:xfrm>
           </p:contentPart>
         </mc:Choice>
-        <mc:Fallback>
+        <mc:Fallback xmlns="">
           <p:pic>
             <p:nvPicPr>
               <p:cNvPr id="219" name="Ink 218">
@@ -19057,8 +19104,8 @@
             <a:chExt cx="10808280" cy="6744240"/>
           </a:xfrm>
         </p:grpSpPr>
-        <mc:AlternateContent xmlns:mc="http://schemas.openxmlformats.org/markup-compatibility/2006">
-          <mc:Choice xmlns:p14="http://schemas.microsoft.com/office/powerpoint/2010/main" Requires="p14">
+        <mc:AlternateContent xmlns:mc="http://schemas.openxmlformats.org/markup-compatibility/2006" xmlns:p14="http://schemas.microsoft.com/office/powerpoint/2010/main">
+          <mc:Choice Requires="p14">
             <p:contentPart p14:bwMode="auto" r:id="rId12">
               <p14:nvContentPartPr>
                 <p14:cNvPr id="161" name="Ink 160">
@@ -19077,7 +19124,7 @@
               </p14:xfrm>
             </p:contentPart>
           </mc:Choice>
-          <mc:Fallback>
+          <mc:Fallback xmlns="">
             <p:pic>
               <p:nvPicPr>
                 <p:cNvPr id="161" name="Ink 160">
@@ -19108,8 +19155,8 @@
             </p:pic>
           </mc:Fallback>
         </mc:AlternateContent>
-        <mc:AlternateContent xmlns:mc="http://schemas.openxmlformats.org/markup-compatibility/2006">
-          <mc:Choice xmlns:p14="http://schemas.microsoft.com/office/powerpoint/2010/main" Requires="p14">
+        <mc:AlternateContent xmlns:mc="http://schemas.openxmlformats.org/markup-compatibility/2006" xmlns:p14="http://schemas.microsoft.com/office/powerpoint/2010/main">
+          <mc:Choice Requires="p14">
             <p:contentPart p14:bwMode="auto" r:id="rId14">
               <p14:nvContentPartPr>
                 <p14:cNvPr id="162" name="Ink 161">
@@ -19128,7 +19175,7 @@
               </p14:xfrm>
             </p:contentPart>
           </mc:Choice>
-          <mc:Fallback>
+          <mc:Fallback xmlns="">
             <p:pic>
               <p:nvPicPr>
                 <p:cNvPr id="162" name="Ink 161">
@@ -19159,8 +19206,8 @@
             </p:pic>
           </mc:Fallback>
         </mc:AlternateContent>
-        <mc:AlternateContent xmlns:mc="http://schemas.openxmlformats.org/markup-compatibility/2006">
-          <mc:Choice xmlns:p14="http://schemas.microsoft.com/office/powerpoint/2010/main" Requires="p14">
+        <mc:AlternateContent xmlns:mc="http://schemas.openxmlformats.org/markup-compatibility/2006" xmlns:p14="http://schemas.microsoft.com/office/powerpoint/2010/main">
+          <mc:Choice Requires="p14">
             <p:contentPart p14:bwMode="auto" r:id="rId16">
               <p14:nvContentPartPr>
                 <p14:cNvPr id="163" name="Ink 162">
@@ -19179,7 +19226,7 @@
               </p14:xfrm>
             </p:contentPart>
           </mc:Choice>
-          <mc:Fallback>
+          <mc:Fallback xmlns="">
             <p:pic>
               <p:nvPicPr>
                 <p:cNvPr id="163" name="Ink 162">
@@ -19210,8 +19257,8 @@
             </p:pic>
           </mc:Fallback>
         </mc:AlternateContent>
-        <mc:AlternateContent xmlns:mc="http://schemas.openxmlformats.org/markup-compatibility/2006">
-          <mc:Choice xmlns:p14="http://schemas.microsoft.com/office/powerpoint/2010/main" Requires="p14">
+        <mc:AlternateContent xmlns:mc="http://schemas.openxmlformats.org/markup-compatibility/2006" xmlns:p14="http://schemas.microsoft.com/office/powerpoint/2010/main">
+          <mc:Choice Requires="p14">
             <p:contentPart p14:bwMode="auto" r:id="rId18">
               <p14:nvContentPartPr>
                 <p14:cNvPr id="164" name="Ink 163">
@@ -19230,7 +19277,7 @@
               </p14:xfrm>
             </p:contentPart>
           </mc:Choice>
-          <mc:Fallback>
+          <mc:Fallback xmlns="">
             <p:pic>
               <p:nvPicPr>
                 <p:cNvPr id="164" name="Ink 163">
@@ -19261,8 +19308,8 @@
             </p:pic>
           </mc:Fallback>
         </mc:AlternateContent>
-        <mc:AlternateContent xmlns:mc="http://schemas.openxmlformats.org/markup-compatibility/2006">
-          <mc:Choice xmlns:p14="http://schemas.microsoft.com/office/powerpoint/2010/main" Requires="p14">
+        <mc:AlternateContent xmlns:mc="http://schemas.openxmlformats.org/markup-compatibility/2006" xmlns:p14="http://schemas.microsoft.com/office/powerpoint/2010/main">
+          <mc:Choice Requires="p14">
             <p:contentPart p14:bwMode="auto" r:id="rId20">
               <p14:nvContentPartPr>
                 <p14:cNvPr id="165" name="Ink 164">
@@ -19281,7 +19328,7 @@
               </p14:xfrm>
             </p:contentPart>
           </mc:Choice>
-          <mc:Fallback>
+          <mc:Fallback xmlns="">
             <p:pic>
               <p:nvPicPr>
                 <p:cNvPr id="165" name="Ink 164">
@@ -19312,8 +19359,8 @@
             </p:pic>
           </mc:Fallback>
         </mc:AlternateContent>
-        <mc:AlternateContent xmlns:mc="http://schemas.openxmlformats.org/markup-compatibility/2006">
-          <mc:Choice xmlns:p14="http://schemas.microsoft.com/office/powerpoint/2010/main" Requires="p14">
+        <mc:AlternateContent xmlns:mc="http://schemas.openxmlformats.org/markup-compatibility/2006" xmlns:p14="http://schemas.microsoft.com/office/powerpoint/2010/main">
+          <mc:Choice Requires="p14">
             <p:contentPart p14:bwMode="auto" r:id="rId22">
               <p14:nvContentPartPr>
                 <p14:cNvPr id="166" name="Ink 165">
@@ -19332,7 +19379,7 @@
               </p14:xfrm>
             </p:contentPart>
           </mc:Choice>
-          <mc:Fallback>
+          <mc:Fallback xmlns="">
             <p:pic>
               <p:nvPicPr>
                 <p:cNvPr id="166" name="Ink 165">
@@ -19363,8 +19410,8 @@
             </p:pic>
           </mc:Fallback>
         </mc:AlternateContent>
-        <mc:AlternateContent xmlns:mc="http://schemas.openxmlformats.org/markup-compatibility/2006">
-          <mc:Choice xmlns:p14="http://schemas.microsoft.com/office/powerpoint/2010/main" Requires="p14">
+        <mc:AlternateContent xmlns:mc="http://schemas.openxmlformats.org/markup-compatibility/2006" xmlns:p14="http://schemas.microsoft.com/office/powerpoint/2010/main">
+          <mc:Choice Requires="p14">
             <p:contentPart p14:bwMode="auto" r:id="rId24">
               <p14:nvContentPartPr>
                 <p14:cNvPr id="168" name="Ink 167">
@@ -19383,7 +19430,7 @@
               </p14:xfrm>
             </p:contentPart>
           </mc:Choice>
-          <mc:Fallback>
+          <mc:Fallback xmlns="">
             <p:pic>
               <p:nvPicPr>
                 <p:cNvPr id="168" name="Ink 167">
@@ -19414,8 +19461,8 @@
             </p:pic>
           </mc:Fallback>
         </mc:AlternateContent>
-        <mc:AlternateContent xmlns:mc="http://schemas.openxmlformats.org/markup-compatibility/2006">
-          <mc:Choice xmlns:p14="http://schemas.microsoft.com/office/powerpoint/2010/main" Requires="p14">
+        <mc:AlternateContent xmlns:mc="http://schemas.openxmlformats.org/markup-compatibility/2006" xmlns:p14="http://schemas.microsoft.com/office/powerpoint/2010/main">
+          <mc:Choice Requires="p14">
             <p:contentPart p14:bwMode="auto" r:id="rId26">
               <p14:nvContentPartPr>
                 <p14:cNvPr id="169" name="Ink 168">
@@ -19434,7 +19481,7 @@
               </p14:xfrm>
             </p:contentPart>
           </mc:Choice>
-          <mc:Fallback>
+          <mc:Fallback xmlns="">
             <p:pic>
               <p:nvPicPr>
                 <p:cNvPr id="169" name="Ink 168">
@@ -19465,8 +19512,8 @@
             </p:pic>
           </mc:Fallback>
         </mc:AlternateContent>
-        <mc:AlternateContent xmlns:mc="http://schemas.openxmlformats.org/markup-compatibility/2006">
-          <mc:Choice xmlns:p14="http://schemas.microsoft.com/office/powerpoint/2010/main" Requires="p14">
+        <mc:AlternateContent xmlns:mc="http://schemas.openxmlformats.org/markup-compatibility/2006" xmlns:p14="http://schemas.microsoft.com/office/powerpoint/2010/main">
+          <mc:Choice Requires="p14">
             <p:contentPart p14:bwMode="auto" r:id="rId28">
               <p14:nvContentPartPr>
                 <p14:cNvPr id="170" name="Ink 169">
@@ -19485,7 +19532,7 @@
               </p14:xfrm>
             </p:contentPart>
           </mc:Choice>
-          <mc:Fallback>
+          <mc:Fallback xmlns="">
             <p:pic>
               <p:nvPicPr>
                 <p:cNvPr id="170" name="Ink 169">
@@ -19516,8 +19563,8 @@
             </p:pic>
           </mc:Fallback>
         </mc:AlternateContent>
-        <mc:AlternateContent xmlns:mc="http://schemas.openxmlformats.org/markup-compatibility/2006">
-          <mc:Choice xmlns:p14="http://schemas.microsoft.com/office/powerpoint/2010/main" Requires="p14">
+        <mc:AlternateContent xmlns:mc="http://schemas.openxmlformats.org/markup-compatibility/2006" xmlns:p14="http://schemas.microsoft.com/office/powerpoint/2010/main">
+          <mc:Choice Requires="p14">
             <p:contentPart p14:bwMode="auto" r:id="rId30">
               <p14:nvContentPartPr>
                 <p14:cNvPr id="171" name="Ink 170">
@@ -19536,7 +19583,7 @@
               </p14:xfrm>
             </p:contentPart>
           </mc:Choice>
-          <mc:Fallback>
+          <mc:Fallback xmlns="">
             <p:pic>
               <p:nvPicPr>
                 <p:cNvPr id="171" name="Ink 170">
@@ -19567,8 +19614,8 @@
             </p:pic>
           </mc:Fallback>
         </mc:AlternateContent>
-        <mc:AlternateContent xmlns:mc="http://schemas.openxmlformats.org/markup-compatibility/2006">
-          <mc:Choice xmlns:p14="http://schemas.microsoft.com/office/powerpoint/2010/main" Requires="p14">
+        <mc:AlternateContent xmlns:mc="http://schemas.openxmlformats.org/markup-compatibility/2006" xmlns:p14="http://schemas.microsoft.com/office/powerpoint/2010/main">
+          <mc:Choice Requires="p14">
             <p:contentPart p14:bwMode="auto" r:id="rId32">
               <p14:nvContentPartPr>
                 <p14:cNvPr id="173" name="Ink 172">
@@ -19587,7 +19634,7 @@
               </p14:xfrm>
             </p:contentPart>
           </mc:Choice>
-          <mc:Fallback>
+          <mc:Fallback xmlns="">
             <p:pic>
               <p:nvPicPr>
                 <p:cNvPr id="173" name="Ink 172">
@@ -19618,8 +19665,8 @@
             </p:pic>
           </mc:Fallback>
         </mc:AlternateContent>
-        <mc:AlternateContent xmlns:mc="http://schemas.openxmlformats.org/markup-compatibility/2006">
-          <mc:Choice xmlns:p14="http://schemas.microsoft.com/office/powerpoint/2010/main" Requires="p14">
+        <mc:AlternateContent xmlns:mc="http://schemas.openxmlformats.org/markup-compatibility/2006" xmlns:p14="http://schemas.microsoft.com/office/powerpoint/2010/main">
+          <mc:Choice Requires="p14">
             <p:contentPart p14:bwMode="auto" r:id="rId34">
               <p14:nvContentPartPr>
                 <p14:cNvPr id="174" name="Ink 173">
@@ -19638,7 +19685,7 @@
               </p14:xfrm>
             </p:contentPart>
           </mc:Choice>
-          <mc:Fallback>
+          <mc:Fallback xmlns="">
             <p:pic>
               <p:nvPicPr>
                 <p:cNvPr id="174" name="Ink 173">
@@ -19669,8 +19716,8 @@
             </p:pic>
           </mc:Fallback>
         </mc:AlternateContent>
-        <mc:AlternateContent xmlns:mc="http://schemas.openxmlformats.org/markup-compatibility/2006">
-          <mc:Choice xmlns:p14="http://schemas.microsoft.com/office/powerpoint/2010/main" Requires="p14">
+        <mc:AlternateContent xmlns:mc="http://schemas.openxmlformats.org/markup-compatibility/2006" xmlns:p14="http://schemas.microsoft.com/office/powerpoint/2010/main">
+          <mc:Choice Requires="p14">
             <p:contentPart p14:bwMode="auto" r:id="rId36">
               <p14:nvContentPartPr>
                 <p14:cNvPr id="175" name="Ink 174">
@@ -19689,7 +19736,7 @@
               </p14:xfrm>
             </p:contentPart>
           </mc:Choice>
-          <mc:Fallback>
+          <mc:Fallback xmlns="">
             <p:pic>
               <p:nvPicPr>
                 <p:cNvPr id="175" name="Ink 174">
@@ -19720,8 +19767,8 @@
             </p:pic>
           </mc:Fallback>
         </mc:AlternateContent>
-        <mc:AlternateContent xmlns:mc="http://schemas.openxmlformats.org/markup-compatibility/2006">
-          <mc:Choice xmlns:p14="http://schemas.microsoft.com/office/powerpoint/2010/main" Requires="p14">
+        <mc:AlternateContent xmlns:mc="http://schemas.openxmlformats.org/markup-compatibility/2006" xmlns:p14="http://schemas.microsoft.com/office/powerpoint/2010/main">
+          <mc:Choice Requires="p14">
             <p:contentPart p14:bwMode="auto" r:id="rId38">
               <p14:nvContentPartPr>
                 <p14:cNvPr id="176" name="Ink 175">
@@ -19740,7 +19787,7 @@
               </p14:xfrm>
             </p:contentPart>
           </mc:Choice>
-          <mc:Fallback>
+          <mc:Fallback xmlns="">
             <p:pic>
               <p:nvPicPr>
                 <p:cNvPr id="176" name="Ink 175">
@@ -19771,8 +19818,8 @@
             </p:pic>
           </mc:Fallback>
         </mc:AlternateContent>
-        <mc:AlternateContent xmlns:mc="http://schemas.openxmlformats.org/markup-compatibility/2006">
-          <mc:Choice xmlns:p14="http://schemas.microsoft.com/office/powerpoint/2010/main" Requires="p14">
+        <mc:AlternateContent xmlns:mc="http://schemas.openxmlformats.org/markup-compatibility/2006" xmlns:p14="http://schemas.microsoft.com/office/powerpoint/2010/main">
+          <mc:Choice Requires="p14">
             <p:contentPart p14:bwMode="auto" r:id="rId40">
               <p14:nvContentPartPr>
                 <p14:cNvPr id="177" name="Ink 176">
@@ -19791,7 +19838,7 @@
               </p14:xfrm>
             </p:contentPart>
           </mc:Choice>
-          <mc:Fallback>
+          <mc:Fallback xmlns="">
             <p:pic>
               <p:nvPicPr>
                 <p:cNvPr id="177" name="Ink 176">
@@ -19822,8 +19869,8 @@
             </p:pic>
           </mc:Fallback>
         </mc:AlternateContent>
-        <mc:AlternateContent xmlns:mc="http://schemas.openxmlformats.org/markup-compatibility/2006">
-          <mc:Choice xmlns:p14="http://schemas.microsoft.com/office/powerpoint/2010/main" Requires="p14">
+        <mc:AlternateContent xmlns:mc="http://schemas.openxmlformats.org/markup-compatibility/2006" xmlns:p14="http://schemas.microsoft.com/office/powerpoint/2010/main">
+          <mc:Choice Requires="p14">
             <p:contentPart p14:bwMode="auto" r:id="rId42">
               <p14:nvContentPartPr>
                 <p14:cNvPr id="178" name="Ink 177">
@@ -19842,7 +19889,7 @@
               </p14:xfrm>
             </p:contentPart>
           </mc:Choice>
-          <mc:Fallback>
+          <mc:Fallback xmlns="">
             <p:pic>
               <p:nvPicPr>
                 <p:cNvPr id="178" name="Ink 177">
@@ -19873,8 +19920,8 @@
             </p:pic>
           </mc:Fallback>
         </mc:AlternateContent>
-        <mc:AlternateContent xmlns:mc="http://schemas.openxmlformats.org/markup-compatibility/2006">
-          <mc:Choice xmlns:p14="http://schemas.microsoft.com/office/powerpoint/2010/main" Requires="p14">
+        <mc:AlternateContent xmlns:mc="http://schemas.openxmlformats.org/markup-compatibility/2006" xmlns:p14="http://schemas.microsoft.com/office/powerpoint/2010/main">
+          <mc:Choice Requires="p14">
             <p:contentPart p14:bwMode="auto" r:id="rId44">
               <p14:nvContentPartPr>
                 <p14:cNvPr id="180" name="Ink 179">
@@ -19893,7 +19940,7 @@
               </p14:xfrm>
             </p:contentPart>
           </mc:Choice>
-          <mc:Fallback>
+          <mc:Fallback xmlns="">
             <p:pic>
               <p:nvPicPr>
                 <p:cNvPr id="180" name="Ink 179">
@@ -19924,8 +19971,8 @@
             </p:pic>
           </mc:Fallback>
         </mc:AlternateContent>
-        <mc:AlternateContent xmlns:mc="http://schemas.openxmlformats.org/markup-compatibility/2006">
-          <mc:Choice xmlns:p14="http://schemas.microsoft.com/office/powerpoint/2010/main" Requires="p14">
+        <mc:AlternateContent xmlns:mc="http://schemas.openxmlformats.org/markup-compatibility/2006" xmlns:p14="http://schemas.microsoft.com/office/powerpoint/2010/main">
+          <mc:Choice Requires="p14">
             <p:contentPart p14:bwMode="auto" r:id="rId46">
               <p14:nvContentPartPr>
                 <p14:cNvPr id="216" name="Ink 215">
@@ -19944,7 +19991,7 @@
               </p14:xfrm>
             </p:contentPart>
           </mc:Choice>
-          <mc:Fallback>
+          <mc:Fallback xmlns="">
             <p:pic>
               <p:nvPicPr>
                 <p:cNvPr id="216" name="Ink 215">
@@ -19975,8 +20022,8 @@
             </p:pic>
           </mc:Fallback>
         </mc:AlternateContent>
-        <mc:AlternateContent xmlns:mc="http://schemas.openxmlformats.org/markup-compatibility/2006">
-          <mc:Choice xmlns:p14="http://schemas.microsoft.com/office/powerpoint/2010/main" Requires="p14">
+        <mc:AlternateContent xmlns:mc="http://schemas.openxmlformats.org/markup-compatibility/2006" xmlns:p14="http://schemas.microsoft.com/office/powerpoint/2010/main">
+          <mc:Choice Requires="p14">
             <p:contentPart p14:bwMode="auto" r:id="rId48">
               <p14:nvContentPartPr>
                 <p14:cNvPr id="217" name="Ink 216">
@@ -19995,7 +20042,7 @@
               </p14:xfrm>
             </p:contentPart>
           </mc:Choice>
-          <mc:Fallback>
+          <mc:Fallback xmlns="">
             <p:pic>
               <p:nvPicPr>
                 <p:cNvPr id="217" name="Ink 216">
@@ -20026,8 +20073,8 @@
             </p:pic>
           </mc:Fallback>
         </mc:AlternateContent>
-        <mc:AlternateContent xmlns:mc="http://schemas.openxmlformats.org/markup-compatibility/2006">
-          <mc:Choice xmlns:p14="http://schemas.microsoft.com/office/powerpoint/2010/main" Requires="p14">
+        <mc:AlternateContent xmlns:mc="http://schemas.openxmlformats.org/markup-compatibility/2006" xmlns:p14="http://schemas.microsoft.com/office/powerpoint/2010/main">
+          <mc:Choice Requires="p14">
             <p:contentPart p14:bwMode="auto" r:id="rId50">
               <p14:nvContentPartPr>
                 <p14:cNvPr id="154" name="Ink 153">
@@ -20046,7 +20093,7 @@
               </p14:xfrm>
             </p:contentPart>
           </mc:Choice>
-          <mc:Fallback>
+          <mc:Fallback xmlns="">
             <p:pic>
               <p:nvPicPr>
                 <p:cNvPr id="154" name="Ink 153">
@@ -20077,8 +20124,8 @@
             </p:pic>
           </mc:Fallback>
         </mc:AlternateContent>
-        <mc:AlternateContent xmlns:mc="http://schemas.openxmlformats.org/markup-compatibility/2006">
-          <mc:Choice xmlns:p14="http://schemas.microsoft.com/office/powerpoint/2010/main" Requires="p14">
+        <mc:AlternateContent xmlns:mc="http://schemas.openxmlformats.org/markup-compatibility/2006" xmlns:p14="http://schemas.microsoft.com/office/powerpoint/2010/main">
+          <mc:Choice Requires="p14">
             <p:contentPart p14:bwMode="auto" r:id="rId52">
               <p14:nvContentPartPr>
                 <p14:cNvPr id="155" name="Ink 154">
@@ -20097,7 +20144,7 @@
               </p14:xfrm>
             </p:contentPart>
           </mc:Choice>
-          <mc:Fallback>
+          <mc:Fallback xmlns="">
             <p:pic>
               <p:nvPicPr>
                 <p:cNvPr id="155" name="Ink 154">
@@ -20128,8 +20175,8 @@
             </p:pic>
           </mc:Fallback>
         </mc:AlternateContent>
-        <mc:AlternateContent xmlns:mc="http://schemas.openxmlformats.org/markup-compatibility/2006">
-          <mc:Choice xmlns:p14="http://schemas.microsoft.com/office/powerpoint/2010/main" Requires="p14">
+        <mc:AlternateContent xmlns:mc="http://schemas.openxmlformats.org/markup-compatibility/2006" xmlns:p14="http://schemas.microsoft.com/office/powerpoint/2010/main">
+          <mc:Choice Requires="p14">
             <p:contentPart p14:bwMode="auto" r:id="rId54">
               <p14:nvContentPartPr>
                 <p14:cNvPr id="31" name="Ink 30">
@@ -20148,7 +20195,7 @@
               </p14:xfrm>
             </p:contentPart>
           </mc:Choice>
-          <mc:Fallback>
+          <mc:Fallback xmlns="">
             <p:pic>
               <p:nvPicPr>
                 <p:cNvPr id="31" name="Ink 30">
@@ -20179,8 +20226,8 @@
             </p:pic>
           </mc:Fallback>
         </mc:AlternateContent>
-        <mc:AlternateContent xmlns:mc="http://schemas.openxmlformats.org/markup-compatibility/2006">
-          <mc:Choice xmlns:p14="http://schemas.microsoft.com/office/powerpoint/2010/main" Requires="p14">
+        <mc:AlternateContent xmlns:mc="http://schemas.openxmlformats.org/markup-compatibility/2006" xmlns:p14="http://schemas.microsoft.com/office/powerpoint/2010/main">
+          <mc:Choice Requires="p14">
             <p:contentPart p14:bwMode="auto" r:id="rId56">
               <p14:nvContentPartPr>
                 <p14:cNvPr id="34" name="Ink 33">
@@ -20199,7 +20246,7 @@
               </p14:xfrm>
             </p:contentPart>
           </mc:Choice>
-          <mc:Fallback>
+          <mc:Fallback xmlns="">
             <p:pic>
               <p:nvPicPr>
                 <p:cNvPr id="34" name="Ink 33">
@@ -20230,8 +20277,8 @@
             </p:pic>
           </mc:Fallback>
         </mc:AlternateContent>
-        <mc:AlternateContent xmlns:mc="http://schemas.openxmlformats.org/markup-compatibility/2006">
-          <mc:Choice xmlns:p14="http://schemas.microsoft.com/office/powerpoint/2010/main" Requires="p14">
+        <mc:AlternateContent xmlns:mc="http://schemas.openxmlformats.org/markup-compatibility/2006" xmlns:p14="http://schemas.microsoft.com/office/powerpoint/2010/main">
+          <mc:Choice Requires="p14">
             <p:contentPart p14:bwMode="auto" r:id="rId58">
               <p14:nvContentPartPr>
                 <p14:cNvPr id="39" name="Ink 38">
@@ -20250,7 +20297,7 @@
               </p14:xfrm>
             </p:contentPart>
           </mc:Choice>
-          <mc:Fallback>
+          <mc:Fallback xmlns="">
             <p:pic>
               <p:nvPicPr>
                 <p:cNvPr id="39" name="Ink 38">
@@ -20281,8 +20328,8 @@
             </p:pic>
           </mc:Fallback>
         </mc:AlternateContent>
-        <mc:AlternateContent xmlns:mc="http://schemas.openxmlformats.org/markup-compatibility/2006">
-          <mc:Choice xmlns:p14="http://schemas.microsoft.com/office/powerpoint/2010/main" Requires="p14">
+        <mc:AlternateContent xmlns:mc="http://schemas.openxmlformats.org/markup-compatibility/2006" xmlns:p14="http://schemas.microsoft.com/office/powerpoint/2010/main">
+          <mc:Choice Requires="p14">
             <p:contentPart p14:bwMode="auto" r:id="rId60">
               <p14:nvContentPartPr>
                 <p14:cNvPr id="46" name="Ink 45">
@@ -20301,7 +20348,7 @@
               </p14:xfrm>
             </p:contentPart>
           </mc:Choice>
-          <mc:Fallback>
+          <mc:Fallback xmlns="">
             <p:pic>
               <p:nvPicPr>
                 <p:cNvPr id="46" name="Ink 45">
@@ -20332,8 +20379,8 @@
             </p:pic>
           </mc:Fallback>
         </mc:AlternateContent>
-        <mc:AlternateContent xmlns:mc="http://schemas.openxmlformats.org/markup-compatibility/2006">
-          <mc:Choice xmlns:p14="http://schemas.microsoft.com/office/powerpoint/2010/main" Requires="p14">
+        <mc:AlternateContent xmlns:mc="http://schemas.openxmlformats.org/markup-compatibility/2006" xmlns:p14="http://schemas.microsoft.com/office/powerpoint/2010/main">
+          <mc:Choice Requires="p14">
             <p:contentPart p14:bwMode="auto" r:id="rId62">
               <p14:nvContentPartPr>
                 <p14:cNvPr id="48" name="Ink 47">
@@ -20352,7 +20399,7 @@
               </p14:xfrm>
             </p:contentPart>
           </mc:Choice>
-          <mc:Fallback>
+          <mc:Fallback xmlns="">
             <p:pic>
               <p:nvPicPr>
                 <p:cNvPr id="48" name="Ink 47">
@@ -20383,8 +20430,8 @@
             </p:pic>
           </mc:Fallback>
         </mc:AlternateContent>
-        <mc:AlternateContent xmlns:mc="http://schemas.openxmlformats.org/markup-compatibility/2006">
-          <mc:Choice xmlns:p14="http://schemas.microsoft.com/office/powerpoint/2010/main" Requires="p14">
+        <mc:AlternateContent xmlns:mc="http://schemas.openxmlformats.org/markup-compatibility/2006" xmlns:p14="http://schemas.microsoft.com/office/powerpoint/2010/main">
+          <mc:Choice Requires="p14">
             <p:contentPart p14:bwMode="auto" r:id="rId64">
               <p14:nvContentPartPr>
                 <p14:cNvPr id="50" name="Ink 49">
@@ -20403,7 +20450,7 @@
               </p14:xfrm>
             </p:contentPart>
           </mc:Choice>
-          <mc:Fallback>
+          <mc:Fallback xmlns="">
             <p:pic>
               <p:nvPicPr>
                 <p:cNvPr id="50" name="Ink 49">
@@ -20434,8 +20481,8 @@
             </p:pic>
           </mc:Fallback>
         </mc:AlternateContent>
-        <mc:AlternateContent xmlns:mc="http://schemas.openxmlformats.org/markup-compatibility/2006">
-          <mc:Choice xmlns:p14="http://schemas.microsoft.com/office/powerpoint/2010/main" Requires="p14">
+        <mc:AlternateContent xmlns:mc="http://schemas.openxmlformats.org/markup-compatibility/2006" xmlns:p14="http://schemas.microsoft.com/office/powerpoint/2010/main">
+          <mc:Choice Requires="p14">
             <p:contentPart p14:bwMode="auto" r:id="rId66">
               <p14:nvContentPartPr>
                 <p14:cNvPr id="56" name="Ink 55">
@@ -20454,7 +20501,7 @@
               </p14:xfrm>
             </p:contentPart>
           </mc:Choice>
-          <mc:Fallback>
+          <mc:Fallback xmlns="">
             <p:pic>
               <p:nvPicPr>
                 <p:cNvPr id="56" name="Ink 55">
@@ -20485,8 +20532,8 @@
             </p:pic>
           </mc:Fallback>
         </mc:AlternateContent>
-        <mc:AlternateContent xmlns:mc="http://schemas.openxmlformats.org/markup-compatibility/2006">
-          <mc:Choice xmlns:p14="http://schemas.microsoft.com/office/powerpoint/2010/main" Requires="p14">
+        <mc:AlternateContent xmlns:mc="http://schemas.openxmlformats.org/markup-compatibility/2006" xmlns:p14="http://schemas.microsoft.com/office/powerpoint/2010/main">
+          <mc:Choice Requires="p14">
             <p:contentPart p14:bwMode="auto" r:id="rId68">
               <p14:nvContentPartPr>
                 <p14:cNvPr id="58" name="Ink 57">
@@ -20505,7 +20552,7 @@
               </p14:xfrm>
             </p:contentPart>
           </mc:Choice>
-          <mc:Fallback>
+          <mc:Fallback xmlns="">
             <p:pic>
               <p:nvPicPr>
                 <p:cNvPr id="58" name="Ink 57">
@@ -20536,8 +20583,8 @@
             </p:pic>
           </mc:Fallback>
         </mc:AlternateContent>
-        <mc:AlternateContent xmlns:mc="http://schemas.openxmlformats.org/markup-compatibility/2006">
-          <mc:Choice xmlns:p14="http://schemas.microsoft.com/office/powerpoint/2010/main" Requires="p14">
+        <mc:AlternateContent xmlns:mc="http://schemas.openxmlformats.org/markup-compatibility/2006" xmlns:p14="http://schemas.microsoft.com/office/powerpoint/2010/main">
+          <mc:Choice Requires="p14">
             <p:contentPart p14:bwMode="auto" r:id="rId70">
               <p14:nvContentPartPr>
                 <p14:cNvPr id="61" name="Ink 60">
@@ -20556,7 +20603,7 @@
               </p14:xfrm>
             </p:contentPart>
           </mc:Choice>
-          <mc:Fallback>
+          <mc:Fallback xmlns="">
             <p:pic>
               <p:nvPicPr>
                 <p:cNvPr id="61" name="Ink 60">
@@ -20587,8 +20634,8 @@
             </p:pic>
           </mc:Fallback>
         </mc:AlternateContent>
-        <mc:AlternateContent xmlns:mc="http://schemas.openxmlformats.org/markup-compatibility/2006">
-          <mc:Choice xmlns:p14="http://schemas.microsoft.com/office/powerpoint/2010/main" Requires="p14">
+        <mc:AlternateContent xmlns:mc="http://schemas.openxmlformats.org/markup-compatibility/2006" xmlns:p14="http://schemas.microsoft.com/office/powerpoint/2010/main">
+          <mc:Choice Requires="p14">
             <p:contentPart p14:bwMode="auto" r:id="rId72">
               <p14:nvContentPartPr>
                 <p14:cNvPr id="63" name="Ink 62">
@@ -20607,7 +20654,7 @@
               </p14:xfrm>
             </p:contentPart>
           </mc:Choice>
-          <mc:Fallback>
+          <mc:Fallback xmlns="">
             <p:pic>
               <p:nvPicPr>
                 <p:cNvPr id="63" name="Ink 62">
@@ -20638,8 +20685,8 @@
             </p:pic>
           </mc:Fallback>
         </mc:AlternateContent>
-        <mc:AlternateContent xmlns:mc="http://schemas.openxmlformats.org/markup-compatibility/2006">
-          <mc:Choice xmlns:p14="http://schemas.microsoft.com/office/powerpoint/2010/main" Requires="p14">
+        <mc:AlternateContent xmlns:mc="http://schemas.openxmlformats.org/markup-compatibility/2006" xmlns:p14="http://schemas.microsoft.com/office/powerpoint/2010/main">
+          <mc:Choice Requires="p14">
             <p:contentPart p14:bwMode="auto" r:id="rId74">
               <p14:nvContentPartPr>
                 <p14:cNvPr id="65" name="Ink 64">
@@ -20658,7 +20705,7 @@
               </p14:xfrm>
             </p:contentPart>
           </mc:Choice>
-          <mc:Fallback>
+          <mc:Fallback xmlns="">
             <p:pic>
               <p:nvPicPr>
                 <p:cNvPr id="65" name="Ink 64">
@@ -20689,8 +20736,8 @@
             </p:pic>
           </mc:Fallback>
         </mc:AlternateContent>
-        <mc:AlternateContent xmlns:mc="http://schemas.openxmlformats.org/markup-compatibility/2006">
-          <mc:Choice xmlns:p14="http://schemas.microsoft.com/office/powerpoint/2010/main" Requires="p14">
+        <mc:AlternateContent xmlns:mc="http://schemas.openxmlformats.org/markup-compatibility/2006" xmlns:p14="http://schemas.microsoft.com/office/powerpoint/2010/main">
+          <mc:Choice Requires="p14">
             <p:contentPart p14:bwMode="auto" r:id="rId76">
               <p14:nvContentPartPr>
                 <p14:cNvPr id="69" name="Ink 68">
@@ -20709,7 +20756,7 @@
               </p14:xfrm>
             </p:contentPart>
           </mc:Choice>
-          <mc:Fallback>
+          <mc:Fallback xmlns="">
             <p:pic>
               <p:nvPicPr>
                 <p:cNvPr id="69" name="Ink 68">
@@ -20740,8 +20787,8 @@
             </p:pic>
           </mc:Fallback>
         </mc:AlternateContent>
-        <mc:AlternateContent xmlns:mc="http://schemas.openxmlformats.org/markup-compatibility/2006">
-          <mc:Choice xmlns:p14="http://schemas.microsoft.com/office/powerpoint/2010/main" Requires="p14">
+        <mc:AlternateContent xmlns:mc="http://schemas.openxmlformats.org/markup-compatibility/2006" xmlns:p14="http://schemas.microsoft.com/office/powerpoint/2010/main">
+          <mc:Choice Requires="p14">
             <p:contentPart p14:bwMode="auto" r:id="rId78">
               <p14:nvContentPartPr>
                 <p14:cNvPr id="72" name="Ink 71">
@@ -20760,7 +20807,7 @@
               </p14:xfrm>
             </p:contentPart>
           </mc:Choice>
-          <mc:Fallback>
+          <mc:Fallback xmlns="">
             <p:pic>
               <p:nvPicPr>
                 <p:cNvPr id="72" name="Ink 71">
@@ -20791,8 +20838,8 @@
             </p:pic>
           </mc:Fallback>
         </mc:AlternateContent>
-        <mc:AlternateContent xmlns:mc="http://schemas.openxmlformats.org/markup-compatibility/2006">
-          <mc:Choice xmlns:p14="http://schemas.microsoft.com/office/powerpoint/2010/main" Requires="p14">
+        <mc:AlternateContent xmlns:mc="http://schemas.openxmlformats.org/markup-compatibility/2006" xmlns:p14="http://schemas.microsoft.com/office/powerpoint/2010/main">
+          <mc:Choice Requires="p14">
             <p:contentPart p14:bwMode="auto" r:id="rId80">
               <p14:nvContentPartPr>
                 <p14:cNvPr id="75" name="Ink 74">
@@ -20811,7 +20858,7 @@
               </p14:xfrm>
             </p:contentPart>
           </mc:Choice>
-          <mc:Fallback>
+          <mc:Fallback xmlns="">
             <p:pic>
               <p:nvPicPr>
                 <p:cNvPr id="75" name="Ink 74">
@@ -20842,8 +20889,8 @@
             </p:pic>
           </mc:Fallback>
         </mc:AlternateContent>
-        <mc:AlternateContent xmlns:mc="http://schemas.openxmlformats.org/markup-compatibility/2006">
-          <mc:Choice xmlns:p14="http://schemas.microsoft.com/office/powerpoint/2010/main" Requires="p14">
+        <mc:AlternateContent xmlns:mc="http://schemas.openxmlformats.org/markup-compatibility/2006" xmlns:p14="http://schemas.microsoft.com/office/powerpoint/2010/main">
+          <mc:Choice Requires="p14">
             <p:contentPart p14:bwMode="auto" r:id="rId82">
               <p14:nvContentPartPr>
                 <p14:cNvPr id="82" name="Ink 81">
@@ -20862,7 +20909,7 @@
               </p14:xfrm>
             </p:contentPart>
           </mc:Choice>
-          <mc:Fallback>
+          <mc:Fallback xmlns="">
             <p:pic>
               <p:nvPicPr>
                 <p:cNvPr id="82" name="Ink 81">
@@ -20893,8 +20940,8 @@
             </p:pic>
           </mc:Fallback>
         </mc:AlternateContent>
-        <mc:AlternateContent xmlns:mc="http://schemas.openxmlformats.org/markup-compatibility/2006">
-          <mc:Choice xmlns:p14="http://schemas.microsoft.com/office/powerpoint/2010/main" Requires="p14">
+        <mc:AlternateContent xmlns:mc="http://schemas.openxmlformats.org/markup-compatibility/2006" xmlns:p14="http://schemas.microsoft.com/office/powerpoint/2010/main">
+          <mc:Choice Requires="p14">
             <p:contentPart p14:bwMode="auto" r:id="rId84">
               <p14:nvContentPartPr>
                 <p14:cNvPr id="85" name="Ink 84">
@@ -20913,7 +20960,7 @@
               </p14:xfrm>
             </p:contentPart>
           </mc:Choice>
-          <mc:Fallback>
+          <mc:Fallback xmlns="">
             <p:pic>
               <p:nvPicPr>
                 <p:cNvPr id="85" name="Ink 84">
@@ -20944,8 +20991,8 @@
             </p:pic>
           </mc:Fallback>
         </mc:AlternateContent>
-        <mc:AlternateContent xmlns:mc="http://schemas.openxmlformats.org/markup-compatibility/2006">
-          <mc:Choice xmlns:p14="http://schemas.microsoft.com/office/powerpoint/2010/main" Requires="p14">
+        <mc:AlternateContent xmlns:mc="http://schemas.openxmlformats.org/markup-compatibility/2006" xmlns:p14="http://schemas.microsoft.com/office/powerpoint/2010/main">
+          <mc:Choice Requires="p14">
             <p:contentPart p14:bwMode="auto" r:id="rId86">
               <p14:nvContentPartPr>
                 <p14:cNvPr id="96" name="Ink 95">
@@ -20964,7 +21011,7 @@
               </p14:xfrm>
             </p:contentPart>
           </mc:Choice>
-          <mc:Fallback>
+          <mc:Fallback xmlns="">
             <p:pic>
               <p:nvPicPr>
                 <p:cNvPr id="96" name="Ink 95">
@@ -20995,8 +21042,8 @@
             </p:pic>
           </mc:Fallback>
         </mc:AlternateContent>
-        <mc:AlternateContent xmlns:mc="http://schemas.openxmlformats.org/markup-compatibility/2006">
-          <mc:Choice xmlns:p14="http://schemas.microsoft.com/office/powerpoint/2010/main" Requires="p14">
+        <mc:AlternateContent xmlns:mc="http://schemas.openxmlformats.org/markup-compatibility/2006" xmlns:p14="http://schemas.microsoft.com/office/powerpoint/2010/main">
+          <mc:Choice Requires="p14">
             <p:contentPart p14:bwMode="auto" r:id="rId88">
               <p14:nvContentPartPr>
                 <p14:cNvPr id="102" name="Ink 101">
@@ -21015,7 +21062,7 @@
               </p14:xfrm>
             </p:contentPart>
           </mc:Choice>
-          <mc:Fallback>
+          <mc:Fallback xmlns="">
             <p:pic>
               <p:nvPicPr>
                 <p:cNvPr id="102" name="Ink 101">
@@ -21046,8 +21093,8 @@
             </p:pic>
           </mc:Fallback>
         </mc:AlternateContent>
-        <mc:AlternateContent xmlns:mc="http://schemas.openxmlformats.org/markup-compatibility/2006">
-          <mc:Choice xmlns:p14="http://schemas.microsoft.com/office/powerpoint/2010/main" Requires="p14">
+        <mc:AlternateContent xmlns:mc="http://schemas.openxmlformats.org/markup-compatibility/2006" xmlns:p14="http://schemas.microsoft.com/office/powerpoint/2010/main">
+          <mc:Choice Requires="p14">
             <p:contentPart p14:bwMode="auto" r:id="rId90">
               <p14:nvContentPartPr>
                 <p14:cNvPr id="107" name="Ink 106">
@@ -21066,7 +21113,7 @@
               </p14:xfrm>
             </p:contentPart>
           </mc:Choice>
-          <mc:Fallback>
+          <mc:Fallback xmlns="">
             <p:pic>
               <p:nvPicPr>
                 <p:cNvPr id="107" name="Ink 106">
@@ -21097,8 +21144,8 @@
             </p:pic>
           </mc:Fallback>
         </mc:AlternateContent>
-        <mc:AlternateContent xmlns:mc="http://schemas.openxmlformats.org/markup-compatibility/2006">
-          <mc:Choice xmlns:p14="http://schemas.microsoft.com/office/powerpoint/2010/main" Requires="p14">
+        <mc:AlternateContent xmlns:mc="http://schemas.openxmlformats.org/markup-compatibility/2006" xmlns:p14="http://schemas.microsoft.com/office/powerpoint/2010/main">
+          <mc:Choice Requires="p14">
             <p:contentPart p14:bwMode="auto" r:id="rId92">
               <p14:nvContentPartPr>
                 <p14:cNvPr id="113" name="Ink 112">
@@ -21117,7 +21164,7 @@
               </p14:xfrm>
             </p:contentPart>
           </mc:Choice>
-          <mc:Fallback>
+          <mc:Fallback xmlns="">
             <p:pic>
               <p:nvPicPr>
                 <p:cNvPr id="113" name="Ink 112">
@@ -21148,8 +21195,8 @@
             </p:pic>
           </mc:Fallback>
         </mc:AlternateContent>
-        <mc:AlternateContent xmlns:mc="http://schemas.openxmlformats.org/markup-compatibility/2006">
-          <mc:Choice xmlns:p14="http://schemas.microsoft.com/office/powerpoint/2010/main" Requires="p14">
+        <mc:AlternateContent xmlns:mc="http://schemas.openxmlformats.org/markup-compatibility/2006" xmlns:p14="http://schemas.microsoft.com/office/powerpoint/2010/main">
+          <mc:Choice Requires="p14">
             <p:contentPart p14:bwMode="auto" r:id="rId94">
               <p14:nvContentPartPr>
                 <p14:cNvPr id="117" name="Ink 116">
@@ -21168,7 +21215,7 @@
               </p14:xfrm>
             </p:contentPart>
           </mc:Choice>
-          <mc:Fallback>
+          <mc:Fallback xmlns="">
             <p:pic>
               <p:nvPicPr>
                 <p:cNvPr id="117" name="Ink 116">
@@ -21199,8 +21246,8 @@
             </p:pic>
           </mc:Fallback>
         </mc:AlternateContent>
-        <mc:AlternateContent xmlns:mc="http://schemas.openxmlformats.org/markup-compatibility/2006">
-          <mc:Choice xmlns:p14="http://schemas.microsoft.com/office/powerpoint/2010/main" Requires="p14">
+        <mc:AlternateContent xmlns:mc="http://schemas.openxmlformats.org/markup-compatibility/2006" xmlns:p14="http://schemas.microsoft.com/office/powerpoint/2010/main">
+          <mc:Choice Requires="p14">
             <p:contentPart p14:bwMode="auto" r:id="rId96">
               <p14:nvContentPartPr>
                 <p14:cNvPr id="130" name="Ink 129">
@@ -21219,7 +21266,7 @@
               </p14:xfrm>
             </p:contentPart>
           </mc:Choice>
-          <mc:Fallback>
+          <mc:Fallback xmlns="">
             <p:pic>
               <p:nvPicPr>
                 <p:cNvPr id="130" name="Ink 129">
@@ -21250,8 +21297,8 @@
             </p:pic>
           </mc:Fallback>
         </mc:AlternateContent>
-        <mc:AlternateContent xmlns:mc="http://schemas.openxmlformats.org/markup-compatibility/2006">
-          <mc:Choice xmlns:p14="http://schemas.microsoft.com/office/powerpoint/2010/main" Requires="p14">
+        <mc:AlternateContent xmlns:mc="http://schemas.openxmlformats.org/markup-compatibility/2006" xmlns:p14="http://schemas.microsoft.com/office/powerpoint/2010/main">
+          <mc:Choice Requires="p14">
             <p:contentPart p14:bwMode="auto" r:id="rId98">
               <p14:nvContentPartPr>
                 <p14:cNvPr id="135" name="Ink 134">
@@ -21270,7 +21317,7 @@
               </p14:xfrm>
             </p:contentPart>
           </mc:Choice>
-          <mc:Fallback>
+          <mc:Fallback xmlns="">
             <p:pic>
               <p:nvPicPr>
                 <p:cNvPr id="135" name="Ink 134">
@@ -21301,8 +21348,8 @@
             </p:pic>
           </mc:Fallback>
         </mc:AlternateContent>
-        <mc:AlternateContent xmlns:mc="http://schemas.openxmlformats.org/markup-compatibility/2006">
-          <mc:Choice xmlns:p14="http://schemas.microsoft.com/office/powerpoint/2010/main" Requires="p14">
+        <mc:AlternateContent xmlns:mc="http://schemas.openxmlformats.org/markup-compatibility/2006" xmlns:p14="http://schemas.microsoft.com/office/powerpoint/2010/main">
+          <mc:Choice Requires="p14">
             <p:contentPart p14:bwMode="auto" r:id="rId100">
               <p14:nvContentPartPr>
                 <p14:cNvPr id="136" name="Ink 135">
@@ -21321,7 +21368,7 @@
               </p14:xfrm>
             </p:contentPart>
           </mc:Choice>
-          <mc:Fallback>
+          <mc:Fallback xmlns="">
             <p:pic>
               <p:nvPicPr>
                 <p:cNvPr id="136" name="Ink 135">
@@ -21352,8 +21399,8 @@
             </p:pic>
           </mc:Fallback>
         </mc:AlternateContent>
-        <mc:AlternateContent xmlns:mc="http://schemas.openxmlformats.org/markup-compatibility/2006">
-          <mc:Choice xmlns:p14="http://schemas.microsoft.com/office/powerpoint/2010/main" Requires="p14">
+        <mc:AlternateContent xmlns:mc="http://schemas.openxmlformats.org/markup-compatibility/2006" xmlns:p14="http://schemas.microsoft.com/office/powerpoint/2010/main">
+          <mc:Choice Requires="p14">
             <p:contentPart p14:bwMode="auto" r:id="rId102">
               <p14:nvContentPartPr>
                 <p14:cNvPr id="137" name="Ink 136">
@@ -21372,7 +21419,7 @@
               </p14:xfrm>
             </p:contentPart>
           </mc:Choice>
-          <mc:Fallback>
+          <mc:Fallback xmlns="">
             <p:pic>
               <p:nvPicPr>
                 <p:cNvPr id="137" name="Ink 136">
@@ -21403,8 +21450,8 @@
             </p:pic>
           </mc:Fallback>
         </mc:AlternateContent>
-        <mc:AlternateContent xmlns:mc="http://schemas.openxmlformats.org/markup-compatibility/2006">
-          <mc:Choice xmlns:p14="http://schemas.microsoft.com/office/powerpoint/2010/main" Requires="p14">
+        <mc:AlternateContent xmlns:mc="http://schemas.openxmlformats.org/markup-compatibility/2006" xmlns:p14="http://schemas.microsoft.com/office/powerpoint/2010/main">
+          <mc:Choice Requires="p14">
             <p:contentPart p14:bwMode="auto" r:id="rId104">
               <p14:nvContentPartPr>
                 <p14:cNvPr id="138" name="Ink 137">
@@ -21423,7 +21470,7 @@
               </p14:xfrm>
             </p:contentPart>
           </mc:Choice>
-          <mc:Fallback>
+          <mc:Fallback xmlns="">
             <p:pic>
               <p:nvPicPr>
                 <p:cNvPr id="138" name="Ink 137">
@@ -21454,8 +21501,8 @@
             </p:pic>
           </mc:Fallback>
         </mc:AlternateContent>
-        <mc:AlternateContent xmlns:mc="http://schemas.openxmlformats.org/markup-compatibility/2006">
-          <mc:Choice xmlns:p14="http://schemas.microsoft.com/office/powerpoint/2010/main" Requires="p14">
+        <mc:AlternateContent xmlns:mc="http://schemas.openxmlformats.org/markup-compatibility/2006" xmlns:p14="http://schemas.microsoft.com/office/powerpoint/2010/main">
+          <mc:Choice Requires="p14">
             <p:contentPart p14:bwMode="auto" r:id="rId106">
               <p14:nvContentPartPr>
                 <p14:cNvPr id="139" name="Ink 138">
@@ -21474,7 +21521,7 @@
               </p14:xfrm>
             </p:contentPart>
           </mc:Choice>
-          <mc:Fallback>
+          <mc:Fallback xmlns="">
             <p:pic>
               <p:nvPicPr>
                 <p:cNvPr id="139" name="Ink 138">
@@ -21505,8 +21552,8 @@
             </p:pic>
           </mc:Fallback>
         </mc:AlternateContent>
-        <mc:AlternateContent xmlns:mc="http://schemas.openxmlformats.org/markup-compatibility/2006">
-          <mc:Choice xmlns:p14="http://schemas.microsoft.com/office/powerpoint/2010/main" Requires="p14">
+        <mc:AlternateContent xmlns:mc="http://schemas.openxmlformats.org/markup-compatibility/2006" xmlns:p14="http://schemas.microsoft.com/office/powerpoint/2010/main">
+          <mc:Choice Requires="p14">
             <p:contentPart p14:bwMode="auto" r:id="rId108">
               <p14:nvContentPartPr>
                 <p14:cNvPr id="140" name="Ink 139">
@@ -21525,7 +21572,7 @@
               </p14:xfrm>
             </p:contentPart>
           </mc:Choice>
-          <mc:Fallback>
+          <mc:Fallback xmlns="">
             <p:pic>
               <p:nvPicPr>
                 <p:cNvPr id="140" name="Ink 139">
@@ -21556,8 +21603,8 @@
             </p:pic>
           </mc:Fallback>
         </mc:AlternateContent>
-        <mc:AlternateContent xmlns:mc="http://schemas.openxmlformats.org/markup-compatibility/2006">
-          <mc:Choice xmlns:p14="http://schemas.microsoft.com/office/powerpoint/2010/main" Requires="p14">
+        <mc:AlternateContent xmlns:mc="http://schemas.openxmlformats.org/markup-compatibility/2006" xmlns:p14="http://schemas.microsoft.com/office/powerpoint/2010/main">
+          <mc:Choice Requires="p14">
             <p:contentPart p14:bwMode="auto" r:id="rId110">
               <p14:nvContentPartPr>
                 <p14:cNvPr id="142" name="Ink 141">
@@ -21576,7 +21623,7 @@
               </p14:xfrm>
             </p:contentPart>
           </mc:Choice>
-          <mc:Fallback>
+          <mc:Fallback xmlns="">
             <p:pic>
               <p:nvPicPr>
                 <p:cNvPr id="142" name="Ink 141">
@@ -21607,8 +21654,8 @@
             </p:pic>
           </mc:Fallback>
         </mc:AlternateContent>
-        <mc:AlternateContent xmlns:mc="http://schemas.openxmlformats.org/markup-compatibility/2006">
-          <mc:Choice xmlns:p14="http://schemas.microsoft.com/office/powerpoint/2010/main" Requires="p14">
+        <mc:AlternateContent xmlns:mc="http://schemas.openxmlformats.org/markup-compatibility/2006" xmlns:p14="http://schemas.microsoft.com/office/powerpoint/2010/main">
+          <mc:Choice Requires="p14">
             <p:contentPart p14:bwMode="auto" r:id="rId112">
               <p14:nvContentPartPr>
                 <p14:cNvPr id="143" name="Ink 142">
@@ -21627,7 +21674,7 @@
               </p14:xfrm>
             </p:contentPart>
           </mc:Choice>
-          <mc:Fallback>
+          <mc:Fallback xmlns="">
             <p:pic>
               <p:nvPicPr>
                 <p:cNvPr id="143" name="Ink 142">
@@ -21658,8 +21705,8 @@
             </p:pic>
           </mc:Fallback>
         </mc:AlternateContent>
-        <mc:AlternateContent xmlns:mc="http://schemas.openxmlformats.org/markup-compatibility/2006">
-          <mc:Choice xmlns:p14="http://schemas.microsoft.com/office/powerpoint/2010/main" Requires="p14">
+        <mc:AlternateContent xmlns:mc="http://schemas.openxmlformats.org/markup-compatibility/2006" xmlns:p14="http://schemas.microsoft.com/office/powerpoint/2010/main">
+          <mc:Choice Requires="p14">
             <p:contentPart p14:bwMode="auto" r:id="rId114">
               <p14:nvContentPartPr>
                 <p14:cNvPr id="144" name="Ink 143">
@@ -21678,7 +21725,7 @@
               </p14:xfrm>
             </p:contentPart>
           </mc:Choice>
-          <mc:Fallback>
+          <mc:Fallback xmlns="">
             <p:pic>
               <p:nvPicPr>
                 <p:cNvPr id="144" name="Ink 143">
@@ -21709,8 +21756,8 @@
             </p:pic>
           </mc:Fallback>
         </mc:AlternateContent>
-        <mc:AlternateContent xmlns:mc="http://schemas.openxmlformats.org/markup-compatibility/2006">
-          <mc:Choice xmlns:p14="http://schemas.microsoft.com/office/powerpoint/2010/main" Requires="p14">
+        <mc:AlternateContent xmlns:mc="http://schemas.openxmlformats.org/markup-compatibility/2006" xmlns:p14="http://schemas.microsoft.com/office/powerpoint/2010/main">
+          <mc:Choice Requires="p14">
             <p:contentPart p14:bwMode="auto" r:id="rId116">
               <p14:nvContentPartPr>
                 <p14:cNvPr id="145" name="Ink 144">
@@ -21729,7 +21776,7 @@
               </p14:xfrm>
             </p:contentPart>
           </mc:Choice>
-          <mc:Fallback>
+          <mc:Fallback xmlns="">
             <p:pic>
               <p:nvPicPr>
                 <p:cNvPr id="145" name="Ink 144">
@@ -21760,8 +21807,8 @@
             </p:pic>
           </mc:Fallback>
         </mc:AlternateContent>
-        <mc:AlternateContent xmlns:mc="http://schemas.openxmlformats.org/markup-compatibility/2006">
-          <mc:Choice xmlns:p14="http://schemas.microsoft.com/office/powerpoint/2010/main" Requires="p14">
+        <mc:AlternateContent xmlns:mc="http://schemas.openxmlformats.org/markup-compatibility/2006" xmlns:p14="http://schemas.microsoft.com/office/powerpoint/2010/main">
+          <mc:Choice Requires="p14">
             <p:contentPart p14:bwMode="auto" r:id="rId118">
               <p14:nvContentPartPr>
                 <p14:cNvPr id="146" name="Ink 145">
@@ -21780,7 +21827,7 @@
               </p14:xfrm>
             </p:contentPart>
           </mc:Choice>
-          <mc:Fallback>
+          <mc:Fallback xmlns="">
             <p:pic>
               <p:nvPicPr>
                 <p:cNvPr id="146" name="Ink 145">
@@ -21811,8 +21858,8 @@
             </p:pic>
           </mc:Fallback>
         </mc:AlternateContent>
-        <mc:AlternateContent xmlns:mc="http://schemas.openxmlformats.org/markup-compatibility/2006">
-          <mc:Choice xmlns:p14="http://schemas.microsoft.com/office/powerpoint/2010/main" Requires="p14">
+        <mc:AlternateContent xmlns:mc="http://schemas.openxmlformats.org/markup-compatibility/2006" xmlns:p14="http://schemas.microsoft.com/office/powerpoint/2010/main">
+          <mc:Choice Requires="p14">
             <p:contentPart p14:bwMode="auto" r:id="rId120">
               <p14:nvContentPartPr>
                 <p14:cNvPr id="147" name="Ink 146">
@@ -21831,7 +21878,7 @@
               </p14:xfrm>
             </p:contentPart>
           </mc:Choice>
-          <mc:Fallback>
+          <mc:Fallback xmlns="">
             <p:pic>
               <p:nvPicPr>
                 <p:cNvPr id="147" name="Ink 146">
@@ -21862,8 +21909,8 @@
             </p:pic>
           </mc:Fallback>
         </mc:AlternateContent>
-        <mc:AlternateContent xmlns:mc="http://schemas.openxmlformats.org/markup-compatibility/2006">
-          <mc:Choice xmlns:p14="http://schemas.microsoft.com/office/powerpoint/2010/main" Requires="p14">
+        <mc:AlternateContent xmlns:mc="http://schemas.openxmlformats.org/markup-compatibility/2006" xmlns:p14="http://schemas.microsoft.com/office/powerpoint/2010/main">
+          <mc:Choice Requires="p14">
             <p:contentPart p14:bwMode="auto" r:id="rId122">
               <p14:nvContentPartPr>
                 <p14:cNvPr id="148" name="Ink 147">
@@ -21882,7 +21929,7 @@
               </p14:xfrm>
             </p:contentPart>
           </mc:Choice>
-          <mc:Fallback>
+          <mc:Fallback xmlns="">
             <p:pic>
               <p:nvPicPr>
                 <p:cNvPr id="148" name="Ink 147">
@@ -21913,8 +21960,8 @@
             </p:pic>
           </mc:Fallback>
         </mc:AlternateContent>
-        <mc:AlternateContent xmlns:mc="http://schemas.openxmlformats.org/markup-compatibility/2006">
-          <mc:Choice xmlns:p14="http://schemas.microsoft.com/office/powerpoint/2010/main" Requires="p14">
+        <mc:AlternateContent xmlns:mc="http://schemas.openxmlformats.org/markup-compatibility/2006" xmlns:p14="http://schemas.microsoft.com/office/powerpoint/2010/main">
+          <mc:Choice Requires="p14">
             <p:contentPart p14:bwMode="auto" r:id="rId124">
               <p14:nvContentPartPr>
                 <p14:cNvPr id="150" name="Ink 149">
@@ -21933,7 +21980,7 @@
               </p14:xfrm>
             </p:contentPart>
           </mc:Choice>
-          <mc:Fallback>
+          <mc:Fallback xmlns="">
             <p:pic>
               <p:nvPicPr>
                 <p:cNvPr id="150" name="Ink 149">
@@ -21964,8 +22011,8 @@
             </p:pic>
           </mc:Fallback>
         </mc:AlternateContent>
-        <mc:AlternateContent xmlns:mc="http://schemas.openxmlformats.org/markup-compatibility/2006">
-          <mc:Choice xmlns:p14="http://schemas.microsoft.com/office/powerpoint/2010/main" Requires="p14">
+        <mc:AlternateContent xmlns:mc="http://schemas.openxmlformats.org/markup-compatibility/2006" xmlns:p14="http://schemas.microsoft.com/office/powerpoint/2010/main">
+          <mc:Choice Requires="p14">
             <p:contentPart p14:bwMode="auto" r:id="rId126">
               <p14:nvContentPartPr>
                 <p14:cNvPr id="151" name="Ink 150">
@@ -21984,7 +22031,7 @@
               </p14:xfrm>
             </p:contentPart>
           </mc:Choice>
-          <mc:Fallback>
+          <mc:Fallback xmlns="">
             <p:pic>
               <p:nvPicPr>
                 <p:cNvPr id="151" name="Ink 150">
@@ -22015,8 +22062,8 @@
             </p:pic>
           </mc:Fallback>
         </mc:AlternateContent>
-        <mc:AlternateContent xmlns:mc="http://schemas.openxmlformats.org/markup-compatibility/2006">
-          <mc:Choice xmlns:p14="http://schemas.microsoft.com/office/powerpoint/2010/main" Requires="p14">
+        <mc:AlternateContent xmlns:mc="http://schemas.openxmlformats.org/markup-compatibility/2006" xmlns:p14="http://schemas.microsoft.com/office/powerpoint/2010/main">
+          <mc:Choice Requires="p14">
             <p:contentPart p14:bwMode="auto" r:id="rId128">
               <p14:nvContentPartPr>
                 <p14:cNvPr id="152" name="Ink 151">
@@ -22035,7 +22082,7 @@
               </p14:xfrm>
             </p:contentPart>
           </mc:Choice>
-          <mc:Fallback>
+          <mc:Fallback xmlns="">
             <p:pic>
               <p:nvPicPr>
                 <p:cNvPr id="152" name="Ink 151">
@@ -22066,8 +22113,8 @@
             </p:pic>
           </mc:Fallback>
         </mc:AlternateContent>
-        <mc:AlternateContent xmlns:mc="http://schemas.openxmlformats.org/markup-compatibility/2006">
-          <mc:Choice xmlns:p14="http://schemas.microsoft.com/office/powerpoint/2010/main" Requires="p14">
+        <mc:AlternateContent xmlns:mc="http://schemas.openxmlformats.org/markup-compatibility/2006" xmlns:p14="http://schemas.microsoft.com/office/powerpoint/2010/main">
+          <mc:Choice Requires="p14">
             <p:contentPart p14:bwMode="auto" r:id="rId130">
               <p14:nvContentPartPr>
                 <p14:cNvPr id="182" name="Ink 181">
@@ -22086,7 +22133,7 @@
               </p14:xfrm>
             </p:contentPart>
           </mc:Choice>
-          <mc:Fallback>
+          <mc:Fallback xmlns="">
             <p:pic>
               <p:nvPicPr>
                 <p:cNvPr id="182" name="Ink 181">
@@ -22117,8 +22164,8 @@
             </p:pic>
           </mc:Fallback>
         </mc:AlternateContent>
-        <mc:AlternateContent xmlns:mc="http://schemas.openxmlformats.org/markup-compatibility/2006">
-          <mc:Choice xmlns:p14="http://schemas.microsoft.com/office/powerpoint/2010/main" Requires="p14">
+        <mc:AlternateContent xmlns:mc="http://schemas.openxmlformats.org/markup-compatibility/2006" xmlns:p14="http://schemas.microsoft.com/office/powerpoint/2010/main">
+          <mc:Choice Requires="p14">
             <p:contentPart p14:bwMode="auto" r:id="rId132">
               <p14:nvContentPartPr>
                 <p14:cNvPr id="183" name="Ink 182">
@@ -22137,7 +22184,7 @@
               </p14:xfrm>
             </p:contentPart>
           </mc:Choice>
-          <mc:Fallback>
+          <mc:Fallback xmlns="">
             <p:pic>
               <p:nvPicPr>
                 <p:cNvPr id="183" name="Ink 182">
@@ -22168,8 +22215,8 @@
             </p:pic>
           </mc:Fallback>
         </mc:AlternateContent>
-        <mc:AlternateContent xmlns:mc="http://schemas.openxmlformats.org/markup-compatibility/2006">
-          <mc:Choice xmlns:p14="http://schemas.microsoft.com/office/powerpoint/2010/main" Requires="p14">
+        <mc:AlternateContent xmlns:mc="http://schemas.openxmlformats.org/markup-compatibility/2006" xmlns:p14="http://schemas.microsoft.com/office/powerpoint/2010/main">
+          <mc:Choice Requires="p14">
             <p:contentPart p14:bwMode="auto" r:id="rId134">
               <p14:nvContentPartPr>
                 <p14:cNvPr id="185" name="Ink 184">
@@ -22188,7 +22235,7 @@
               </p14:xfrm>
             </p:contentPart>
           </mc:Choice>
-          <mc:Fallback>
+          <mc:Fallback xmlns="">
             <p:pic>
               <p:nvPicPr>
                 <p:cNvPr id="185" name="Ink 184">
@@ -22219,8 +22266,8 @@
             </p:pic>
           </mc:Fallback>
         </mc:AlternateContent>
-        <mc:AlternateContent xmlns:mc="http://schemas.openxmlformats.org/markup-compatibility/2006">
-          <mc:Choice xmlns:p14="http://schemas.microsoft.com/office/powerpoint/2010/main" Requires="p14">
+        <mc:AlternateContent xmlns:mc="http://schemas.openxmlformats.org/markup-compatibility/2006" xmlns:p14="http://schemas.microsoft.com/office/powerpoint/2010/main">
+          <mc:Choice Requires="p14">
             <p:contentPart p14:bwMode="auto" r:id="rId136">
               <p14:nvContentPartPr>
                 <p14:cNvPr id="187" name="Ink 186">
@@ -22239,7 +22286,7 @@
               </p14:xfrm>
             </p:contentPart>
           </mc:Choice>
-          <mc:Fallback>
+          <mc:Fallback xmlns="">
             <p:pic>
               <p:nvPicPr>
                 <p:cNvPr id="187" name="Ink 186">
@@ -22270,8 +22317,8 @@
             </p:pic>
           </mc:Fallback>
         </mc:AlternateContent>
-        <mc:AlternateContent xmlns:mc="http://schemas.openxmlformats.org/markup-compatibility/2006">
-          <mc:Choice xmlns:p14="http://schemas.microsoft.com/office/powerpoint/2010/main" Requires="p14">
+        <mc:AlternateContent xmlns:mc="http://schemas.openxmlformats.org/markup-compatibility/2006" xmlns:p14="http://schemas.microsoft.com/office/powerpoint/2010/main">
+          <mc:Choice Requires="p14">
             <p:contentPart p14:bwMode="auto" r:id="rId138">
               <p14:nvContentPartPr>
                 <p14:cNvPr id="192" name="Ink 191">
@@ -22290,7 +22337,7 @@
               </p14:xfrm>
             </p:contentPart>
           </mc:Choice>
-          <mc:Fallback>
+          <mc:Fallback xmlns="">
             <p:pic>
               <p:nvPicPr>
                 <p:cNvPr id="192" name="Ink 191">
@@ -22321,8 +22368,8 @@
             </p:pic>
           </mc:Fallback>
         </mc:AlternateContent>
-        <mc:AlternateContent xmlns:mc="http://schemas.openxmlformats.org/markup-compatibility/2006">
-          <mc:Choice xmlns:p14="http://schemas.microsoft.com/office/powerpoint/2010/main" Requires="p14">
+        <mc:AlternateContent xmlns:mc="http://schemas.openxmlformats.org/markup-compatibility/2006" xmlns:p14="http://schemas.microsoft.com/office/powerpoint/2010/main">
+          <mc:Choice Requires="p14">
             <p:contentPart p14:bwMode="auto" r:id="rId140">
               <p14:nvContentPartPr>
                 <p14:cNvPr id="193" name="Ink 192">
@@ -22341,7 +22388,7 @@
               </p14:xfrm>
             </p:contentPart>
           </mc:Choice>
-          <mc:Fallback>
+          <mc:Fallback xmlns="">
             <p:pic>
               <p:nvPicPr>
                 <p:cNvPr id="193" name="Ink 192">
@@ -22372,8 +22419,8 @@
             </p:pic>
           </mc:Fallback>
         </mc:AlternateContent>
-        <mc:AlternateContent xmlns:mc="http://schemas.openxmlformats.org/markup-compatibility/2006">
-          <mc:Choice xmlns:p14="http://schemas.microsoft.com/office/powerpoint/2010/main" Requires="p14">
+        <mc:AlternateContent xmlns:mc="http://schemas.openxmlformats.org/markup-compatibility/2006" xmlns:p14="http://schemas.microsoft.com/office/powerpoint/2010/main">
+          <mc:Choice Requires="p14">
             <p:contentPart p14:bwMode="auto" r:id="rId142">
               <p14:nvContentPartPr>
                 <p14:cNvPr id="194" name="Ink 193">
@@ -22392,7 +22439,7 @@
               </p14:xfrm>
             </p:contentPart>
           </mc:Choice>
-          <mc:Fallback>
+          <mc:Fallback xmlns="">
             <p:pic>
               <p:nvPicPr>
                 <p:cNvPr id="194" name="Ink 193">
@@ -22423,8 +22470,8 @@
             </p:pic>
           </mc:Fallback>
         </mc:AlternateContent>
-        <mc:AlternateContent xmlns:mc="http://schemas.openxmlformats.org/markup-compatibility/2006">
-          <mc:Choice xmlns:p14="http://schemas.microsoft.com/office/powerpoint/2010/main" Requires="p14">
+        <mc:AlternateContent xmlns:mc="http://schemas.openxmlformats.org/markup-compatibility/2006" xmlns:p14="http://schemas.microsoft.com/office/powerpoint/2010/main">
+          <mc:Choice Requires="p14">
             <p:contentPart p14:bwMode="auto" r:id="rId144">
               <p14:nvContentPartPr>
                 <p14:cNvPr id="196" name="Ink 195">
@@ -22443,7 +22490,7 @@
               </p14:xfrm>
             </p:contentPart>
           </mc:Choice>
-          <mc:Fallback>
+          <mc:Fallback xmlns="">
             <p:pic>
               <p:nvPicPr>
                 <p:cNvPr id="196" name="Ink 195">
@@ -22474,8 +22521,8 @@
             </p:pic>
           </mc:Fallback>
         </mc:AlternateContent>
-        <mc:AlternateContent xmlns:mc="http://schemas.openxmlformats.org/markup-compatibility/2006">
-          <mc:Choice xmlns:p14="http://schemas.microsoft.com/office/powerpoint/2010/main" Requires="p14">
+        <mc:AlternateContent xmlns:mc="http://schemas.openxmlformats.org/markup-compatibility/2006" xmlns:p14="http://schemas.microsoft.com/office/powerpoint/2010/main">
+          <mc:Choice Requires="p14">
             <p:contentPart p14:bwMode="auto" r:id="rId146">
               <p14:nvContentPartPr>
                 <p14:cNvPr id="197" name="Ink 196">
@@ -22494,7 +22541,7 @@
               </p14:xfrm>
             </p:contentPart>
           </mc:Choice>
-          <mc:Fallback>
+          <mc:Fallback xmlns="">
             <p:pic>
               <p:nvPicPr>
                 <p:cNvPr id="197" name="Ink 196">
@@ -22525,8 +22572,8 @@
             </p:pic>
           </mc:Fallback>
         </mc:AlternateContent>
-        <mc:AlternateContent xmlns:mc="http://schemas.openxmlformats.org/markup-compatibility/2006">
-          <mc:Choice xmlns:p14="http://schemas.microsoft.com/office/powerpoint/2010/main" Requires="p14">
+        <mc:AlternateContent xmlns:mc="http://schemas.openxmlformats.org/markup-compatibility/2006" xmlns:p14="http://schemas.microsoft.com/office/powerpoint/2010/main">
+          <mc:Choice Requires="p14">
             <p:contentPart p14:bwMode="auto" r:id="rId148">
               <p14:nvContentPartPr>
                 <p14:cNvPr id="198" name="Ink 197">
@@ -22545,7 +22592,7 @@
               </p14:xfrm>
             </p:contentPart>
           </mc:Choice>
-          <mc:Fallback>
+          <mc:Fallback xmlns="">
             <p:pic>
               <p:nvPicPr>
                 <p:cNvPr id="198" name="Ink 197">
@@ -22576,8 +22623,8 @@
             </p:pic>
           </mc:Fallback>
         </mc:AlternateContent>
-        <mc:AlternateContent xmlns:mc="http://schemas.openxmlformats.org/markup-compatibility/2006">
-          <mc:Choice xmlns:p14="http://schemas.microsoft.com/office/powerpoint/2010/main" Requires="p14">
+        <mc:AlternateContent xmlns:mc="http://schemas.openxmlformats.org/markup-compatibility/2006" xmlns:p14="http://schemas.microsoft.com/office/powerpoint/2010/main">
+          <mc:Choice Requires="p14">
             <p:contentPart p14:bwMode="auto" r:id="rId150">
               <p14:nvContentPartPr>
                 <p14:cNvPr id="199" name="Ink 198">
@@ -22596,7 +22643,7 @@
               </p14:xfrm>
             </p:contentPart>
           </mc:Choice>
-          <mc:Fallback>
+          <mc:Fallback xmlns="">
             <p:pic>
               <p:nvPicPr>
                 <p:cNvPr id="199" name="Ink 198">
@@ -22627,8 +22674,8 @@
             </p:pic>
           </mc:Fallback>
         </mc:AlternateContent>
-        <mc:AlternateContent xmlns:mc="http://schemas.openxmlformats.org/markup-compatibility/2006">
-          <mc:Choice xmlns:p14="http://schemas.microsoft.com/office/powerpoint/2010/main" Requires="p14">
+        <mc:AlternateContent xmlns:mc="http://schemas.openxmlformats.org/markup-compatibility/2006" xmlns:p14="http://schemas.microsoft.com/office/powerpoint/2010/main">
+          <mc:Choice Requires="p14">
             <p:contentPart p14:bwMode="auto" r:id="rId152">
               <p14:nvContentPartPr>
                 <p14:cNvPr id="200" name="Ink 199">
@@ -22647,7 +22694,7 @@
               </p14:xfrm>
             </p:contentPart>
           </mc:Choice>
-          <mc:Fallback>
+          <mc:Fallback xmlns="">
             <p:pic>
               <p:nvPicPr>
                 <p:cNvPr id="200" name="Ink 199">
@@ -22678,8 +22725,8 @@
             </p:pic>
           </mc:Fallback>
         </mc:AlternateContent>
-        <mc:AlternateContent xmlns:mc="http://schemas.openxmlformats.org/markup-compatibility/2006">
-          <mc:Choice xmlns:p14="http://schemas.microsoft.com/office/powerpoint/2010/main" Requires="p14">
+        <mc:AlternateContent xmlns:mc="http://schemas.openxmlformats.org/markup-compatibility/2006" xmlns:p14="http://schemas.microsoft.com/office/powerpoint/2010/main">
+          <mc:Choice Requires="p14">
             <p:contentPart p14:bwMode="auto" r:id="rId154">
               <p14:nvContentPartPr>
                 <p14:cNvPr id="201" name="Ink 200">
@@ -22698,7 +22745,7 @@
               </p14:xfrm>
             </p:contentPart>
           </mc:Choice>
-          <mc:Fallback>
+          <mc:Fallback xmlns="">
             <p:pic>
               <p:nvPicPr>
                 <p:cNvPr id="201" name="Ink 200">
@@ -22729,8 +22776,8 @@
             </p:pic>
           </mc:Fallback>
         </mc:AlternateContent>
-        <mc:AlternateContent xmlns:mc="http://schemas.openxmlformats.org/markup-compatibility/2006">
-          <mc:Choice xmlns:p14="http://schemas.microsoft.com/office/powerpoint/2010/main" Requires="p14">
+        <mc:AlternateContent xmlns:mc="http://schemas.openxmlformats.org/markup-compatibility/2006" xmlns:p14="http://schemas.microsoft.com/office/powerpoint/2010/main">
+          <mc:Choice Requires="p14">
             <p:contentPart p14:bwMode="auto" r:id="rId156">
               <p14:nvContentPartPr>
                 <p14:cNvPr id="202" name="Ink 201">
@@ -22749,7 +22796,7 @@
               </p14:xfrm>
             </p:contentPart>
           </mc:Choice>
-          <mc:Fallback>
+          <mc:Fallback xmlns="">
             <p:pic>
               <p:nvPicPr>
                 <p:cNvPr id="202" name="Ink 201">
@@ -22780,8 +22827,8 @@
             </p:pic>
           </mc:Fallback>
         </mc:AlternateContent>
-        <mc:AlternateContent xmlns:mc="http://schemas.openxmlformats.org/markup-compatibility/2006">
-          <mc:Choice xmlns:p14="http://schemas.microsoft.com/office/powerpoint/2010/main" Requires="p14">
+        <mc:AlternateContent xmlns:mc="http://schemas.openxmlformats.org/markup-compatibility/2006" xmlns:p14="http://schemas.microsoft.com/office/powerpoint/2010/main">
+          <mc:Choice Requires="p14">
             <p:contentPart p14:bwMode="auto" r:id="rId158">
               <p14:nvContentPartPr>
                 <p14:cNvPr id="203" name="Ink 202">
@@ -22800,7 +22847,7 @@
               </p14:xfrm>
             </p:contentPart>
           </mc:Choice>
-          <mc:Fallback>
+          <mc:Fallback xmlns="">
             <p:pic>
               <p:nvPicPr>
                 <p:cNvPr id="203" name="Ink 202">
@@ -22831,8 +22878,8 @@
             </p:pic>
           </mc:Fallback>
         </mc:AlternateContent>
-        <mc:AlternateContent xmlns:mc="http://schemas.openxmlformats.org/markup-compatibility/2006">
-          <mc:Choice xmlns:p14="http://schemas.microsoft.com/office/powerpoint/2010/main" Requires="p14">
+        <mc:AlternateContent xmlns:mc="http://schemas.openxmlformats.org/markup-compatibility/2006" xmlns:p14="http://schemas.microsoft.com/office/powerpoint/2010/main">
+          <mc:Choice Requires="p14">
             <p:contentPart p14:bwMode="auto" r:id="rId160">
               <p14:nvContentPartPr>
                 <p14:cNvPr id="204" name="Ink 203">
@@ -22851,7 +22898,7 @@
               </p14:xfrm>
             </p:contentPart>
           </mc:Choice>
-          <mc:Fallback>
+          <mc:Fallback xmlns="">
             <p:pic>
               <p:nvPicPr>
                 <p:cNvPr id="204" name="Ink 203">
@@ -22882,8 +22929,8 @@
             </p:pic>
           </mc:Fallback>
         </mc:AlternateContent>
-        <mc:AlternateContent xmlns:mc="http://schemas.openxmlformats.org/markup-compatibility/2006">
-          <mc:Choice xmlns:p14="http://schemas.microsoft.com/office/powerpoint/2010/main" Requires="p14">
+        <mc:AlternateContent xmlns:mc="http://schemas.openxmlformats.org/markup-compatibility/2006" xmlns:p14="http://schemas.microsoft.com/office/powerpoint/2010/main">
+          <mc:Choice Requires="p14">
             <p:contentPart p14:bwMode="auto" r:id="rId162">
               <p14:nvContentPartPr>
                 <p14:cNvPr id="189" name="Ink 188">
@@ -22902,7 +22949,7 @@
               </p14:xfrm>
             </p:contentPart>
           </mc:Choice>
-          <mc:Fallback>
+          <mc:Fallback xmlns="">
             <p:pic>
               <p:nvPicPr>
                 <p:cNvPr id="189" name="Ink 188">
@@ -22933,8 +22980,8 @@
             </p:pic>
           </mc:Fallback>
         </mc:AlternateContent>
-        <mc:AlternateContent xmlns:mc="http://schemas.openxmlformats.org/markup-compatibility/2006">
-          <mc:Choice xmlns:p14="http://schemas.microsoft.com/office/powerpoint/2010/main" Requires="p14">
+        <mc:AlternateContent xmlns:mc="http://schemas.openxmlformats.org/markup-compatibility/2006" xmlns:p14="http://schemas.microsoft.com/office/powerpoint/2010/main">
+          <mc:Choice Requires="p14">
             <p:contentPart p14:bwMode="auto" r:id="rId164">
               <p14:nvContentPartPr>
                 <p14:cNvPr id="190" name="Ink 189">
@@ -22953,7 +23000,7 @@
               </p14:xfrm>
             </p:contentPart>
           </mc:Choice>
-          <mc:Fallback>
+          <mc:Fallback xmlns="">
             <p:pic>
               <p:nvPicPr>
                 <p:cNvPr id="190" name="Ink 189">
@@ -22984,8 +23031,8 @@
             </p:pic>
           </mc:Fallback>
         </mc:AlternateContent>
-        <mc:AlternateContent xmlns:mc="http://schemas.openxmlformats.org/markup-compatibility/2006">
-          <mc:Choice xmlns:p14="http://schemas.microsoft.com/office/powerpoint/2010/main" Requires="p14">
+        <mc:AlternateContent xmlns:mc="http://schemas.openxmlformats.org/markup-compatibility/2006" xmlns:p14="http://schemas.microsoft.com/office/powerpoint/2010/main">
+          <mc:Choice Requires="p14">
             <p:contentPart p14:bwMode="auto" r:id="rId166">
               <p14:nvContentPartPr>
                 <p14:cNvPr id="206" name="Ink 205">
@@ -23004,7 +23051,7 @@
               </p14:xfrm>
             </p:contentPart>
           </mc:Choice>
-          <mc:Fallback>
+          <mc:Fallback xmlns="">
             <p:pic>
               <p:nvPicPr>
                 <p:cNvPr id="206" name="Ink 205">
@@ -23035,8 +23082,8 @@
             </p:pic>
           </mc:Fallback>
         </mc:AlternateContent>
-        <mc:AlternateContent xmlns:mc="http://schemas.openxmlformats.org/markup-compatibility/2006">
-          <mc:Choice xmlns:p14="http://schemas.microsoft.com/office/powerpoint/2010/main" Requires="p14">
+        <mc:AlternateContent xmlns:mc="http://schemas.openxmlformats.org/markup-compatibility/2006" xmlns:p14="http://schemas.microsoft.com/office/powerpoint/2010/main">
+          <mc:Choice Requires="p14">
             <p:contentPart p14:bwMode="auto" r:id="rId168">
               <p14:nvContentPartPr>
                 <p14:cNvPr id="207" name="Ink 206">
@@ -23055,7 +23102,7 @@
               </p14:xfrm>
             </p:contentPart>
           </mc:Choice>
-          <mc:Fallback>
+          <mc:Fallback xmlns="">
             <p:pic>
               <p:nvPicPr>
                 <p:cNvPr id="207" name="Ink 206">
@@ -23086,8 +23133,8 @@
             </p:pic>
           </mc:Fallback>
         </mc:AlternateContent>
-        <mc:AlternateContent xmlns:mc="http://schemas.openxmlformats.org/markup-compatibility/2006">
-          <mc:Choice xmlns:p14="http://schemas.microsoft.com/office/powerpoint/2010/main" Requires="p14">
+        <mc:AlternateContent xmlns:mc="http://schemas.openxmlformats.org/markup-compatibility/2006" xmlns:p14="http://schemas.microsoft.com/office/powerpoint/2010/main">
+          <mc:Choice Requires="p14">
             <p:contentPart p14:bwMode="auto" r:id="rId170">
               <p14:nvContentPartPr>
                 <p14:cNvPr id="208" name="Ink 207">
@@ -23106,7 +23153,7 @@
               </p14:xfrm>
             </p:contentPart>
           </mc:Choice>
-          <mc:Fallback>
+          <mc:Fallback xmlns="">
             <p:pic>
               <p:nvPicPr>
                 <p:cNvPr id="208" name="Ink 207">
@@ -23137,8 +23184,8 @@
             </p:pic>
           </mc:Fallback>
         </mc:AlternateContent>
-        <mc:AlternateContent xmlns:mc="http://schemas.openxmlformats.org/markup-compatibility/2006">
-          <mc:Choice xmlns:p14="http://schemas.microsoft.com/office/powerpoint/2010/main" Requires="p14">
+        <mc:AlternateContent xmlns:mc="http://schemas.openxmlformats.org/markup-compatibility/2006" xmlns:p14="http://schemas.microsoft.com/office/powerpoint/2010/main">
+          <mc:Choice Requires="p14">
             <p:contentPart p14:bwMode="auto" r:id="rId172">
               <p14:nvContentPartPr>
                 <p14:cNvPr id="209" name="Ink 208">
@@ -23157,7 +23204,7 @@
               </p14:xfrm>
             </p:contentPart>
           </mc:Choice>
-          <mc:Fallback>
+          <mc:Fallback xmlns="">
             <p:pic>
               <p:nvPicPr>
                 <p:cNvPr id="209" name="Ink 208">
@@ -23188,8 +23235,8 @@
             </p:pic>
           </mc:Fallback>
         </mc:AlternateContent>
-        <mc:AlternateContent xmlns:mc="http://schemas.openxmlformats.org/markup-compatibility/2006">
-          <mc:Choice xmlns:p14="http://schemas.microsoft.com/office/powerpoint/2010/main" Requires="p14">
+        <mc:AlternateContent xmlns:mc="http://schemas.openxmlformats.org/markup-compatibility/2006" xmlns:p14="http://schemas.microsoft.com/office/powerpoint/2010/main">
+          <mc:Choice Requires="p14">
             <p:contentPart p14:bwMode="auto" r:id="rId174">
               <p14:nvContentPartPr>
                 <p14:cNvPr id="211" name="Ink 210">
@@ -23208,7 +23255,7 @@
               </p14:xfrm>
             </p:contentPart>
           </mc:Choice>
-          <mc:Fallback>
+          <mc:Fallback xmlns="">
             <p:pic>
               <p:nvPicPr>
                 <p:cNvPr id="211" name="Ink 210">
@@ -23239,8 +23286,8 @@
             </p:pic>
           </mc:Fallback>
         </mc:AlternateContent>
-        <mc:AlternateContent xmlns:mc="http://schemas.openxmlformats.org/markup-compatibility/2006">
-          <mc:Choice xmlns:p14="http://schemas.microsoft.com/office/powerpoint/2010/main" Requires="p14">
+        <mc:AlternateContent xmlns:mc="http://schemas.openxmlformats.org/markup-compatibility/2006" xmlns:p14="http://schemas.microsoft.com/office/powerpoint/2010/main">
+          <mc:Choice Requires="p14">
             <p:contentPart p14:bwMode="auto" r:id="rId176">
               <p14:nvContentPartPr>
                 <p14:cNvPr id="212" name="Ink 211">
@@ -23259,7 +23306,7 @@
               </p14:xfrm>
             </p:contentPart>
           </mc:Choice>
-          <mc:Fallback>
+          <mc:Fallback xmlns="">
             <p:pic>
               <p:nvPicPr>
                 <p:cNvPr id="212" name="Ink 211">
@@ -23290,8 +23337,8 @@
             </p:pic>
           </mc:Fallback>
         </mc:AlternateContent>
-        <mc:AlternateContent xmlns:mc="http://schemas.openxmlformats.org/markup-compatibility/2006">
-          <mc:Choice xmlns:p14="http://schemas.microsoft.com/office/powerpoint/2010/main" Requires="p14">
+        <mc:AlternateContent xmlns:mc="http://schemas.openxmlformats.org/markup-compatibility/2006" xmlns:p14="http://schemas.microsoft.com/office/powerpoint/2010/main">
+          <mc:Choice Requires="p14">
             <p:contentPart p14:bwMode="auto" r:id="rId178">
               <p14:nvContentPartPr>
                 <p14:cNvPr id="213" name="Ink 212">
@@ -23310,7 +23357,7 @@
               </p14:xfrm>
             </p:contentPart>
           </mc:Choice>
-          <mc:Fallback>
+          <mc:Fallback xmlns="">
             <p:pic>
               <p:nvPicPr>
                 <p:cNvPr id="213" name="Ink 212">
@@ -23341,8 +23388,8 @@
             </p:pic>
           </mc:Fallback>
         </mc:AlternateContent>
-        <mc:AlternateContent xmlns:mc="http://schemas.openxmlformats.org/markup-compatibility/2006">
-          <mc:Choice xmlns:p14="http://schemas.microsoft.com/office/powerpoint/2010/main" Requires="p14">
+        <mc:AlternateContent xmlns:mc="http://schemas.openxmlformats.org/markup-compatibility/2006" xmlns:p14="http://schemas.microsoft.com/office/powerpoint/2010/main">
+          <mc:Choice Requires="p14">
             <p:contentPart p14:bwMode="auto" r:id="rId180">
               <p14:nvContentPartPr>
                 <p14:cNvPr id="214" name="Ink 213">
@@ -23361,7 +23408,7 @@
               </p14:xfrm>
             </p:contentPart>
           </mc:Choice>
-          <mc:Fallback>
+          <mc:Fallback xmlns="">
             <p:pic>
               <p:nvPicPr>
                 <p:cNvPr id="214" name="Ink 213">
@@ -23392,8 +23439,8 @@
             </p:pic>
           </mc:Fallback>
         </mc:AlternateContent>
-        <mc:AlternateContent xmlns:mc="http://schemas.openxmlformats.org/markup-compatibility/2006">
-          <mc:Choice xmlns:p14="http://schemas.microsoft.com/office/powerpoint/2010/main" Requires="p14">
+        <mc:AlternateContent xmlns:mc="http://schemas.openxmlformats.org/markup-compatibility/2006" xmlns:p14="http://schemas.microsoft.com/office/powerpoint/2010/main">
+          <mc:Choice Requires="p14">
             <p:contentPart p14:bwMode="auto" r:id="rId182">
               <p14:nvContentPartPr>
                 <p14:cNvPr id="221" name="Ink 220">
@@ -23412,7 +23459,7 @@
               </p14:xfrm>
             </p:contentPart>
           </mc:Choice>
-          <mc:Fallback>
+          <mc:Fallback xmlns="">
             <p:pic>
               <p:nvPicPr>
                 <p:cNvPr id="221" name="Ink 220">
@@ -23443,8 +23490,8 @@
             </p:pic>
           </mc:Fallback>
         </mc:AlternateContent>
-        <mc:AlternateContent xmlns:mc="http://schemas.openxmlformats.org/markup-compatibility/2006">
-          <mc:Choice xmlns:p14="http://schemas.microsoft.com/office/powerpoint/2010/main" Requires="p14">
+        <mc:AlternateContent xmlns:mc="http://schemas.openxmlformats.org/markup-compatibility/2006" xmlns:p14="http://schemas.microsoft.com/office/powerpoint/2010/main">
+          <mc:Choice Requires="p14">
             <p:contentPart p14:bwMode="auto" r:id="rId184">
               <p14:nvContentPartPr>
                 <p14:cNvPr id="223" name="Ink 222">
@@ -23463,7 +23510,7 @@
               </p14:xfrm>
             </p:contentPart>
           </mc:Choice>
-          <mc:Fallback>
+          <mc:Fallback xmlns="">
             <p:pic>
               <p:nvPicPr>
                 <p:cNvPr id="223" name="Ink 222">
@@ -23494,8 +23541,8 @@
             </p:pic>
           </mc:Fallback>
         </mc:AlternateContent>
-        <mc:AlternateContent xmlns:mc="http://schemas.openxmlformats.org/markup-compatibility/2006">
-          <mc:Choice xmlns:p14="http://schemas.microsoft.com/office/powerpoint/2010/main" Requires="p14">
+        <mc:AlternateContent xmlns:mc="http://schemas.openxmlformats.org/markup-compatibility/2006" xmlns:p14="http://schemas.microsoft.com/office/powerpoint/2010/main">
+          <mc:Choice Requires="p14">
             <p:contentPart p14:bwMode="auto" r:id="rId186">
               <p14:nvContentPartPr>
                 <p14:cNvPr id="225" name="Ink 224">
@@ -23514,7 +23561,7 @@
               </p14:xfrm>
             </p:contentPart>
           </mc:Choice>
-          <mc:Fallback>
+          <mc:Fallback xmlns="">
             <p:pic>
               <p:nvPicPr>
                 <p:cNvPr id="225" name="Ink 224">
@@ -23545,8 +23592,8 @@
             </p:pic>
           </mc:Fallback>
         </mc:AlternateContent>
-        <mc:AlternateContent xmlns:mc="http://schemas.openxmlformats.org/markup-compatibility/2006">
-          <mc:Choice xmlns:p14="http://schemas.microsoft.com/office/powerpoint/2010/main" Requires="p14">
+        <mc:AlternateContent xmlns:mc="http://schemas.openxmlformats.org/markup-compatibility/2006" xmlns:p14="http://schemas.microsoft.com/office/powerpoint/2010/main">
+          <mc:Choice Requires="p14">
             <p:contentPart p14:bwMode="auto" r:id="rId188">
               <p14:nvContentPartPr>
                 <p14:cNvPr id="226" name="Ink 225">
@@ -23565,7 +23612,7 @@
               </p14:xfrm>
             </p:contentPart>
           </mc:Choice>
-          <mc:Fallback>
+          <mc:Fallback xmlns="">
             <p:pic>
               <p:nvPicPr>
                 <p:cNvPr id="226" name="Ink 225">
@@ -23596,8 +23643,8 @@
             </p:pic>
           </mc:Fallback>
         </mc:AlternateContent>
-        <mc:AlternateContent xmlns:mc="http://schemas.openxmlformats.org/markup-compatibility/2006">
-          <mc:Choice xmlns:p14="http://schemas.microsoft.com/office/powerpoint/2010/main" Requires="p14">
+        <mc:AlternateContent xmlns:mc="http://schemas.openxmlformats.org/markup-compatibility/2006" xmlns:p14="http://schemas.microsoft.com/office/powerpoint/2010/main">
+          <mc:Choice Requires="p14">
             <p:contentPart p14:bwMode="auto" r:id="rId190">
               <p14:nvContentPartPr>
                 <p14:cNvPr id="227" name="Ink 226">
@@ -23616,7 +23663,7 @@
               </p14:xfrm>
             </p:contentPart>
           </mc:Choice>
-          <mc:Fallback>
+          <mc:Fallback xmlns="">
             <p:pic>
               <p:nvPicPr>
                 <p:cNvPr id="227" name="Ink 226">
@@ -23647,8 +23694,8 @@
             </p:pic>
           </mc:Fallback>
         </mc:AlternateContent>
-        <mc:AlternateContent xmlns:mc="http://schemas.openxmlformats.org/markup-compatibility/2006">
-          <mc:Choice xmlns:p14="http://schemas.microsoft.com/office/powerpoint/2010/main" Requires="p14">
+        <mc:AlternateContent xmlns:mc="http://schemas.openxmlformats.org/markup-compatibility/2006" xmlns:p14="http://schemas.microsoft.com/office/powerpoint/2010/main">
+          <mc:Choice Requires="p14">
             <p:contentPart p14:bwMode="auto" r:id="rId192">
               <p14:nvContentPartPr>
                 <p14:cNvPr id="229" name="Ink 228">
@@ -23667,7 +23714,7 @@
               </p14:xfrm>
             </p:contentPart>
           </mc:Choice>
-          <mc:Fallback>
+          <mc:Fallback xmlns="">
             <p:pic>
               <p:nvPicPr>
                 <p:cNvPr id="229" name="Ink 228">
@@ -23698,8 +23745,8 @@
             </p:pic>
           </mc:Fallback>
         </mc:AlternateContent>
-        <mc:AlternateContent xmlns:mc="http://schemas.openxmlformats.org/markup-compatibility/2006">
-          <mc:Choice xmlns:p14="http://schemas.microsoft.com/office/powerpoint/2010/main" Requires="p14">
+        <mc:AlternateContent xmlns:mc="http://schemas.openxmlformats.org/markup-compatibility/2006" xmlns:p14="http://schemas.microsoft.com/office/powerpoint/2010/main">
+          <mc:Choice Requires="p14">
             <p:contentPart p14:bwMode="auto" r:id="rId194">
               <p14:nvContentPartPr>
                 <p14:cNvPr id="230" name="Ink 229">
@@ -23718,7 +23765,7 @@
               </p14:xfrm>
             </p:contentPart>
           </mc:Choice>
-          <mc:Fallback>
+          <mc:Fallback xmlns="">
             <p:pic>
               <p:nvPicPr>
                 <p:cNvPr id="230" name="Ink 229">
@@ -24122,8 +24169,8 @@
           </p:pic>
         </mc:Fallback>
       </mc:AlternateContent>
-      <mc:AlternateContent xmlns:mc="http://schemas.openxmlformats.org/markup-compatibility/2006">
-        <mc:Choice xmlns:p14="http://schemas.microsoft.com/office/powerpoint/2010/main" Requires="p14">
+      <mc:AlternateContent xmlns:mc="http://schemas.openxmlformats.org/markup-compatibility/2006" xmlns:p14="http://schemas.microsoft.com/office/powerpoint/2010/main">
+        <mc:Choice Requires="p14">
           <p:contentPart p14:bwMode="auto" r:id="rId6">
             <p14:nvContentPartPr>
               <p14:cNvPr id="20" name="Ink 19">
@@ -24142,7 +24189,7 @@
             </p14:xfrm>
           </p:contentPart>
         </mc:Choice>
-        <mc:Fallback>
+        <mc:Fallback xmlns="">
           <p:pic>
             <p:nvPicPr>
               <p:cNvPr id="20" name="Ink 19">
@@ -24193,8 +24240,8 @@
             <a:chExt cx="8926920" cy="2352240"/>
           </a:xfrm>
         </p:grpSpPr>
-        <mc:AlternateContent xmlns:mc="http://schemas.openxmlformats.org/markup-compatibility/2006">
-          <mc:Choice xmlns:p14="http://schemas.microsoft.com/office/powerpoint/2010/main" Requires="p14">
+        <mc:AlternateContent xmlns:mc="http://schemas.openxmlformats.org/markup-compatibility/2006" xmlns:p14="http://schemas.microsoft.com/office/powerpoint/2010/main">
+          <mc:Choice Requires="p14">
             <p:contentPart p14:bwMode="auto" r:id="rId8">
               <p14:nvContentPartPr>
                 <p14:cNvPr id="9" name="Ink 8">
@@ -24213,7 +24260,7 @@
               </p14:xfrm>
             </p:contentPart>
           </mc:Choice>
-          <mc:Fallback>
+          <mc:Fallback xmlns="">
             <p:pic>
               <p:nvPicPr>
                 <p:cNvPr id="9" name="Ink 8">
@@ -24244,8 +24291,8 @@
             </p:pic>
           </mc:Fallback>
         </mc:AlternateContent>
-        <mc:AlternateContent xmlns:mc="http://schemas.openxmlformats.org/markup-compatibility/2006">
-          <mc:Choice xmlns:p14="http://schemas.microsoft.com/office/powerpoint/2010/main" Requires="p14">
+        <mc:AlternateContent xmlns:mc="http://schemas.openxmlformats.org/markup-compatibility/2006" xmlns:p14="http://schemas.microsoft.com/office/powerpoint/2010/main">
+          <mc:Choice Requires="p14">
             <p:contentPart p14:bwMode="auto" r:id="rId10">
               <p14:nvContentPartPr>
                 <p14:cNvPr id="13" name="Ink 12">
@@ -24264,7 +24311,7 @@
               </p14:xfrm>
             </p:contentPart>
           </mc:Choice>
-          <mc:Fallback>
+          <mc:Fallback xmlns="">
             <p:pic>
               <p:nvPicPr>
                 <p:cNvPr id="13" name="Ink 12">
@@ -24295,8 +24342,8 @@
             </p:pic>
           </mc:Fallback>
         </mc:AlternateContent>
-        <mc:AlternateContent xmlns:mc="http://schemas.openxmlformats.org/markup-compatibility/2006">
-          <mc:Choice xmlns:p14="http://schemas.microsoft.com/office/powerpoint/2010/main" Requires="p14">
+        <mc:AlternateContent xmlns:mc="http://schemas.openxmlformats.org/markup-compatibility/2006" xmlns:p14="http://schemas.microsoft.com/office/powerpoint/2010/main">
+          <mc:Choice Requires="p14">
             <p:contentPart p14:bwMode="auto" r:id="rId12">
               <p14:nvContentPartPr>
                 <p14:cNvPr id="15" name="Ink 14">
@@ -24315,7 +24362,7 @@
               </p14:xfrm>
             </p:contentPart>
           </mc:Choice>
-          <mc:Fallback>
+          <mc:Fallback xmlns="">
             <p:pic>
               <p:nvPicPr>
                 <p:cNvPr id="15" name="Ink 14">
@@ -24346,8 +24393,8 @@
             </p:pic>
           </mc:Fallback>
         </mc:AlternateContent>
-        <mc:AlternateContent xmlns:mc="http://schemas.openxmlformats.org/markup-compatibility/2006">
-          <mc:Choice xmlns:p14="http://schemas.microsoft.com/office/powerpoint/2010/main" Requires="p14">
+        <mc:AlternateContent xmlns:mc="http://schemas.openxmlformats.org/markup-compatibility/2006" xmlns:p14="http://schemas.microsoft.com/office/powerpoint/2010/main">
+          <mc:Choice Requires="p14">
             <p:contentPart p14:bwMode="auto" r:id="rId14">
               <p14:nvContentPartPr>
                 <p14:cNvPr id="48" name="Ink 47">
@@ -24366,7 +24413,7 @@
               </p14:xfrm>
             </p:contentPart>
           </mc:Choice>
-          <mc:Fallback>
+          <mc:Fallback xmlns="">
             <p:pic>
               <p:nvPicPr>
                 <p:cNvPr id="48" name="Ink 47">
@@ -24397,8 +24444,8 @@
             </p:pic>
           </mc:Fallback>
         </mc:AlternateContent>
-        <mc:AlternateContent xmlns:mc="http://schemas.openxmlformats.org/markup-compatibility/2006">
-          <mc:Choice xmlns:p14="http://schemas.microsoft.com/office/powerpoint/2010/main" Requires="p14">
+        <mc:AlternateContent xmlns:mc="http://schemas.openxmlformats.org/markup-compatibility/2006" xmlns:p14="http://schemas.microsoft.com/office/powerpoint/2010/main">
+          <mc:Choice Requires="p14">
             <p:contentPart p14:bwMode="auto" r:id="rId16">
               <p14:nvContentPartPr>
                 <p14:cNvPr id="51" name="Ink 50">
@@ -24417,7 +24464,7 @@
               </p14:xfrm>
             </p:contentPart>
           </mc:Choice>
-          <mc:Fallback>
+          <mc:Fallback xmlns="">
             <p:pic>
               <p:nvPicPr>
                 <p:cNvPr id="51" name="Ink 50">
@@ -24448,8 +24495,8 @@
             </p:pic>
           </mc:Fallback>
         </mc:AlternateContent>
-        <mc:AlternateContent xmlns:mc="http://schemas.openxmlformats.org/markup-compatibility/2006">
-          <mc:Choice xmlns:p14="http://schemas.microsoft.com/office/powerpoint/2010/main" Requires="p14">
+        <mc:AlternateContent xmlns:mc="http://schemas.openxmlformats.org/markup-compatibility/2006" xmlns:p14="http://schemas.microsoft.com/office/powerpoint/2010/main">
+          <mc:Choice Requires="p14">
             <p:contentPart p14:bwMode="auto" r:id="rId18">
               <p14:nvContentPartPr>
                 <p14:cNvPr id="53" name="Ink 52">
@@ -24468,7 +24515,7 @@
               </p14:xfrm>
             </p:contentPart>
           </mc:Choice>
-          <mc:Fallback>
+          <mc:Fallback xmlns="">
             <p:pic>
               <p:nvPicPr>
                 <p:cNvPr id="53" name="Ink 52">
@@ -24499,8 +24546,8 @@
             </p:pic>
           </mc:Fallback>
         </mc:AlternateContent>
-        <mc:AlternateContent xmlns:mc="http://schemas.openxmlformats.org/markup-compatibility/2006">
-          <mc:Choice xmlns:p14="http://schemas.microsoft.com/office/powerpoint/2010/main" Requires="p14">
+        <mc:AlternateContent xmlns:mc="http://schemas.openxmlformats.org/markup-compatibility/2006" xmlns:p14="http://schemas.microsoft.com/office/powerpoint/2010/main">
+          <mc:Choice Requires="p14">
             <p:contentPart p14:bwMode="auto" r:id="rId20">
               <p14:nvContentPartPr>
                 <p14:cNvPr id="58" name="Ink 57">
@@ -24519,7 +24566,7 @@
               </p14:xfrm>
             </p:contentPart>
           </mc:Choice>
-          <mc:Fallback>
+          <mc:Fallback xmlns="">
             <p:pic>
               <p:nvPicPr>
                 <p:cNvPr id="58" name="Ink 57">
@@ -24550,8 +24597,8 @@
             </p:pic>
           </mc:Fallback>
         </mc:AlternateContent>
-        <mc:AlternateContent xmlns:mc="http://schemas.openxmlformats.org/markup-compatibility/2006">
-          <mc:Choice xmlns:p14="http://schemas.microsoft.com/office/powerpoint/2010/main" Requires="p14">
+        <mc:AlternateContent xmlns:mc="http://schemas.openxmlformats.org/markup-compatibility/2006" xmlns:p14="http://schemas.microsoft.com/office/powerpoint/2010/main">
+          <mc:Choice Requires="p14">
             <p:contentPart p14:bwMode="auto" r:id="rId22">
               <p14:nvContentPartPr>
                 <p14:cNvPr id="23" name="Ink 22">
@@ -24570,7 +24617,7 @@
               </p14:xfrm>
             </p:contentPart>
           </mc:Choice>
-          <mc:Fallback>
+          <mc:Fallback xmlns="">
             <p:pic>
               <p:nvPicPr>
                 <p:cNvPr id="23" name="Ink 22">
@@ -24601,8 +24648,8 @@
             </p:pic>
           </mc:Fallback>
         </mc:AlternateContent>
-        <mc:AlternateContent xmlns:mc="http://schemas.openxmlformats.org/markup-compatibility/2006">
-          <mc:Choice xmlns:p14="http://schemas.microsoft.com/office/powerpoint/2010/main" Requires="p14">
+        <mc:AlternateContent xmlns:mc="http://schemas.openxmlformats.org/markup-compatibility/2006" xmlns:p14="http://schemas.microsoft.com/office/powerpoint/2010/main">
+          <mc:Choice Requires="p14">
             <p:contentPart p14:bwMode="auto" r:id="rId24">
               <p14:nvContentPartPr>
                 <p14:cNvPr id="30" name="Ink 29">
@@ -24621,7 +24668,7 @@
               </p14:xfrm>
             </p:contentPart>
           </mc:Choice>
-          <mc:Fallback>
+          <mc:Fallback xmlns="">
             <p:pic>
               <p:nvPicPr>
                 <p:cNvPr id="30" name="Ink 29">
@@ -24652,8 +24699,8 @@
             </p:pic>
           </mc:Fallback>
         </mc:AlternateContent>
-        <mc:AlternateContent xmlns:mc="http://schemas.openxmlformats.org/markup-compatibility/2006">
-          <mc:Choice xmlns:p14="http://schemas.microsoft.com/office/powerpoint/2010/main" Requires="p14">
+        <mc:AlternateContent xmlns:mc="http://schemas.openxmlformats.org/markup-compatibility/2006" xmlns:p14="http://schemas.microsoft.com/office/powerpoint/2010/main">
+          <mc:Choice Requires="p14">
             <p:contentPart p14:bwMode="auto" r:id="rId26">
               <p14:nvContentPartPr>
                 <p14:cNvPr id="39" name="Ink 38">
@@ -24672,7 +24719,7 @@
               </p14:xfrm>
             </p:contentPart>
           </mc:Choice>
-          <mc:Fallback>
+          <mc:Fallback xmlns="">
             <p:pic>
               <p:nvPicPr>
                 <p:cNvPr id="39" name="Ink 38">
@@ -24703,8 +24750,8 @@
             </p:pic>
           </mc:Fallback>
         </mc:AlternateContent>
-        <mc:AlternateContent xmlns:mc="http://schemas.openxmlformats.org/markup-compatibility/2006">
-          <mc:Choice xmlns:p14="http://schemas.microsoft.com/office/powerpoint/2010/main" Requires="p14">
+        <mc:AlternateContent xmlns:mc="http://schemas.openxmlformats.org/markup-compatibility/2006" xmlns:p14="http://schemas.microsoft.com/office/powerpoint/2010/main">
+          <mc:Choice Requires="p14">
             <p:contentPart p14:bwMode="auto" r:id="rId28">
               <p14:nvContentPartPr>
                 <p14:cNvPr id="72" name="Ink 71">
@@ -24723,7 +24770,7 @@
               </p14:xfrm>
             </p:contentPart>
           </mc:Choice>
-          <mc:Fallback>
+          <mc:Fallback xmlns="">
             <p:pic>
               <p:nvPicPr>
                 <p:cNvPr id="72" name="Ink 71">
@@ -24754,8 +24801,8 @@
             </p:pic>
           </mc:Fallback>
         </mc:AlternateContent>
-        <mc:AlternateContent xmlns:mc="http://schemas.openxmlformats.org/markup-compatibility/2006">
-          <mc:Choice xmlns:p14="http://schemas.microsoft.com/office/powerpoint/2010/main" Requires="p14">
+        <mc:AlternateContent xmlns:mc="http://schemas.openxmlformats.org/markup-compatibility/2006" xmlns:p14="http://schemas.microsoft.com/office/powerpoint/2010/main">
+          <mc:Choice Requires="p14">
             <p:contentPart p14:bwMode="auto" r:id="rId30">
               <p14:nvContentPartPr>
                 <p14:cNvPr id="84" name="Ink 83">
@@ -24774,7 +24821,7 @@
               </p14:xfrm>
             </p:contentPart>
           </mc:Choice>
-          <mc:Fallback>
+          <mc:Fallback xmlns="">
             <p:pic>
               <p:nvPicPr>
                 <p:cNvPr id="84" name="Ink 83">
@@ -24805,8 +24852,8 @@
             </p:pic>
           </mc:Fallback>
         </mc:AlternateContent>
-        <mc:AlternateContent xmlns:mc="http://schemas.openxmlformats.org/markup-compatibility/2006">
-          <mc:Choice xmlns:p14="http://schemas.microsoft.com/office/powerpoint/2010/main" Requires="p14">
+        <mc:AlternateContent xmlns:mc="http://schemas.openxmlformats.org/markup-compatibility/2006" xmlns:p14="http://schemas.microsoft.com/office/powerpoint/2010/main">
+          <mc:Choice Requires="p14">
             <p:contentPart p14:bwMode="auto" r:id="rId32">
               <p14:nvContentPartPr>
                 <p14:cNvPr id="86" name="Ink 85">
@@ -24825,7 +24872,7 @@
               </p14:xfrm>
             </p:contentPart>
           </mc:Choice>
-          <mc:Fallback>
+          <mc:Fallback xmlns="">
             <p:pic>
               <p:nvPicPr>
                 <p:cNvPr id="86" name="Ink 85">
@@ -24856,8 +24903,8 @@
             </p:pic>
           </mc:Fallback>
         </mc:AlternateContent>
-        <mc:AlternateContent xmlns:mc="http://schemas.openxmlformats.org/markup-compatibility/2006">
-          <mc:Choice xmlns:p14="http://schemas.microsoft.com/office/powerpoint/2010/main" Requires="p14">
+        <mc:AlternateContent xmlns:mc="http://schemas.openxmlformats.org/markup-compatibility/2006" xmlns:p14="http://schemas.microsoft.com/office/powerpoint/2010/main">
+          <mc:Choice Requires="p14">
             <p:contentPart p14:bwMode="auto" r:id="rId34">
               <p14:nvContentPartPr>
                 <p14:cNvPr id="88" name="Ink 87">
@@ -24876,7 +24923,7 @@
               </p14:xfrm>
             </p:contentPart>
           </mc:Choice>
-          <mc:Fallback>
+          <mc:Fallback xmlns="">
             <p:pic>
               <p:nvPicPr>
                 <p:cNvPr id="88" name="Ink 87">
@@ -24907,8 +24954,8 @@
             </p:pic>
           </mc:Fallback>
         </mc:AlternateContent>
-        <mc:AlternateContent xmlns:mc="http://schemas.openxmlformats.org/markup-compatibility/2006">
-          <mc:Choice xmlns:p14="http://schemas.microsoft.com/office/powerpoint/2010/main" Requires="p14">
+        <mc:AlternateContent xmlns:mc="http://schemas.openxmlformats.org/markup-compatibility/2006" xmlns:p14="http://schemas.microsoft.com/office/powerpoint/2010/main">
+          <mc:Choice Requires="p14">
             <p:contentPart p14:bwMode="auto" r:id="rId36">
               <p14:nvContentPartPr>
                 <p14:cNvPr id="89" name="Ink 88">
@@ -24927,7 +24974,7 @@
               </p14:xfrm>
             </p:contentPart>
           </mc:Choice>
-          <mc:Fallback>
+          <mc:Fallback xmlns="">
             <p:pic>
               <p:nvPicPr>
                 <p:cNvPr id="89" name="Ink 88">
@@ -24958,8 +25005,8 @@
             </p:pic>
           </mc:Fallback>
         </mc:AlternateContent>
-        <mc:AlternateContent xmlns:mc="http://schemas.openxmlformats.org/markup-compatibility/2006">
-          <mc:Choice xmlns:p14="http://schemas.microsoft.com/office/powerpoint/2010/main" Requires="p14">
+        <mc:AlternateContent xmlns:mc="http://schemas.openxmlformats.org/markup-compatibility/2006" xmlns:p14="http://schemas.microsoft.com/office/powerpoint/2010/main">
+          <mc:Choice Requires="p14">
             <p:contentPart p14:bwMode="auto" r:id="rId38">
               <p14:nvContentPartPr>
                 <p14:cNvPr id="91" name="Ink 90">
@@ -24978,7 +25025,7 @@
               </p14:xfrm>
             </p:contentPart>
           </mc:Choice>
-          <mc:Fallback>
+          <mc:Fallback xmlns="">
             <p:pic>
               <p:nvPicPr>
                 <p:cNvPr id="91" name="Ink 90">
@@ -25009,8 +25056,8 @@
             </p:pic>
           </mc:Fallback>
         </mc:AlternateContent>
-        <mc:AlternateContent xmlns:mc="http://schemas.openxmlformats.org/markup-compatibility/2006">
-          <mc:Choice xmlns:p14="http://schemas.microsoft.com/office/powerpoint/2010/main" Requires="p14">
+        <mc:AlternateContent xmlns:mc="http://schemas.openxmlformats.org/markup-compatibility/2006" xmlns:p14="http://schemas.microsoft.com/office/powerpoint/2010/main">
+          <mc:Choice Requires="p14">
             <p:contentPart p14:bwMode="auto" r:id="rId40">
               <p14:nvContentPartPr>
                 <p14:cNvPr id="92" name="Ink 91">
@@ -25029,7 +25076,7 @@
               </p14:xfrm>
             </p:contentPart>
           </mc:Choice>
-          <mc:Fallback>
+          <mc:Fallback xmlns="">
             <p:pic>
               <p:nvPicPr>
                 <p:cNvPr id="92" name="Ink 91">
@@ -25060,8 +25107,8 @@
             </p:pic>
           </mc:Fallback>
         </mc:AlternateContent>
-        <mc:AlternateContent xmlns:mc="http://schemas.openxmlformats.org/markup-compatibility/2006">
-          <mc:Choice xmlns:p14="http://schemas.microsoft.com/office/powerpoint/2010/main" Requires="p14">
+        <mc:AlternateContent xmlns:mc="http://schemas.openxmlformats.org/markup-compatibility/2006" xmlns:p14="http://schemas.microsoft.com/office/powerpoint/2010/main">
+          <mc:Choice Requires="p14">
             <p:contentPart p14:bwMode="auto" r:id="rId42">
               <p14:nvContentPartPr>
                 <p14:cNvPr id="93" name="Ink 92">
@@ -25080,7 +25127,7 @@
               </p14:xfrm>
             </p:contentPart>
           </mc:Choice>
-          <mc:Fallback>
+          <mc:Fallback xmlns="">
             <p:pic>
               <p:nvPicPr>
                 <p:cNvPr id="93" name="Ink 92">
@@ -25111,8 +25158,8 @@
             </p:pic>
           </mc:Fallback>
         </mc:AlternateContent>
-        <mc:AlternateContent xmlns:mc="http://schemas.openxmlformats.org/markup-compatibility/2006">
-          <mc:Choice xmlns:p14="http://schemas.microsoft.com/office/powerpoint/2010/main" Requires="p14">
+        <mc:AlternateContent xmlns:mc="http://schemas.openxmlformats.org/markup-compatibility/2006" xmlns:p14="http://schemas.microsoft.com/office/powerpoint/2010/main">
+          <mc:Choice Requires="p14">
             <p:contentPart p14:bwMode="auto" r:id="rId44">
               <p14:nvContentPartPr>
                 <p14:cNvPr id="95" name="Ink 94">
@@ -25131,7 +25178,7 @@
               </p14:xfrm>
             </p:contentPart>
           </mc:Choice>
-          <mc:Fallback>
+          <mc:Fallback xmlns="">
             <p:pic>
               <p:nvPicPr>
                 <p:cNvPr id="95" name="Ink 94">
@@ -25162,8 +25209,8 @@
             </p:pic>
           </mc:Fallback>
         </mc:AlternateContent>
-        <mc:AlternateContent xmlns:mc="http://schemas.openxmlformats.org/markup-compatibility/2006">
-          <mc:Choice xmlns:p14="http://schemas.microsoft.com/office/powerpoint/2010/main" Requires="p14">
+        <mc:AlternateContent xmlns:mc="http://schemas.openxmlformats.org/markup-compatibility/2006" xmlns:p14="http://schemas.microsoft.com/office/powerpoint/2010/main">
+          <mc:Choice Requires="p14">
             <p:contentPart p14:bwMode="auto" r:id="rId46">
               <p14:nvContentPartPr>
                 <p14:cNvPr id="97" name="Ink 96">
@@ -25182,7 +25229,7 @@
               </p14:xfrm>
             </p:contentPart>
           </mc:Choice>
-          <mc:Fallback>
+          <mc:Fallback xmlns="">
             <p:pic>
               <p:nvPicPr>
                 <p:cNvPr id="97" name="Ink 96">
@@ -25213,8 +25260,8 @@
             </p:pic>
           </mc:Fallback>
         </mc:AlternateContent>
-        <mc:AlternateContent xmlns:mc="http://schemas.openxmlformats.org/markup-compatibility/2006">
-          <mc:Choice xmlns:p14="http://schemas.microsoft.com/office/powerpoint/2010/main" Requires="p14">
+        <mc:AlternateContent xmlns:mc="http://schemas.openxmlformats.org/markup-compatibility/2006" xmlns:p14="http://schemas.microsoft.com/office/powerpoint/2010/main">
+          <mc:Choice Requires="p14">
             <p:contentPart p14:bwMode="auto" r:id="rId48">
               <p14:nvContentPartPr>
                 <p14:cNvPr id="98" name="Ink 97">
@@ -25233,7 +25280,7 @@
               </p14:xfrm>
             </p:contentPart>
           </mc:Choice>
-          <mc:Fallback>
+          <mc:Fallback xmlns="">
             <p:pic>
               <p:nvPicPr>
                 <p:cNvPr id="98" name="Ink 97">
@@ -25264,8 +25311,8 @@
             </p:pic>
           </mc:Fallback>
         </mc:AlternateContent>
-        <mc:AlternateContent xmlns:mc="http://schemas.openxmlformats.org/markup-compatibility/2006">
-          <mc:Choice xmlns:p14="http://schemas.microsoft.com/office/powerpoint/2010/main" Requires="p14">
+        <mc:AlternateContent xmlns:mc="http://schemas.openxmlformats.org/markup-compatibility/2006" xmlns:p14="http://schemas.microsoft.com/office/powerpoint/2010/main">
+          <mc:Choice Requires="p14">
             <p:contentPart p14:bwMode="auto" r:id="rId50">
               <p14:nvContentPartPr>
                 <p14:cNvPr id="99" name="Ink 98">
@@ -25284,7 +25331,7 @@
               </p14:xfrm>
             </p:contentPart>
           </mc:Choice>
-          <mc:Fallback>
+          <mc:Fallback xmlns="">
             <p:pic>
               <p:nvPicPr>
                 <p:cNvPr id="99" name="Ink 98">
@@ -25315,8 +25362,8 @@
             </p:pic>
           </mc:Fallback>
         </mc:AlternateContent>
-        <mc:AlternateContent xmlns:mc="http://schemas.openxmlformats.org/markup-compatibility/2006">
-          <mc:Choice xmlns:p14="http://schemas.microsoft.com/office/powerpoint/2010/main" Requires="p14">
+        <mc:AlternateContent xmlns:mc="http://schemas.openxmlformats.org/markup-compatibility/2006" xmlns:p14="http://schemas.microsoft.com/office/powerpoint/2010/main">
+          <mc:Choice Requires="p14">
             <p:contentPart p14:bwMode="auto" r:id="rId52">
               <p14:nvContentPartPr>
                 <p14:cNvPr id="100" name="Ink 99">
@@ -25335,7 +25382,7 @@
               </p14:xfrm>
             </p:contentPart>
           </mc:Choice>
-          <mc:Fallback>
+          <mc:Fallback xmlns="">
             <p:pic>
               <p:nvPicPr>
                 <p:cNvPr id="100" name="Ink 99">
@@ -25367,8 +25414,8 @@
           </mc:Fallback>
         </mc:AlternateContent>
       </p:grpSp>
-      <mc:AlternateContent xmlns:mc="http://schemas.openxmlformats.org/markup-compatibility/2006">
-        <mc:Choice xmlns:p14="http://schemas.microsoft.com/office/powerpoint/2010/main" Requires="p14">
+      <mc:AlternateContent xmlns:mc="http://schemas.openxmlformats.org/markup-compatibility/2006" xmlns:p14="http://schemas.microsoft.com/office/powerpoint/2010/main">
+        <mc:Choice Requires="p14">
           <p:contentPart p14:bwMode="auto" r:id="rId54">
             <p14:nvContentPartPr>
               <p14:cNvPr id="102" name="Ink 101">
@@ -25387,7 +25434,7 @@
             </p14:xfrm>
           </p:contentPart>
         </mc:Choice>
-        <mc:Fallback>
+        <mc:Fallback xmlns="">
           <p:pic>
             <p:nvPicPr>
               <p:cNvPr id="102" name="Ink 101">
@@ -25418,8 +25465,8 @@
           </p:pic>
         </mc:Fallback>
       </mc:AlternateContent>
-      <mc:AlternateContent xmlns:mc="http://schemas.openxmlformats.org/markup-compatibility/2006">
-        <mc:Choice xmlns:p14="http://schemas.microsoft.com/office/powerpoint/2010/main" Requires="p14">
+      <mc:AlternateContent xmlns:mc="http://schemas.openxmlformats.org/markup-compatibility/2006" xmlns:p14="http://schemas.microsoft.com/office/powerpoint/2010/main">
+        <mc:Choice Requires="p14">
           <p:contentPart p14:bwMode="auto" r:id="rId56">
             <p14:nvContentPartPr>
               <p14:cNvPr id="103" name="Ink 102">
@@ -25438,7 +25485,7 @@
             </p14:xfrm>
           </p:contentPart>
         </mc:Choice>
-        <mc:Fallback>
+        <mc:Fallback xmlns="">
           <p:pic>
             <p:nvPicPr>
               <p:cNvPr id="103" name="Ink 102">
@@ -25469,8 +25516,8 @@
           </p:pic>
         </mc:Fallback>
       </mc:AlternateContent>
-      <mc:AlternateContent xmlns:mc="http://schemas.openxmlformats.org/markup-compatibility/2006">
-        <mc:Choice xmlns:p14="http://schemas.microsoft.com/office/powerpoint/2010/main" Requires="p14">
+      <mc:AlternateContent xmlns:mc="http://schemas.openxmlformats.org/markup-compatibility/2006" xmlns:p14="http://schemas.microsoft.com/office/powerpoint/2010/main">
+        <mc:Choice Requires="p14">
           <p:contentPart p14:bwMode="auto" r:id="rId58">
             <p14:nvContentPartPr>
               <p14:cNvPr id="104" name="Ink 103">
@@ -25489,7 +25536,7 @@
             </p14:xfrm>
           </p:contentPart>
         </mc:Choice>
-        <mc:Fallback>
+        <mc:Fallback xmlns="">
           <p:pic>
             <p:nvPicPr>
               <p:cNvPr id="104" name="Ink 103">
@@ -25520,8 +25567,8 @@
           </p:pic>
         </mc:Fallback>
       </mc:AlternateContent>
-      <mc:AlternateContent xmlns:mc="http://schemas.openxmlformats.org/markup-compatibility/2006">
-        <mc:Choice xmlns:p14="http://schemas.microsoft.com/office/powerpoint/2010/main" Requires="p14">
+      <mc:AlternateContent xmlns:mc="http://schemas.openxmlformats.org/markup-compatibility/2006" xmlns:p14="http://schemas.microsoft.com/office/powerpoint/2010/main">
+        <mc:Choice Requires="p14">
           <p:contentPart p14:bwMode="auto" r:id="rId60">
             <p14:nvContentPartPr>
               <p14:cNvPr id="105" name="Ink 104">
@@ -25540,7 +25587,7 @@
             </p14:xfrm>
           </p:contentPart>
         </mc:Choice>
-        <mc:Fallback>
+        <mc:Fallback xmlns="">
           <p:pic>
             <p:nvPicPr>
               <p:cNvPr id="105" name="Ink 104">
@@ -25571,8 +25618,8 @@
           </p:pic>
         </mc:Fallback>
       </mc:AlternateContent>
-      <mc:AlternateContent xmlns:mc="http://schemas.openxmlformats.org/markup-compatibility/2006">
-        <mc:Choice xmlns:p14="http://schemas.microsoft.com/office/powerpoint/2010/main" Requires="p14">
+      <mc:AlternateContent xmlns:mc="http://schemas.openxmlformats.org/markup-compatibility/2006" xmlns:p14="http://schemas.microsoft.com/office/powerpoint/2010/main">
+        <mc:Choice Requires="p14">
           <p:contentPart p14:bwMode="auto" r:id="rId62">
             <p14:nvContentPartPr>
               <p14:cNvPr id="118" name="Ink 117">
@@ -25591,7 +25638,7 @@
             </p14:xfrm>
           </p:contentPart>
         </mc:Choice>
-        <mc:Fallback>
+        <mc:Fallback xmlns="">
           <p:pic>
             <p:nvPicPr>
               <p:cNvPr id="118" name="Ink 117">
@@ -25642,8 +25689,8 @@
             <a:chExt cx="6757200" cy="1902600"/>
           </a:xfrm>
         </p:grpSpPr>
-        <mc:AlternateContent xmlns:mc="http://schemas.openxmlformats.org/markup-compatibility/2006">
-          <mc:Choice xmlns:p14="http://schemas.microsoft.com/office/powerpoint/2010/main" Requires="p14">
+        <mc:AlternateContent xmlns:mc="http://schemas.openxmlformats.org/markup-compatibility/2006" xmlns:p14="http://schemas.microsoft.com/office/powerpoint/2010/main">
+          <mc:Choice Requires="p14">
             <p:contentPart p14:bwMode="auto" r:id="rId64">
               <p14:nvContentPartPr>
                 <p14:cNvPr id="116" name="Ink 115">
@@ -25662,7 +25709,7 @@
               </p14:xfrm>
             </p:contentPart>
           </mc:Choice>
-          <mc:Fallback>
+          <mc:Fallback xmlns="">
             <p:pic>
               <p:nvPicPr>
                 <p:cNvPr id="116" name="Ink 115">
@@ -25693,8 +25740,8 @@
             </p:pic>
           </mc:Fallback>
         </mc:AlternateContent>
-        <mc:AlternateContent xmlns:mc="http://schemas.openxmlformats.org/markup-compatibility/2006">
-          <mc:Choice xmlns:p14="http://schemas.microsoft.com/office/powerpoint/2010/main" Requires="p14">
+        <mc:AlternateContent xmlns:mc="http://schemas.openxmlformats.org/markup-compatibility/2006" xmlns:p14="http://schemas.microsoft.com/office/powerpoint/2010/main">
+          <mc:Choice Requires="p14">
             <p:contentPart p14:bwMode="auto" r:id="rId66">
               <p14:nvContentPartPr>
                 <p14:cNvPr id="117" name="Ink 116">
@@ -25713,7 +25760,7 @@
               </p14:xfrm>
             </p:contentPart>
           </mc:Choice>
-          <mc:Fallback>
+          <mc:Fallback xmlns="">
             <p:pic>
               <p:nvPicPr>
                 <p:cNvPr id="117" name="Ink 116">
@@ -25744,8 +25791,8 @@
             </p:pic>
           </mc:Fallback>
         </mc:AlternateContent>
-        <mc:AlternateContent xmlns:mc="http://schemas.openxmlformats.org/markup-compatibility/2006">
-          <mc:Choice xmlns:p14="http://schemas.microsoft.com/office/powerpoint/2010/main" Requires="p14">
+        <mc:AlternateContent xmlns:mc="http://schemas.openxmlformats.org/markup-compatibility/2006" xmlns:p14="http://schemas.microsoft.com/office/powerpoint/2010/main">
+          <mc:Choice Requires="p14">
             <p:contentPart p14:bwMode="auto" r:id="rId68">
               <p14:nvContentPartPr>
                 <p14:cNvPr id="106" name="Ink 105">
@@ -25764,7 +25811,7 @@
               </p14:xfrm>
             </p:contentPart>
           </mc:Choice>
-          <mc:Fallback>
+          <mc:Fallback xmlns="">
             <p:pic>
               <p:nvPicPr>
                 <p:cNvPr id="106" name="Ink 105">
@@ -25795,8 +25842,8 @@
             </p:pic>
           </mc:Fallback>
         </mc:AlternateContent>
-        <mc:AlternateContent xmlns:mc="http://schemas.openxmlformats.org/markup-compatibility/2006">
-          <mc:Choice xmlns:p14="http://schemas.microsoft.com/office/powerpoint/2010/main" Requires="p14">
+        <mc:AlternateContent xmlns:mc="http://schemas.openxmlformats.org/markup-compatibility/2006" xmlns:p14="http://schemas.microsoft.com/office/powerpoint/2010/main">
+          <mc:Choice Requires="p14">
             <p:contentPart p14:bwMode="auto" r:id="rId70">
               <p14:nvContentPartPr>
                 <p14:cNvPr id="107" name="Ink 106">
@@ -25815,7 +25862,7 @@
               </p14:xfrm>
             </p:contentPart>
           </mc:Choice>
-          <mc:Fallback>
+          <mc:Fallback xmlns="">
             <p:pic>
               <p:nvPicPr>
                 <p:cNvPr id="107" name="Ink 106">
@@ -25846,8 +25893,8 @@
             </p:pic>
           </mc:Fallback>
         </mc:AlternateContent>
-        <mc:AlternateContent xmlns:mc="http://schemas.openxmlformats.org/markup-compatibility/2006">
-          <mc:Choice xmlns:p14="http://schemas.microsoft.com/office/powerpoint/2010/main" Requires="p14">
+        <mc:AlternateContent xmlns:mc="http://schemas.openxmlformats.org/markup-compatibility/2006" xmlns:p14="http://schemas.microsoft.com/office/powerpoint/2010/main">
+          <mc:Choice Requires="p14">
             <p:contentPart p14:bwMode="auto" r:id="rId72">
               <p14:nvContentPartPr>
                 <p14:cNvPr id="108" name="Ink 107">
@@ -25866,7 +25913,7 @@
               </p14:xfrm>
             </p:contentPart>
           </mc:Choice>
-          <mc:Fallback>
+          <mc:Fallback xmlns="">
             <p:pic>
               <p:nvPicPr>
                 <p:cNvPr id="108" name="Ink 107">
@@ -25897,8 +25944,8 @@
             </p:pic>
           </mc:Fallback>
         </mc:AlternateContent>
-        <mc:AlternateContent xmlns:mc="http://schemas.openxmlformats.org/markup-compatibility/2006">
-          <mc:Choice xmlns:p14="http://schemas.microsoft.com/office/powerpoint/2010/main" Requires="p14">
+        <mc:AlternateContent xmlns:mc="http://schemas.openxmlformats.org/markup-compatibility/2006" xmlns:p14="http://schemas.microsoft.com/office/powerpoint/2010/main">
+          <mc:Choice Requires="p14">
             <p:contentPart p14:bwMode="auto" r:id="rId74">
               <p14:nvContentPartPr>
                 <p14:cNvPr id="109" name="Ink 108">
@@ -25917,7 +25964,7 @@
               </p14:xfrm>
             </p:contentPart>
           </mc:Choice>
-          <mc:Fallback>
+          <mc:Fallback xmlns="">
             <p:pic>
               <p:nvPicPr>
                 <p:cNvPr id="109" name="Ink 108">
@@ -25948,8 +25995,8 @@
             </p:pic>
           </mc:Fallback>
         </mc:AlternateContent>
-        <mc:AlternateContent xmlns:mc="http://schemas.openxmlformats.org/markup-compatibility/2006">
-          <mc:Choice xmlns:p14="http://schemas.microsoft.com/office/powerpoint/2010/main" Requires="p14">
+        <mc:AlternateContent xmlns:mc="http://schemas.openxmlformats.org/markup-compatibility/2006" xmlns:p14="http://schemas.microsoft.com/office/powerpoint/2010/main">
+          <mc:Choice Requires="p14">
             <p:contentPart p14:bwMode="auto" r:id="rId76">
               <p14:nvContentPartPr>
                 <p14:cNvPr id="110" name="Ink 109">
@@ -25968,7 +26015,7 @@
               </p14:xfrm>
             </p:contentPart>
           </mc:Choice>
-          <mc:Fallback>
+          <mc:Fallback xmlns="">
             <p:pic>
               <p:nvPicPr>
                 <p:cNvPr id="110" name="Ink 109">
@@ -25999,8 +26046,8 @@
             </p:pic>
           </mc:Fallback>
         </mc:AlternateContent>
-        <mc:AlternateContent xmlns:mc="http://schemas.openxmlformats.org/markup-compatibility/2006">
-          <mc:Choice xmlns:p14="http://schemas.microsoft.com/office/powerpoint/2010/main" Requires="p14">
+        <mc:AlternateContent xmlns:mc="http://schemas.openxmlformats.org/markup-compatibility/2006" xmlns:p14="http://schemas.microsoft.com/office/powerpoint/2010/main">
+          <mc:Choice Requires="p14">
             <p:contentPart p14:bwMode="auto" r:id="rId78">
               <p14:nvContentPartPr>
                 <p14:cNvPr id="112" name="Ink 111">
@@ -26019,7 +26066,7 @@
               </p14:xfrm>
             </p:contentPart>
           </mc:Choice>
-          <mc:Fallback>
+          <mc:Fallback xmlns="">
             <p:pic>
               <p:nvPicPr>
                 <p:cNvPr id="112" name="Ink 111">
@@ -26050,8 +26097,8 @@
             </p:pic>
           </mc:Fallback>
         </mc:AlternateContent>
-        <mc:AlternateContent xmlns:mc="http://schemas.openxmlformats.org/markup-compatibility/2006">
-          <mc:Choice xmlns:p14="http://schemas.microsoft.com/office/powerpoint/2010/main" Requires="p14">
+        <mc:AlternateContent xmlns:mc="http://schemas.openxmlformats.org/markup-compatibility/2006" xmlns:p14="http://schemas.microsoft.com/office/powerpoint/2010/main">
+          <mc:Choice Requires="p14">
             <p:contentPart p14:bwMode="auto" r:id="rId80">
               <p14:nvContentPartPr>
                 <p14:cNvPr id="113" name="Ink 112">
@@ -26070,7 +26117,7 @@
               </p14:xfrm>
             </p:contentPart>
           </mc:Choice>
-          <mc:Fallback>
+          <mc:Fallback xmlns="">
             <p:pic>
               <p:nvPicPr>
                 <p:cNvPr id="113" name="Ink 112">
@@ -26101,8 +26148,8 @@
             </p:pic>
           </mc:Fallback>
         </mc:AlternateContent>
-        <mc:AlternateContent xmlns:mc="http://schemas.openxmlformats.org/markup-compatibility/2006">
-          <mc:Choice xmlns:p14="http://schemas.microsoft.com/office/powerpoint/2010/main" Requires="p14">
+        <mc:AlternateContent xmlns:mc="http://schemas.openxmlformats.org/markup-compatibility/2006" xmlns:p14="http://schemas.microsoft.com/office/powerpoint/2010/main">
+          <mc:Choice Requires="p14">
             <p:contentPart p14:bwMode="auto" r:id="rId82">
               <p14:nvContentPartPr>
                 <p14:cNvPr id="114" name="Ink 113">
@@ -26121,7 +26168,7 @@
               </p14:xfrm>
             </p:contentPart>
           </mc:Choice>
-          <mc:Fallback>
+          <mc:Fallback xmlns="">
             <p:pic>
               <p:nvPicPr>
                 <p:cNvPr id="114" name="Ink 113">
@@ -26152,8 +26199,8 @@
             </p:pic>
           </mc:Fallback>
         </mc:AlternateContent>
-        <mc:AlternateContent xmlns:mc="http://schemas.openxmlformats.org/markup-compatibility/2006">
-          <mc:Choice xmlns:p14="http://schemas.microsoft.com/office/powerpoint/2010/main" Requires="p14">
+        <mc:AlternateContent xmlns:mc="http://schemas.openxmlformats.org/markup-compatibility/2006" xmlns:p14="http://schemas.microsoft.com/office/powerpoint/2010/main">
+          <mc:Choice Requires="p14">
             <p:contentPart p14:bwMode="auto" r:id="rId84">
               <p14:nvContentPartPr>
                 <p14:cNvPr id="119" name="Ink 118">
@@ -26172,7 +26219,7 @@
               </p14:xfrm>
             </p:contentPart>
           </mc:Choice>
-          <mc:Fallback>
+          <mc:Fallback xmlns="">
             <p:pic>
               <p:nvPicPr>
                 <p:cNvPr id="119" name="Ink 118">
@@ -26203,8 +26250,8 @@
             </p:pic>
           </mc:Fallback>
         </mc:AlternateContent>
-        <mc:AlternateContent xmlns:mc="http://schemas.openxmlformats.org/markup-compatibility/2006">
-          <mc:Choice xmlns:p14="http://schemas.microsoft.com/office/powerpoint/2010/main" Requires="p14">
+        <mc:AlternateContent xmlns:mc="http://schemas.openxmlformats.org/markup-compatibility/2006" xmlns:p14="http://schemas.microsoft.com/office/powerpoint/2010/main">
+          <mc:Choice Requires="p14">
             <p:contentPart p14:bwMode="auto" r:id="rId86">
               <p14:nvContentPartPr>
                 <p14:cNvPr id="120" name="Ink 119">
@@ -26223,7 +26270,7 @@
               </p14:xfrm>
             </p:contentPart>
           </mc:Choice>
-          <mc:Fallback>
+          <mc:Fallback xmlns="">
             <p:pic>
               <p:nvPicPr>
                 <p:cNvPr id="120" name="Ink 119">
@@ -26254,8 +26301,8 @@
             </p:pic>
           </mc:Fallback>
         </mc:AlternateContent>
-        <mc:AlternateContent xmlns:mc="http://schemas.openxmlformats.org/markup-compatibility/2006">
-          <mc:Choice xmlns:p14="http://schemas.microsoft.com/office/powerpoint/2010/main" Requires="p14">
+        <mc:AlternateContent xmlns:mc="http://schemas.openxmlformats.org/markup-compatibility/2006" xmlns:p14="http://schemas.microsoft.com/office/powerpoint/2010/main">
+          <mc:Choice Requires="p14">
             <p:contentPart p14:bwMode="auto" r:id="rId88">
               <p14:nvContentPartPr>
                 <p14:cNvPr id="122" name="Ink 121">
@@ -26274,7 +26321,7 @@
               </p14:xfrm>
             </p:contentPart>
           </mc:Choice>
-          <mc:Fallback>
+          <mc:Fallback xmlns="">
             <p:pic>
               <p:nvPicPr>
                 <p:cNvPr id="122" name="Ink 121">
@@ -26305,8 +26352,8 @@
             </p:pic>
           </mc:Fallback>
         </mc:AlternateContent>
-        <mc:AlternateContent xmlns:mc="http://schemas.openxmlformats.org/markup-compatibility/2006">
-          <mc:Choice xmlns:p14="http://schemas.microsoft.com/office/powerpoint/2010/main" Requires="p14">
+        <mc:AlternateContent xmlns:mc="http://schemas.openxmlformats.org/markup-compatibility/2006" xmlns:p14="http://schemas.microsoft.com/office/powerpoint/2010/main">
+          <mc:Choice Requires="p14">
             <p:contentPart p14:bwMode="auto" r:id="rId90">
               <p14:nvContentPartPr>
                 <p14:cNvPr id="123" name="Ink 122">
@@ -26325,7 +26372,7 @@
               </p14:xfrm>
             </p:contentPart>
           </mc:Choice>
-          <mc:Fallback>
+          <mc:Fallback xmlns="">
             <p:pic>
               <p:nvPicPr>
                 <p:cNvPr id="123" name="Ink 122">
@@ -27064,8 +27111,8 @@
             <a:chExt cx="10551240" cy="5608800"/>
           </a:xfrm>
         </p:grpSpPr>
-        <mc:AlternateContent xmlns:mc="http://schemas.openxmlformats.org/markup-compatibility/2006">
-          <mc:Choice xmlns:p14="http://schemas.microsoft.com/office/powerpoint/2010/main" Requires="p14">
+        <mc:AlternateContent xmlns:mc="http://schemas.openxmlformats.org/markup-compatibility/2006" xmlns:p14="http://schemas.microsoft.com/office/powerpoint/2010/main">
+          <mc:Choice Requires="p14">
             <p:contentPart p14:bwMode="auto" r:id="rId9">
               <p14:nvContentPartPr>
                 <p14:cNvPr id="11" name="Ink 10">
@@ -27084,7 +27131,7 @@
               </p14:xfrm>
             </p:contentPart>
           </mc:Choice>
-          <mc:Fallback>
+          <mc:Fallback xmlns="">
             <p:pic>
               <p:nvPicPr>
                 <p:cNvPr id="11" name="Ink 10">
@@ -27115,8 +27162,8 @@
             </p:pic>
           </mc:Fallback>
         </mc:AlternateContent>
-        <mc:AlternateContent xmlns:mc="http://schemas.openxmlformats.org/markup-compatibility/2006">
-          <mc:Choice xmlns:p14="http://schemas.microsoft.com/office/powerpoint/2010/main" Requires="p14">
+        <mc:AlternateContent xmlns:mc="http://schemas.openxmlformats.org/markup-compatibility/2006" xmlns:p14="http://schemas.microsoft.com/office/powerpoint/2010/main">
+          <mc:Choice Requires="p14">
             <p:contentPart p14:bwMode="auto" r:id="rId11">
               <p14:nvContentPartPr>
                 <p14:cNvPr id="19" name="Ink 18">
@@ -27135,7 +27182,7 @@
               </p14:xfrm>
             </p:contentPart>
           </mc:Choice>
-          <mc:Fallback>
+          <mc:Fallback xmlns="">
             <p:pic>
               <p:nvPicPr>
                 <p:cNvPr id="19" name="Ink 18">
@@ -27166,8 +27213,8 @@
             </p:pic>
           </mc:Fallback>
         </mc:AlternateContent>
-        <mc:AlternateContent xmlns:mc="http://schemas.openxmlformats.org/markup-compatibility/2006">
-          <mc:Choice xmlns:p14="http://schemas.microsoft.com/office/powerpoint/2010/main" Requires="p14">
+        <mc:AlternateContent xmlns:mc="http://schemas.openxmlformats.org/markup-compatibility/2006" xmlns:p14="http://schemas.microsoft.com/office/powerpoint/2010/main">
+          <mc:Choice Requires="p14">
             <p:contentPart p14:bwMode="auto" r:id="rId13">
               <p14:nvContentPartPr>
                 <p14:cNvPr id="21" name="Ink 20">
@@ -27186,7 +27233,7 @@
               </p14:xfrm>
             </p:contentPart>
           </mc:Choice>
-          <mc:Fallback>
+          <mc:Fallback xmlns="">
             <p:pic>
               <p:nvPicPr>
                 <p:cNvPr id="21" name="Ink 20">
@@ -27217,8 +27264,8 @@
             </p:pic>
           </mc:Fallback>
         </mc:AlternateContent>
-        <mc:AlternateContent xmlns:mc="http://schemas.openxmlformats.org/markup-compatibility/2006">
-          <mc:Choice xmlns:p14="http://schemas.microsoft.com/office/powerpoint/2010/main" Requires="p14">
+        <mc:AlternateContent xmlns:mc="http://schemas.openxmlformats.org/markup-compatibility/2006" xmlns:p14="http://schemas.microsoft.com/office/powerpoint/2010/main">
+          <mc:Choice Requires="p14">
             <p:contentPart p14:bwMode="auto" r:id="rId15">
               <p14:nvContentPartPr>
                 <p14:cNvPr id="23" name="Ink 22">
@@ -27237,7 +27284,7 @@
               </p14:xfrm>
             </p:contentPart>
           </mc:Choice>
-          <mc:Fallback>
+          <mc:Fallback xmlns="">
             <p:pic>
               <p:nvPicPr>
                 <p:cNvPr id="23" name="Ink 22">
@@ -27268,8 +27315,8 @@
             </p:pic>
           </mc:Fallback>
         </mc:AlternateContent>
-        <mc:AlternateContent xmlns:mc="http://schemas.openxmlformats.org/markup-compatibility/2006">
-          <mc:Choice xmlns:p14="http://schemas.microsoft.com/office/powerpoint/2010/main" Requires="p14">
+        <mc:AlternateContent xmlns:mc="http://schemas.openxmlformats.org/markup-compatibility/2006" xmlns:p14="http://schemas.microsoft.com/office/powerpoint/2010/main">
+          <mc:Choice Requires="p14">
             <p:contentPart p14:bwMode="auto" r:id="rId17">
               <p14:nvContentPartPr>
                 <p14:cNvPr id="29" name="Ink 28">
@@ -27288,7 +27335,7 @@
               </p14:xfrm>
             </p:contentPart>
           </mc:Choice>
-          <mc:Fallback>
+          <mc:Fallback xmlns="">
             <p:pic>
               <p:nvPicPr>
                 <p:cNvPr id="29" name="Ink 28">
@@ -27319,8 +27366,8 @@
             </p:pic>
           </mc:Fallback>
         </mc:AlternateContent>
-        <mc:AlternateContent xmlns:mc="http://schemas.openxmlformats.org/markup-compatibility/2006">
-          <mc:Choice xmlns:p14="http://schemas.microsoft.com/office/powerpoint/2010/main" Requires="p14">
+        <mc:AlternateContent xmlns:mc="http://schemas.openxmlformats.org/markup-compatibility/2006" xmlns:p14="http://schemas.microsoft.com/office/powerpoint/2010/main">
+          <mc:Choice Requires="p14">
             <p:contentPart p14:bwMode="auto" r:id="rId19">
               <p14:nvContentPartPr>
                 <p14:cNvPr id="31" name="Ink 30">
@@ -27339,7 +27386,7 @@
               </p14:xfrm>
             </p:contentPart>
           </mc:Choice>
-          <mc:Fallback>
+          <mc:Fallback xmlns="">
             <p:pic>
               <p:nvPicPr>
                 <p:cNvPr id="31" name="Ink 30">
@@ -27370,8 +27417,8 @@
             </p:pic>
           </mc:Fallback>
         </mc:AlternateContent>
-        <mc:AlternateContent xmlns:mc="http://schemas.openxmlformats.org/markup-compatibility/2006">
-          <mc:Choice xmlns:p14="http://schemas.microsoft.com/office/powerpoint/2010/main" Requires="p14">
+        <mc:AlternateContent xmlns:mc="http://schemas.openxmlformats.org/markup-compatibility/2006" xmlns:p14="http://schemas.microsoft.com/office/powerpoint/2010/main">
+          <mc:Choice Requires="p14">
             <p:contentPart p14:bwMode="auto" r:id="rId21">
               <p14:nvContentPartPr>
                 <p14:cNvPr id="42" name="Ink 41">
@@ -27390,7 +27437,7 @@
               </p14:xfrm>
             </p:contentPart>
           </mc:Choice>
-          <mc:Fallback>
+          <mc:Fallback xmlns="">
             <p:pic>
               <p:nvPicPr>
                 <p:cNvPr id="42" name="Ink 41">
@@ -27421,8 +27468,8 @@
             </p:pic>
           </mc:Fallback>
         </mc:AlternateContent>
-        <mc:AlternateContent xmlns:mc="http://schemas.openxmlformats.org/markup-compatibility/2006">
-          <mc:Choice xmlns:p14="http://schemas.microsoft.com/office/powerpoint/2010/main" Requires="p14">
+        <mc:AlternateContent xmlns:mc="http://schemas.openxmlformats.org/markup-compatibility/2006" xmlns:p14="http://schemas.microsoft.com/office/powerpoint/2010/main">
+          <mc:Choice Requires="p14">
             <p:contentPart p14:bwMode="auto" r:id="rId23">
               <p14:nvContentPartPr>
                 <p14:cNvPr id="45" name="Ink 44">
@@ -27441,7 +27488,7 @@
               </p14:xfrm>
             </p:contentPart>
           </mc:Choice>
-          <mc:Fallback>
+          <mc:Fallback xmlns="">
             <p:pic>
               <p:nvPicPr>
                 <p:cNvPr id="45" name="Ink 44">
@@ -27472,8 +27519,8 @@
             </p:pic>
           </mc:Fallback>
         </mc:AlternateContent>
-        <mc:AlternateContent xmlns:mc="http://schemas.openxmlformats.org/markup-compatibility/2006">
-          <mc:Choice xmlns:p14="http://schemas.microsoft.com/office/powerpoint/2010/main" Requires="p14">
+        <mc:AlternateContent xmlns:mc="http://schemas.openxmlformats.org/markup-compatibility/2006" xmlns:p14="http://schemas.microsoft.com/office/powerpoint/2010/main">
+          <mc:Choice Requires="p14">
             <p:contentPart p14:bwMode="auto" r:id="rId25">
               <p14:nvContentPartPr>
                 <p14:cNvPr id="46" name="Ink 45">
@@ -27492,7 +27539,7 @@
               </p14:xfrm>
             </p:contentPart>
           </mc:Choice>
-          <mc:Fallback>
+          <mc:Fallback xmlns="">
             <p:pic>
               <p:nvPicPr>
                 <p:cNvPr id="46" name="Ink 45">
@@ -27523,8 +27570,8 @@
             </p:pic>
           </mc:Fallback>
         </mc:AlternateContent>
-        <mc:AlternateContent xmlns:mc="http://schemas.openxmlformats.org/markup-compatibility/2006">
-          <mc:Choice xmlns:p14="http://schemas.microsoft.com/office/powerpoint/2010/main" Requires="p14">
+        <mc:AlternateContent xmlns:mc="http://schemas.openxmlformats.org/markup-compatibility/2006" xmlns:p14="http://schemas.microsoft.com/office/powerpoint/2010/main">
+          <mc:Choice Requires="p14">
             <p:contentPart p14:bwMode="auto" r:id="rId27">
               <p14:nvContentPartPr>
                 <p14:cNvPr id="48" name="Ink 47">
@@ -27543,7 +27590,7 @@
               </p14:xfrm>
             </p:contentPart>
           </mc:Choice>
-          <mc:Fallback>
+          <mc:Fallback xmlns="">
             <p:pic>
               <p:nvPicPr>
                 <p:cNvPr id="48" name="Ink 47">
@@ -27574,8 +27621,8 @@
             </p:pic>
           </mc:Fallback>
         </mc:AlternateContent>
-        <mc:AlternateContent xmlns:mc="http://schemas.openxmlformats.org/markup-compatibility/2006">
-          <mc:Choice xmlns:p14="http://schemas.microsoft.com/office/powerpoint/2010/main" Requires="p14">
+        <mc:AlternateContent xmlns:mc="http://schemas.openxmlformats.org/markup-compatibility/2006" xmlns:p14="http://schemas.microsoft.com/office/powerpoint/2010/main">
+          <mc:Choice Requires="p14">
             <p:contentPart p14:bwMode="auto" r:id="rId29">
               <p14:nvContentPartPr>
                 <p14:cNvPr id="49" name="Ink 48">
@@ -27594,7 +27641,7 @@
               </p14:xfrm>
             </p:contentPart>
           </mc:Choice>
-          <mc:Fallback>
+          <mc:Fallback xmlns="">
             <p:pic>
               <p:nvPicPr>
                 <p:cNvPr id="49" name="Ink 48">
@@ -27625,8 +27672,8 @@
             </p:pic>
           </mc:Fallback>
         </mc:AlternateContent>
-        <mc:AlternateContent xmlns:mc="http://schemas.openxmlformats.org/markup-compatibility/2006">
-          <mc:Choice xmlns:p14="http://schemas.microsoft.com/office/powerpoint/2010/main" Requires="p14">
+        <mc:AlternateContent xmlns:mc="http://schemas.openxmlformats.org/markup-compatibility/2006" xmlns:p14="http://schemas.microsoft.com/office/powerpoint/2010/main">
+          <mc:Choice Requires="p14">
             <p:contentPart p14:bwMode="auto" r:id="rId31">
               <p14:nvContentPartPr>
                 <p14:cNvPr id="51" name="Ink 50">
@@ -27645,7 +27692,7 @@
               </p14:xfrm>
             </p:contentPart>
           </mc:Choice>
-          <mc:Fallback>
+          <mc:Fallback xmlns="">
             <p:pic>
               <p:nvPicPr>
                 <p:cNvPr id="51" name="Ink 50">
@@ -27676,8 +27723,8 @@
             </p:pic>
           </mc:Fallback>
         </mc:AlternateContent>
-        <mc:AlternateContent xmlns:mc="http://schemas.openxmlformats.org/markup-compatibility/2006">
-          <mc:Choice xmlns:p14="http://schemas.microsoft.com/office/powerpoint/2010/main" Requires="p14">
+        <mc:AlternateContent xmlns:mc="http://schemas.openxmlformats.org/markup-compatibility/2006" xmlns:p14="http://schemas.microsoft.com/office/powerpoint/2010/main">
+          <mc:Choice Requires="p14">
             <p:contentPart p14:bwMode="auto" r:id="rId33">
               <p14:nvContentPartPr>
                 <p14:cNvPr id="52" name="Ink 51">
@@ -27696,7 +27743,7 @@
               </p14:xfrm>
             </p:contentPart>
           </mc:Choice>
-          <mc:Fallback>
+          <mc:Fallback xmlns="">
             <p:pic>
               <p:nvPicPr>
                 <p:cNvPr id="52" name="Ink 51">
@@ -27727,8 +27774,8 @@
             </p:pic>
           </mc:Fallback>
         </mc:AlternateContent>
-        <mc:AlternateContent xmlns:mc="http://schemas.openxmlformats.org/markup-compatibility/2006">
-          <mc:Choice xmlns:p14="http://schemas.microsoft.com/office/powerpoint/2010/main" Requires="p14">
+        <mc:AlternateContent xmlns:mc="http://schemas.openxmlformats.org/markup-compatibility/2006" xmlns:p14="http://schemas.microsoft.com/office/powerpoint/2010/main">
+          <mc:Choice Requires="p14">
             <p:contentPart p14:bwMode="auto" r:id="rId35">
               <p14:nvContentPartPr>
                 <p14:cNvPr id="53" name="Ink 52">
@@ -27747,7 +27794,7 @@
               </p14:xfrm>
             </p:contentPart>
           </mc:Choice>
-          <mc:Fallback>
+          <mc:Fallback xmlns="">
             <p:pic>
               <p:nvPicPr>
                 <p:cNvPr id="53" name="Ink 52">
@@ -27778,8 +27825,8 @@
             </p:pic>
           </mc:Fallback>
         </mc:AlternateContent>
-        <mc:AlternateContent xmlns:mc="http://schemas.openxmlformats.org/markup-compatibility/2006">
-          <mc:Choice xmlns:p14="http://schemas.microsoft.com/office/powerpoint/2010/main" Requires="p14">
+        <mc:AlternateContent xmlns:mc="http://schemas.openxmlformats.org/markup-compatibility/2006" xmlns:p14="http://schemas.microsoft.com/office/powerpoint/2010/main">
+          <mc:Choice Requires="p14">
             <p:contentPart p14:bwMode="auto" r:id="rId37">
               <p14:nvContentPartPr>
                 <p14:cNvPr id="54" name="Ink 53">
@@ -27798,7 +27845,7 @@
               </p14:xfrm>
             </p:contentPart>
           </mc:Choice>
-          <mc:Fallback>
+          <mc:Fallback xmlns="">
             <p:pic>
               <p:nvPicPr>
                 <p:cNvPr id="54" name="Ink 53">
@@ -27829,8 +27876,8 @@
             </p:pic>
           </mc:Fallback>
         </mc:AlternateContent>
-        <mc:AlternateContent xmlns:mc="http://schemas.openxmlformats.org/markup-compatibility/2006">
-          <mc:Choice xmlns:p14="http://schemas.microsoft.com/office/powerpoint/2010/main" Requires="p14">
+        <mc:AlternateContent xmlns:mc="http://schemas.openxmlformats.org/markup-compatibility/2006" xmlns:p14="http://schemas.microsoft.com/office/powerpoint/2010/main">
+          <mc:Choice Requires="p14">
             <p:contentPart p14:bwMode="auto" r:id="rId39">
               <p14:nvContentPartPr>
                 <p14:cNvPr id="57" name="Ink 56">
@@ -27849,7 +27896,7 @@
               </p14:xfrm>
             </p:contentPart>
           </mc:Choice>
-          <mc:Fallback>
+          <mc:Fallback xmlns="">
             <p:pic>
               <p:nvPicPr>
                 <p:cNvPr id="57" name="Ink 56">
@@ -27880,8 +27927,8 @@
             </p:pic>
           </mc:Fallback>
         </mc:AlternateContent>
-        <mc:AlternateContent xmlns:mc="http://schemas.openxmlformats.org/markup-compatibility/2006">
-          <mc:Choice xmlns:p14="http://schemas.microsoft.com/office/powerpoint/2010/main" Requires="p14">
+        <mc:AlternateContent xmlns:mc="http://schemas.openxmlformats.org/markup-compatibility/2006" xmlns:p14="http://schemas.microsoft.com/office/powerpoint/2010/main">
+          <mc:Choice Requires="p14">
             <p:contentPart p14:bwMode="auto" r:id="rId41">
               <p14:nvContentPartPr>
                 <p14:cNvPr id="58" name="Ink 57">
@@ -27900,7 +27947,7 @@
               </p14:xfrm>
             </p:contentPart>
           </mc:Choice>
-          <mc:Fallback>
+          <mc:Fallback xmlns="">
             <p:pic>
               <p:nvPicPr>
                 <p:cNvPr id="58" name="Ink 57">
@@ -27931,8 +27978,8 @@
             </p:pic>
           </mc:Fallback>
         </mc:AlternateContent>
-        <mc:AlternateContent xmlns:mc="http://schemas.openxmlformats.org/markup-compatibility/2006">
-          <mc:Choice xmlns:p14="http://schemas.microsoft.com/office/powerpoint/2010/main" Requires="p14">
+        <mc:AlternateContent xmlns:mc="http://schemas.openxmlformats.org/markup-compatibility/2006" xmlns:p14="http://schemas.microsoft.com/office/powerpoint/2010/main">
+          <mc:Choice Requires="p14">
             <p:contentPart p14:bwMode="auto" r:id="rId43">
               <p14:nvContentPartPr>
                 <p14:cNvPr id="59" name="Ink 58">
@@ -27951,7 +27998,7 @@
               </p14:xfrm>
             </p:contentPart>
           </mc:Choice>
-          <mc:Fallback>
+          <mc:Fallback xmlns="">
             <p:pic>
               <p:nvPicPr>
                 <p:cNvPr id="59" name="Ink 58">
@@ -27982,8 +28029,8 @@
             </p:pic>
           </mc:Fallback>
         </mc:AlternateContent>
-        <mc:AlternateContent xmlns:mc="http://schemas.openxmlformats.org/markup-compatibility/2006">
-          <mc:Choice xmlns:p14="http://schemas.microsoft.com/office/powerpoint/2010/main" Requires="p14">
+        <mc:AlternateContent xmlns:mc="http://schemas.openxmlformats.org/markup-compatibility/2006" xmlns:p14="http://schemas.microsoft.com/office/powerpoint/2010/main">
+          <mc:Choice Requires="p14">
             <p:contentPart p14:bwMode="auto" r:id="rId45">
               <p14:nvContentPartPr>
                 <p14:cNvPr id="61" name="Ink 60">
@@ -28002,7 +28049,7 @@
               </p14:xfrm>
             </p:contentPart>
           </mc:Choice>
-          <mc:Fallback>
+          <mc:Fallback xmlns="">
             <p:pic>
               <p:nvPicPr>
                 <p:cNvPr id="61" name="Ink 60">
@@ -29159,6 +29206,35 @@
 </file>
 
 <file path=customXml/item1.xml><?xml version="1.0" encoding="utf-8"?>
+<?mso-contentType ?>
+<FormTemplates xmlns="http://schemas.microsoft.com/sharepoint/v3/contenttype/forms">
+  <Display>DocumentLibraryForm</Display>
+  <Edit>DocumentLibraryForm</Edit>
+  <New>DocumentLibraryForm</New>
+</FormTemplates>
+</file>
+
+<file path=customXml/item2.xml><?xml version="1.0" encoding="utf-8"?>
+<p:properties xmlns:p="http://schemas.microsoft.com/office/2006/metadata/properties" xmlns:xsi="http://www.w3.org/2001/XMLSchema-instance" xmlns:pc="http://schemas.microsoft.com/office/infopath/2007/PartnerControls">
+  <documentManagement>
+    <_ip_UnifiedCompliancePolicyUIAction xmlns="http://schemas.microsoft.com/sharepoint/v3" xsi:nil="true"/>
+    <Image xmlns="71af3243-3dd4-4a8d-8c0d-dd76da1f02a5">
+      <Url xsi:nil="true"/>
+      <Description xsi:nil="true"/>
+    </Image>
+    <Status xmlns="71af3243-3dd4-4a8d-8c0d-dd76da1f02a5">Not started</Status>
+    <Background xmlns="71af3243-3dd4-4a8d-8c0d-dd76da1f02a5">false</Background>
+    <_ip_UnifiedCompliancePolicyProperties xmlns="http://schemas.microsoft.com/sharepoint/v3" xsi:nil="true"/>
+    <ImageTagsTaxHTField xmlns="71af3243-3dd4-4a8d-8c0d-dd76da1f02a5">
+      <Terms xmlns="http://schemas.microsoft.com/office/infopath/2007/PartnerControls"/>
+    </ImageTagsTaxHTField>
+    <TaxCatchAll xmlns="230e9df3-be65-4c73-a93b-d1236ebd677e" xsi:nil="true"/>
+    <MediaServiceKeyPoints xmlns="71af3243-3dd4-4a8d-8c0d-dd76da1f02a5" xsi:nil="true"/>
+  </documentManagement>
+</p:properties>
+</file>
+
+<file path=customXml/item3.xml><?xml version="1.0" encoding="utf-8"?>
 <ct:contentTypeSchema xmlns:ct="http://schemas.microsoft.com/office/2006/metadata/contentType" xmlns:ma="http://schemas.microsoft.com/office/2006/metadata/properties/metaAttributes" ct:_="" ma:_="" ma:contentTypeName="Document" ma:contentTypeID="0x01010079F111ED35F8CC479449609E8A0923A6" ma:contentTypeVersion="28" ma:contentTypeDescription="Create a new document." ma:contentTypeScope="" ma:versionID="60f5a4f2d2b0abadcf532d48ebf9cb71">
   <xsd:schema xmlns:xsd="http://www.w3.org/2001/XMLSchema" xmlns:xs="http://www.w3.org/2001/XMLSchema" xmlns:p="http://schemas.microsoft.com/office/2006/metadata/properties" xmlns:ns1="http://schemas.microsoft.com/sharepoint/v3" xmlns:ns2="71af3243-3dd4-4a8d-8c0d-dd76da1f02a5" xmlns:ns3="16c05727-aa75-4e4a-9b5f-8a80a1165891" xmlns:ns4="230e9df3-be65-4c73-a93b-d1236ebd677e" targetNamespace="http://schemas.microsoft.com/office/2006/metadata/properties" ma:root="true" ma:fieldsID="7dd78129e6a1811f84807ad11c651531" ns1:_="" ns2:_="" ns3:_="" ns4:_="">
     <xsd:import namespace="http://schemas.microsoft.com/sharepoint/v3"/>
@@ -29470,36 +29546,27 @@
 </ct:contentTypeSchema>
 </file>
 
-<file path=customXml/item2.xml><?xml version="1.0" encoding="utf-8"?>
-<p:properties xmlns:p="http://schemas.microsoft.com/office/2006/metadata/properties" xmlns:xsi="http://www.w3.org/2001/XMLSchema-instance" xmlns:pc="http://schemas.microsoft.com/office/infopath/2007/PartnerControls">
-  <documentManagement>
-    <_ip_UnifiedCompliancePolicyUIAction xmlns="http://schemas.microsoft.com/sharepoint/v3" xsi:nil="true"/>
-    <Image xmlns="71af3243-3dd4-4a8d-8c0d-dd76da1f02a5">
-      <Url xsi:nil="true"/>
-      <Description xsi:nil="true"/>
-    </Image>
-    <Status xmlns="71af3243-3dd4-4a8d-8c0d-dd76da1f02a5">Not started</Status>
-    <Background xmlns="71af3243-3dd4-4a8d-8c0d-dd76da1f02a5">false</Background>
-    <_ip_UnifiedCompliancePolicyProperties xmlns="http://schemas.microsoft.com/sharepoint/v3" xsi:nil="true"/>
-    <ImageTagsTaxHTField xmlns="71af3243-3dd4-4a8d-8c0d-dd76da1f02a5">
-      <Terms xmlns="http://schemas.microsoft.com/office/infopath/2007/PartnerControls"/>
-    </ImageTagsTaxHTField>
-    <TaxCatchAll xmlns="230e9df3-be65-4c73-a93b-d1236ebd677e" xsi:nil="true"/>
-    <MediaServiceKeyPoints xmlns="71af3243-3dd4-4a8d-8c0d-dd76da1f02a5" xsi:nil="true"/>
-  </documentManagement>
-</p:properties>
+<file path=customXml/itemProps1.xml><?xml version="1.0" encoding="utf-8"?>
+<ds:datastoreItem xmlns:ds="http://schemas.openxmlformats.org/officeDocument/2006/customXml" ds:itemID="{CABF691C-888B-4061-8A6F-D5CE84A0254B}">
+  <ds:schemaRefs>
+    <ds:schemaRef ds:uri="http://schemas.microsoft.com/sharepoint/v3/contenttype/forms"/>
+  </ds:schemaRefs>
+</ds:datastoreItem>
 </file>
 
-<file path=customXml/item3.xml><?xml version="1.0" encoding="utf-8"?>
-<?mso-contentType ?>
-<FormTemplates xmlns="http://schemas.microsoft.com/sharepoint/v3/contenttype/forms">
-  <Display>DocumentLibraryForm</Display>
-  <Edit>DocumentLibraryForm</Edit>
-  <New>DocumentLibraryForm</New>
-</FormTemplates>
+<file path=customXml/itemProps2.xml><?xml version="1.0" encoding="utf-8"?>
+<ds:datastoreItem xmlns:ds="http://schemas.openxmlformats.org/officeDocument/2006/customXml" ds:itemID="{49168DCE-134F-4610-A6AA-88CEBE8D71D2}">
+  <ds:schemaRefs>
+    <ds:schemaRef ds:uri="http://schemas.microsoft.com/office/2006/metadata/properties"/>
+    <ds:schemaRef ds:uri="http://schemas.microsoft.com/office/infopath/2007/PartnerControls"/>
+    <ds:schemaRef ds:uri="http://schemas.microsoft.com/sharepoint/v3"/>
+    <ds:schemaRef ds:uri="71af3243-3dd4-4a8d-8c0d-dd76da1f02a5"/>
+    <ds:schemaRef ds:uri="230e9df3-be65-4c73-a93b-d1236ebd677e"/>
+  </ds:schemaRefs>
+</ds:datastoreItem>
 </file>
 
-<file path=customXml/itemProps1.xml><?xml version="1.0" encoding="utf-8"?>
+<file path=customXml/itemProps3.xml><?xml version="1.0" encoding="utf-8"?>
 <ds:datastoreItem xmlns:ds="http://schemas.openxmlformats.org/officeDocument/2006/customXml" ds:itemID="{5EDE3176-A15D-46A3-BDDB-64A0D7363224}">
   <ds:schemaRefs>
     <ds:schemaRef ds:uri="http://schemas.microsoft.com/office/2006/metadata/contentType"/>
@@ -29520,26 +29587,6 @@
 </ds:datastoreItem>
 </file>
 
-<file path=customXml/itemProps2.xml><?xml version="1.0" encoding="utf-8"?>
-<ds:datastoreItem xmlns:ds="http://schemas.openxmlformats.org/officeDocument/2006/customXml" ds:itemID="{49168DCE-134F-4610-A6AA-88CEBE8D71D2}">
-  <ds:schemaRefs>
-    <ds:schemaRef ds:uri="http://schemas.microsoft.com/office/2006/metadata/properties"/>
-    <ds:schemaRef ds:uri="http://schemas.microsoft.com/office/infopath/2007/PartnerControls"/>
-    <ds:schemaRef ds:uri="http://schemas.microsoft.com/sharepoint/v3"/>
-    <ds:schemaRef ds:uri="71af3243-3dd4-4a8d-8c0d-dd76da1f02a5"/>
-    <ds:schemaRef ds:uri="230e9df3-be65-4c73-a93b-d1236ebd677e"/>
-  </ds:schemaRefs>
-</ds:datastoreItem>
-</file>
-
-<file path=customXml/itemProps3.xml><?xml version="1.0" encoding="utf-8"?>
-<ds:datastoreItem xmlns:ds="http://schemas.openxmlformats.org/officeDocument/2006/customXml" ds:itemID="{CABF691C-888B-4061-8A6F-D5CE84A0254B}">
-  <ds:schemaRefs>
-    <ds:schemaRef ds:uri="http://schemas.microsoft.com/sharepoint/v3/contenttype/forms"/>
-  </ds:schemaRefs>
-</ds:datastoreItem>
-</file>
-
 <file path=docMetadata/LabelInfo.xml><?xml version="1.0" encoding="utf-8"?>
 <clbl:labelList xmlns:clbl="http://schemas.microsoft.com/office/2020/mipLabelMetadata"/>
 </file>
</xml_diff>